<commit_message>
small changes in slides
</commit_message>
<xml_diff>
--- a/slides/GraphqlSlides.pptx
+++ b/slides/GraphqlSlides.pptx
@@ -262,7 +262,7 @@
           <a:p>
             <a:fld id="{858036E5-7FF6-491F-BDEF-E833DBCA9680}" type="datetimeFigureOut">
               <a:rPr lang="de-DE" smtClean="0"/>
-              <a:t>31.03.2019</a:t>
+              <a:t>01.04.2019</a:t>
             </a:fld>
             <a:endParaRPr lang="de-DE"/>
           </a:p>
@@ -4381,7 +4381,7 @@
           <a:p>
             <a:fld id="{3A538C34-53B0-4EA9-8596-22F17B12308D}" type="datetimeFigureOut">
               <a:rPr lang="de-DE" smtClean="0"/>
-              <a:t>31.03.2019</a:t>
+              <a:t>01.04.2019</a:t>
             </a:fld>
             <a:endParaRPr lang="de-DE"/>
           </a:p>
@@ -4579,7 +4579,7 @@
           <a:p>
             <a:fld id="{3A538C34-53B0-4EA9-8596-22F17B12308D}" type="datetimeFigureOut">
               <a:rPr lang="de-DE" smtClean="0"/>
-              <a:t>31.03.2019</a:t>
+              <a:t>01.04.2019</a:t>
             </a:fld>
             <a:endParaRPr lang="de-DE"/>
           </a:p>
@@ -4787,7 +4787,7 @@
           <a:p>
             <a:fld id="{3A538C34-53B0-4EA9-8596-22F17B12308D}" type="datetimeFigureOut">
               <a:rPr lang="de-DE" smtClean="0"/>
-              <a:t>31.03.2019</a:t>
+              <a:t>01.04.2019</a:t>
             </a:fld>
             <a:endParaRPr lang="de-DE"/>
           </a:p>
@@ -4985,7 +4985,7 @@
           <a:p>
             <a:fld id="{3A538C34-53B0-4EA9-8596-22F17B12308D}" type="datetimeFigureOut">
               <a:rPr lang="de-DE" smtClean="0"/>
-              <a:t>31.03.2019</a:t>
+              <a:t>01.04.2019</a:t>
             </a:fld>
             <a:endParaRPr lang="de-DE"/>
           </a:p>
@@ -5260,7 +5260,7 @@
           <a:p>
             <a:fld id="{3A538C34-53B0-4EA9-8596-22F17B12308D}" type="datetimeFigureOut">
               <a:rPr lang="de-DE" smtClean="0"/>
-              <a:t>31.03.2019</a:t>
+              <a:t>01.04.2019</a:t>
             </a:fld>
             <a:endParaRPr lang="de-DE"/>
           </a:p>
@@ -5525,7 +5525,7 @@
           <a:p>
             <a:fld id="{3A538C34-53B0-4EA9-8596-22F17B12308D}" type="datetimeFigureOut">
               <a:rPr lang="de-DE" smtClean="0"/>
-              <a:t>31.03.2019</a:t>
+              <a:t>01.04.2019</a:t>
             </a:fld>
             <a:endParaRPr lang="de-DE"/>
           </a:p>
@@ -5937,7 +5937,7 @@
           <a:p>
             <a:fld id="{3A538C34-53B0-4EA9-8596-22F17B12308D}" type="datetimeFigureOut">
               <a:rPr lang="de-DE" smtClean="0"/>
-              <a:t>31.03.2019</a:t>
+              <a:t>01.04.2019</a:t>
             </a:fld>
             <a:endParaRPr lang="de-DE"/>
           </a:p>
@@ -6078,7 +6078,7 @@
           <a:p>
             <a:fld id="{3A538C34-53B0-4EA9-8596-22F17B12308D}" type="datetimeFigureOut">
               <a:rPr lang="de-DE" smtClean="0"/>
-              <a:t>31.03.2019</a:t>
+              <a:t>01.04.2019</a:t>
             </a:fld>
             <a:endParaRPr lang="de-DE"/>
           </a:p>
@@ -6191,7 +6191,7 @@
           <a:p>
             <a:fld id="{3A538C34-53B0-4EA9-8596-22F17B12308D}" type="datetimeFigureOut">
               <a:rPr lang="de-DE" smtClean="0"/>
-              <a:t>31.03.2019</a:t>
+              <a:t>01.04.2019</a:t>
             </a:fld>
             <a:endParaRPr lang="de-DE"/>
           </a:p>
@@ -6502,7 +6502,7 @@
           <a:p>
             <a:fld id="{3A538C34-53B0-4EA9-8596-22F17B12308D}" type="datetimeFigureOut">
               <a:rPr lang="de-DE" smtClean="0"/>
-              <a:t>31.03.2019</a:t>
+              <a:t>01.04.2019</a:t>
             </a:fld>
             <a:endParaRPr lang="de-DE"/>
           </a:p>
@@ -6790,7 +6790,7 @@
           <a:p>
             <a:fld id="{3A538C34-53B0-4EA9-8596-22F17B12308D}" type="datetimeFigureOut">
               <a:rPr lang="de-DE" smtClean="0"/>
-              <a:t>31.03.2019</a:t>
+              <a:t>01.04.2019</a:t>
             </a:fld>
             <a:endParaRPr lang="de-DE"/>
           </a:p>
@@ -7031,7 +7031,7 @@
           <a:p>
             <a:fld id="{3A538C34-53B0-4EA9-8596-22F17B12308D}" type="datetimeFigureOut">
               <a:rPr lang="de-DE" smtClean="0"/>
-              <a:t>31.03.2019</a:t>
+              <a:t>01.04.2019</a:t>
             </a:fld>
             <a:endParaRPr lang="de-DE"/>
           </a:p>
@@ -7471,13 +7471,13 @@
           <p:nvPr/>
         </p:nvPicPr>
         <p:blipFill>
-          <a:blip r:embed="rId3">
+          <a:blip r:embed="rId3" cstate="hqprint">
             <a:extLst>
               <a:ext uri="{28A0092B-C50C-407E-A947-70E740481C1C}">
                 <a14:useLocalDpi xmlns:a14="http://schemas.microsoft.com/office/drawing/2010/main" val="0"/>
               </a:ext>
               <a:ext uri="{96DAC541-7B7A-43D3-8B79-37D633B846F1}">
-                <asvg:svgBlip xmlns:asvg="http://schemas.microsoft.com/office/drawing/2016/SVG/main" r:embed="rId4"/>
+                <asvg:svgBlip xmlns:asvg="http://schemas.microsoft.com/office/drawing/2016/SVG/main" xmlns="" r:embed="rId4"/>
               </a:ext>
             </a:extLst>
           </a:blip>
@@ -7630,6 +7630,13 @@
   <p:clrMapOvr>
     <a:masterClrMapping/>
   </p:clrMapOvr>
+  <p:timing>
+    <p:tnLst>
+      <p:par>
+        <p:cTn id="1" dur="indefinite" restart="never" nodeType="tmRoot"/>
+      </p:par>
+    </p:tnLst>
+  </p:timing>
 </p:sld>
 </file>
 
@@ -8092,6 +8099,13 @@
   <p:clrMapOvr>
     <a:masterClrMapping/>
   </p:clrMapOvr>
+  <p:timing>
+    <p:tnLst>
+      <p:par>
+        <p:cTn id="1" dur="indefinite" restart="never" nodeType="tmRoot"/>
+      </p:par>
+    </p:tnLst>
+  </p:timing>
 </p:sld>
 </file>
 
@@ -8649,6 +8663,13 @@
   <p:clrMapOvr>
     <a:masterClrMapping/>
   </p:clrMapOvr>
+  <p:timing>
+    <p:tnLst>
+      <p:par>
+        <p:cTn id="1" dur="indefinite" restart="never" nodeType="tmRoot"/>
+      </p:par>
+    </p:tnLst>
+  </p:timing>
 </p:sld>
 </file>
 
@@ -9223,6 +9244,13 @@
   <p:clrMapOvr>
     <a:masterClrMapping/>
   </p:clrMapOvr>
+  <p:timing>
+    <p:tnLst>
+      <p:par>
+        <p:cTn id="1" dur="indefinite" restart="never" nodeType="tmRoot"/>
+      </p:par>
+    </p:tnLst>
+  </p:timing>
 </p:sld>
 </file>
 
@@ -9883,6 +9911,13 @@
   <p:clrMapOvr>
     <a:masterClrMapping/>
   </p:clrMapOvr>
+  <p:timing>
+    <p:tnLst>
+      <p:par>
+        <p:cTn id="1" dur="indefinite" restart="never" nodeType="tmRoot"/>
+      </p:par>
+    </p:tnLst>
+  </p:timing>
 </p:sld>
 </file>
 
@@ -10486,6 +10521,13 @@
   <p:clrMapOvr>
     <a:masterClrMapping/>
   </p:clrMapOvr>
+  <p:timing>
+    <p:tnLst>
+      <p:par>
+        <p:cTn id="1" dur="indefinite" restart="never" nodeType="tmRoot"/>
+      </p:par>
+    </p:tnLst>
+  </p:timing>
 </p:sld>
 </file>
 
@@ -10994,6 +11036,13 @@
   <p:clrMapOvr>
     <a:masterClrMapping/>
   </p:clrMapOvr>
+  <p:timing>
+    <p:tnLst>
+      <p:par>
+        <p:cTn id="1" dur="indefinite" restart="never" nodeType="tmRoot"/>
+      </p:par>
+    </p:tnLst>
+  </p:timing>
 </p:sld>
 </file>
 
@@ -12708,6 +12757,13 @@
   <p:clrMapOvr>
     <a:masterClrMapping/>
   </p:clrMapOvr>
+  <p:timing>
+    <p:tnLst>
+      <p:par>
+        <p:cTn id="1" dur="indefinite" restart="never" nodeType="tmRoot"/>
+      </p:par>
+    </p:tnLst>
+  </p:timing>
 </p:sld>
 </file>
 
@@ -12861,6 +12917,13 @@
   <p:clrMapOvr>
     <a:masterClrMapping/>
   </p:clrMapOvr>
+  <p:timing>
+    <p:tnLst>
+      <p:par>
+        <p:cTn id="1" dur="indefinite" restart="never" nodeType="tmRoot"/>
+      </p:par>
+    </p:tnLst>
+  </p:timing>
 </p:sld>
 </file>
 
@@ -12990,6 +13053,13 @@
   <p:clrMapOvr>
     <a:masterClrMapping/>
   </p:clrMapOvr>
+  <p:timing>
+    <p:tnLst>
+      <p:par>
+        <p:cTn id="1" dur="indefinite" restart="never" nodeType="tmRoot"/>
+      </p:par>
+    </p:tnLst>
+  </p:timing>
 </p:sld>
 </file>
 
@@ -13418,6 +13488,13 @@
   <p:clrMapOvr>
     <a:masterClrMapping/>
   </p:clrMapOvr>
+  <p:timing>
+    <p:tnLst>
+      <p:par>
+        <p:cTn id="1" dur="indefinite" restart="never" nodeType="tmRoot"/>
+      </p:par>
+    </p:tnLst>
+  </p:timing>
 </p:sld>
 </file>
 
@@ -13619,13 +13696,13 @@
           <p:nvPr/>
         </p:nvPicPr>
         <p:blipFill>
-          <a:blip r:embed="rId5">
+          <a:blip r:embed="rId5" cstate="hqprint">
             <a:extLst>
               <a:ext uri="{28A0092B-C50C-407E-A947-70E740481C1C}">
                 <a14:useLocalDpi xmlns:a14="http://schemas.microsoft.com/office/drawing/2010/main" val="0"/>
               </a:ext>
               <a:ext uri="{96DAC541-7B7A-43D3-8B79-37D633B846F1}">
-                <asvg:svgBlip xmlns:asvg="http://schemas.microsoft.com/office/drawing/2016/SVG/main" r:embed="rId6"/>
+                <asvg:svgBlip xmlns:asvg="http://schemas.microsoft.com/office/drawing/2016/SVG/main" xmlns="" r:embed="rId6"/>
               </a:ext>
             </a:extLst>
           </a:blip>
@@ -13658,13 +13735,13 @@
           <p:nvPr/>
         </p:nvPicPr>
         <p:blipFill>
-          <a:blip r:embed="rId5">
+          <a:blip r:embed="rId5" cstate="hqprint">
             <a:extLst>
               <a:ext uri="{28A0092B-C50C-407E-A947-70E740481C1C}">
                 <a14:useLocalDpi xmlns:a14="http://schemas.microsoft.com/office/drawing/2010/main" val="0"/>
               </a:ext>
               <a:ext uri="{96DAC541-7B7A-43D3-8B79-37D633B846F1}">
-                <asvg:svgBlip xmlns:asvg="http://schemas.microsoft.com/office/drawing/2016/SVG/main" r:embed="rId6"/>
+                <asvg:svgBlip xmlns:asvg="http://schemas.microsoft.com/office/drawing/2016/SVG/main" xmlns="" r:embed="rId6"/>
               </a:ext>
             </a:extLst>
           </a:blip>
@@ -13784,13 +13861,6 @@
                   <a:schemeClr val="bg1"/>
                 </a:solidFill>
                 <a:latin typeface="Segoe UI" panose="020B0502040204020203" pitchFamily="34" charset="0"/>
-                <a:hlinkClick r:id="rId7">
-                  <a:extLst>
-                    <a:ext uri="{A12FA001-AC4F-418D-AE19-62706E023703}">
-                      <ahyp:hlinkClr xmlns:ahyp="http://schemas.microsoft.com/office/drawing/2018/hyperlinkcolor" val="tx"/>
-                    </a:ext>
-                  </a:extLst>
-                </a:hlinkClick>
               </a:rPr>
               <a:t> </a:t>
             </a:r>
@@ -14006,6 +14076,13 @@
   <p:clrMapOvr>
     <a:masterClrMapping/>
   </p:clrMapOvr>
+  <p:timing>
+    <p:tnLst>
+      <p:par>
+        <p:cTn id="1" dur="indefinite" restart="never" nodeType="tmRoot"/>
+      </p:par>
+    </p:tnLst>
+  </p:timing>
 </p:sld>
 </file>
 
@@ -14489,6 +14566,13 @@
   <p:clrMapOvr>
     <a:masterClrMapping/>
   </p:clrMapOvr>
+  <p:timing>
+    <p:tnLst>
+      <p:par>
+        <p:cTn id="1" dur="indefinite" restart="never" nodeType="tmRoot"/>
+      </p:par>
+    </p:tnLst>
+  </p:timing>
 </p:sld>
 </file>
 
@@ -14976,6 +15060,13 @@
   <p:clrMapOvr>
     <a:masterClrMapping/>
   </p:clrMapOvr>
+  <p:timing>
+    <p:tnLst>
+      <p:par>
+        <p:cTn id="1" dur="indefinite" restart="never" nodeType="tmRoot"/>
+      </p:par>
+    </p:tnLst>
+  </p:timing>
 </p:sld>
 </file>
 
@@ -15491,6 +15582,13 @@
   <p:clrMapOvr>
     <a:masterClrMapping/>
   </p:clrMapOvr>
+  <p:timing>
+    <p:tnLst>
+      <p:par>
+        <p:cTn id="1" dur="indefinite" restart="never" nodeType="tmRoot"/>
+      </p:par>
+    </p:tnLst>
+  </p:timing>
 </p:sld>
 </file>
 
@@ -16018,6 +16116,13 @@
   <p:clrMapOvr>
     <a:masterClrMapping/>
   </p:clrMapOvr>
+  <p:timing>
+    <p:tnLst>
+      <p:par>
+        <p:cTn id="1" dur="indefinite" restart="never" nodeType="tmRoot"/>
+      </p:par>
+    </p:tnLst>
+  </p:timing>
 </p:sld>
 </file>
 
@@ -16424,6 +16529,13 @@
   <p:clrMapOvr>
     <a:masterClrMapping/>
   </p:clrMapOvr>
+  <p:timing>
+    <p:tnLst>
+      <p:par>
+        <p:cTn id="1" dur="indefinite" restart="never" nodeType="tmRoot"/>
+      </p:par>
+    </p:tnLst>
+  </p:timing>
 </p:sld>
 </file>
 
@@ -16916,6 +17028,15 @@
           </a:bodyPr>
           <a:lstStyle/>
           <a:p>
+            <a:r>
+              <a:rPr lang="en-US" dirty="0">
+                <a:solidFill>
+                  <a:srgbClr val="F8F8F2"/>
+                </a:solidFill>
+                <a:latin typeface="Fira Code" panose="020B0509050000020004" pitchFamily="49" charset="0"/>
+              </a:rPr>
+              <a:t/>
+            </a:r>
             <a:br>
               <a:rPr lang="en-US" dirty="0">
                 <a:solidFill>
@@ -17049,6 +17170,13 @@
   <p:clrMapOvr>
     <a:masterClrMapping/>
   </p:clrMapOvr>
+  <p:timing>
+    <p:tnLst>
+      <p:par>
+        <p:cTn id="1" dur="indefinite" restart="never" nodeType="tmRoot"/>
+      </p:par>
+    </p:tnLst>
+  </p:timing>
 </p:sld>
 </file>
 
@@ -17884,6 +18012,13 @@
   <p:clrMapOvr>
     <a:masterClrMapping/>
   </p:clrMapOvr>
+  <p:timing>
+    <p:tnLst>
+      <p:par>
+        <p:cTn id="1" dur="indefinite" restart="never" nodeType="tmRoot"/>
+      </p:par>
+    </p:tnLst>
+  </p:timing>
 </p:sld>
 </file>
 
@@ -18811,6 +18946,13 @@
   <p:clrMapOvr>
     <a:masterClrMapping/>
   </p:clrMapOvr>
+  <p:timing>
+    <p:tnLst>
+      <p:par>
+        <p:cTn id="1" dur="indefinite" restart="never" nodeType="tmRoot"/>
+      </p:par>
+    </p:tnLst>
+  </p:timing>
 </p:sld>
 </file>
 
@@ -19762,6 +19904,13 @@
   <p:clrMapOvr>
     <a:masterClrMapping/>
   </p:clrMapOvr>
+  <p:timing>
+    <p:tnLst>
+      <p:par>
+        <p:cTn id="1" dur="indefinite" restart="never" nodeType="tmRoot"/>
+      </p:par>
+    </p:tnLst>
+  </p:timing>
 </p:sld>
 </file>
 
@@ -19995,6 +20144,21 @@
   <p:clrMapOvr>
     <a:masterClrMapping/>
   </p:clrMapOvr>
+  <mc:AlternateContent xmlns:mc="http://schemas.openxmlformats.org/markup-compatibility/2006">
+    <mc:Choice xmlns:p14="http://schemas.microsoft.com/office/powerpoint/2010/main" Requires="p14">
+      <p:transition spd="slow" p14:dur="2000"/>
+    </mc:Choice>
+    <mc:Fallback>
+      <p:transition spd="slow"/>
+    </mc:Fallback>
+  </mc:AlternateContent>
+  <p:timing>
+    <p:tnLst>
+      <p:par>
+        <p:cTn id="1" dur="indefinite" restart="never" nodeType="tmRoot"/>
+      </p:par>
+    </p:tnLst>
+  </p:timing>
 </p:sld>
 </file>
 
@@ -20122,13 +20286,13 @@
           <p:nvPr/>
         </p:nvPicPr>
         <p:blipFill>
-          <a:blip r:embed="rId4">
+          <a:blip r:embed="rId4" cstate="hqprint">
             <a:extLst>
               <a:ext uri="{28A0092B-C50C-407E-A947-70E740481C1C}">
                 <a14:useLocalDpi xmlns:a14="http://schemas.microsoft.com/office/drawing/2010/main" val="0"/>
               </a:ext>
               <a:ext uri="{96DAC541-7B7A-43D3-8B79-37D633B846F1}">
-                <asvg:svgBlip xmlns:asvg="http://schemas.microsoft.com/office/drawing/2016/SVG/main" r:embed="rId5"/>
+                <asvg:svgBlip xmlns:asvg="http://schemas.microsoft.com/office/drawing/2016/SVG/main" xmlns="" r:embed="rId5"/>
               </a:ext>
             </a:extLst>
           </a:blip>
@@ -20161,13 +20325,13 @@
           <p:nvPr/>
         </p:nvPicPr>
         <p:blipFill>
-          <a:blip r:embed="rId6">
+          <a:blip r:embed="rId6" cstate="hqprint">
             <a:extLst>
               <a:ext uri="{28A0092B-C50C-407E-A947-70E740481C1C}">
                 <a14:useLocalDpi xmlns:a14="http://schemas.microsoft.com/office/drawing/2010/main" val="0"/>
               </a:ext>
               <a:ext uri="{96DAC541-7B7A-43D3-8B79-37D633B846F1}">
-                <asvg:svgBlip xmlns:asvg="http://schemas.microsoft.com/office/drawing/2016/SVG/main" r:embed="rId7"/>
+                <asvg:svgBlip xmlns:asvg="http://schemas.microsoft.com/office/drawing/2016/SVG/main" xmlns="" r:embed="rId7"/>
               </a:ext>
             </a:extLst>
           </a:blip>
@@ -20819,6 +20983,13 @@
   <p:clrMapOvr>
     <a:masterClrMapping/>
   </p:clrMapOvr>
+  <p:timing>
+    <p:tnLst>
+      <p:par>
+        <p:cTn id="1" dur="indefinite" restart="never" nodeType="tmRoot"/>
+      </p:par>
+    </p:tnLst>
+  </p:timing>
 </p:sld>
 </file>
 
@@ -21408,6 +21579,14 @@
   <p:clrMapOvr>
     <a:masterClrMapping/>
   </p:clrMapOvr>
+  <mc:AlternateContent xmlns:mc="http://schemas.openxmlformats.org/markup-compatibility/2006">
+    <mc:Choice xmlns:p14="http://schemas.microsoft.com/office/powerpoint/2010/main" Requires="p14">
+      <p:transition spd="slow" p14:dur="2000"/>
+    </mc:Choice>
+    <mc:Fallback>
+      <p:transition spd="slow"/>
+    </mc:Fallback>
+  </mc:AlternateContent>
 </p:sld>
 </file>
 
@@ -22278,6 +22457,21 @@
   <p:clrMapOvr>
     <a:masterClrMapping/>
   </p:clrMapOvr>
+  <mc:AlternateContent xmlns:mc="http://schemas.openxmlformats.org/markup-compatibility/2006">
+    <mc:Choice xmlns:p14="http://schemas.microsoft.com/office/powerpoint/2010/main" Requires="p14">
+      <p:transition spd="slow" p14:dur="2000"/>
+    </mc:Choice>
+    <mc:Fallback>
+      <p:transition spd="slow"/>
+    </mc:Fallback>
+  </mc:AlternateContent>
+  <p:timing>
+    <p:tnLst>
+      <p:par>
+        <p:cTn id="1" dur="indefinite" restart="never" nodeType="tmRoot"/>
+      </p:par>
+    </p:tnLst>
+  </p:timing>
 </p:sld>
 </file>
 
@@ -22354,13 +22548,13 @@
           <p:nvPr/>
         </p:nvPicPr>
         <p:blipFill>
-          <a:blip r:embed="rId2">
+          <a:blip r:embed="rId2" cstate="hqprint">
             <a:extLst>
               <a:ext uri="{28A0092B-C50C-407E-A947-70E740481C1C}">
                 <a14:useLocalDpi xmlns:a14="http://schemas.microsoft.com/office/drawing/2010/main" val="0"/>
               </a:ext>
               <a:ext uri="{96DAC541-7B7A-43D3-8B79-37D633B846F1}">
-                <asvg:svgBlip xmlns:asvg="http://schemas.microsoft.com/office/drawing/2016/SVG/main" r:embed="rId3"/>
+                <asvg:svgBlip xmlns:asvg="http://schemas.microsoft.com/office/drawing/2016/SVG/main" xmlns="" r:embed="rId3"/>
               </a:ext>
             </a:extLst>
           </a:blip>
@@ -22434,6 +22628,13 @@
   <p:clrMapOvr>
     <a:masterClrMapping/>
   </p:clrMapOvr>
+  <p:timing>
+    <p:tnLst>
+      <p:par>
+        <p:cTn id="1" dur="indefinite" restart="never" nodeType="tmRoot"/>
+      </p:par>
+    </p:tnLst>
+  </p:timing>
 </p:sld>
 </file>
 
@@ -22510,13 +22711,13 @@
           <p:nvPr/>
         </p:nvPicPr>
         <p:blipFill>
-          <a:blip r:embed="rId3">
+          <a:blip r:embed="rId3" cstate="hqprint">
             <a:extLst>
               <a:ext uri="{28A0092B-C50C-407E-A947-70E740481C1C}">
                 <a14:useLocalDpi xmlns:a14="http://schemas.microsoft.com/office/drawing/2010/main" val="0"/>
               </a:ext>
               <a:ext uri="{96DAC541-7B7A-43D3-8B79-37D633B846F1}">
-                <asvg:svgBlip xmlns:asvg="http://schemas.microsoft.com/office/drawing/2016/SVG/main" r:embed="rId4"/>
+                <asvg:svgBlip xmlns:asvg="http://schemas.microsoft.com/office/drawing/2016/SVG/main" xmlns="" r:embed="rId4"/>
               </a:ext>
             </a:extLst>
           </a:blip>
@@ -22549,13 +22750,13 @@
           <p:nvPr/>
         </p:nvPicPr>
         <p:blipFill>
-          <a:blip r:embed="rId5">
+          <a:blip r:embed="rId5" cstate="hqprint">
             <a:extLst>
               <a:ext uri="{28A0092B-C50C-407E-A947-70E740481C1C}">
                 <a14:useLocalDpi xmlns:a14="http://schemas.microsoft.com/office/drawing/2010/main" val="0"/>
               </a:ext>
               <a:ext uri="{96DAC541-7B7A-43D3-8B79-37D633B846F1}">
-                <asvg:svgBlip xmlns:asvg="http://schemas.microsoft.com/office/drawing/2016/SVG/main" r:embed="rId6"/>
+                <asvg:svgBlip xmlns:asvg="http://schemas.microsoft.com/office/drawing/2016/SVG/main" xmlns="" r:embed="rId6"/>
               </a:ext>
             </a:extLst>
           </a:blip>
@@ -22672,6 +22873,13 @@
   <p:clrMapOvr>
     <a:masterClrMapping/>
   </p:clrMapOvr>
+  <p:timing>
+    <p:tnLst>
+      <p:par>
+        <p:cTn id="1" dur="indefinite" restart="never" nodeType="tmRoot"/>
+      </p:par>
+    </p:tnLst>
+  </p:timing>
 </p:sld>
 </file>
 
@@ -22812,6 +23020,13 @@
   <p:clrMapOvr>
     <a:masterClrMapping/>
   </p:clrMapOvr>
+  <p:timing>
+    <p:tnLst>
+      <p:par>
+        <p:cTn id="1" dur="indefinite" restart="never" nodeType="tmRoot"/>
+      </p:par>
+    </p:tnLst>
+  </p:timing>
 </p:sld>
 </file>
 
@@ -23322,6 +23537,91 @@
           </a:p>
         </p:txBody>
       </p:sp>
+      <p:sp>
+        <p:nvSpPr>
+          <p:cNvPr id="12" name="Textfeld 11">
+            <a:extLst>
+              <a:ext uri="{FF2B5EF4-FFF2-40B4-BE49-F238E27FC236}">
+                <a16:creationId xmlns:a16="http://schemas.microsoft.com/office/drawing/2014/main" id="{B3C89B06-EE7D-44D8-A605-79603E5D69A5}"/>
+              </a:ext>
+            </a:extLst>
+          </p:cNvPr>
+          <p:cNvSpPr txBox="1"/>
+          <p:nvPr/>
+        </p:nvSpPr>
+        <p:spPr>
+          <a:xfrm>
+            <a:off x="1800291" y="4121977"/>
+            <a:ext cx="1710925" cy="523220"/>
+          </a:xfrm>
+          <a:prstGeom prst="rect">
+            <a:avLst/>
+          </a:prstGeom>
+          <a:noFill/>
+        </p:spPr>
+        <p:txBody>
+          <a:bodyPr wrap="square" rtlCol="0">
+            <a:spAutoFit/>
+          </a:bodyPr>
+          <a:lstStyle/>
+          <a:p>
+            <a:pPr algn="ctr"/>
+            <a:r>
+              <a:rPr lang="de-DE" sz="2800" dirty="0">
+                <a:solidFill>
+                  <a:schemeClr val="bg1"/>
+                </a:solidFill>
+              </a:rPr>
+              <a:t>Query</a:t>
+            </a:r>
+          </a:p>
+        </p:txBody>
+      </p:sp>
+      <p:sp>
+        <p:nvSpPr>
+          <p:cNvPr id="13" name="Textfeld 12">
+            <a:extLst>
+              <a:ext uri="{FF2B5EF4-FFF2-40B4-BE49-F238E27FC236}">
+                <a16:creationId xmlns:a16="http://schemas.microsoft.com/office/drawing/2014/main" id="{B3C89B06-EE7D-44D8-A605-79603E5D69A5}"/>
+              </a:ext>
+            </a:extLst>
+          </p:cNvPr>
+          <p:cNvSpPr txBox="1"/>
+          <p:nvPr/>
+        </p:nvSpPr>
+        <p:spPr>
+          <a:xfrm>
+            <a:off x="7433075" y="4121977"/>
+            <a:ext cx="1710925" cy="523220"/>
+          </a:xfrm>
+          <a:prstGeom prst="rect">
+            <a:avLst/>
+          </a:prstGeom>
+          <a:noFill/>
+        </p:spPr>
+        <p:txBody>
+          <a:bodyPr wrap="square" rtlCol="0">
+            <a:spAutoFit/>
+          </a:bodyPr>
+          <a:lstStyle/>
+          <a:p>
+            <a:pPr algn="ctr"/>
+            <a:r>
+              <a:rPr lang="de-DE" sz="2800" smtClean="0">
+                <a:solidFill>
+                  <a:schemeClr val="bg1"/>
+                </a:solidFill>
+              </a:rPr>
+              <a:t>Schema</a:t>
+            </a:r>
+            <a:endParaRPr lang="de-DE" sz="2800" dirty="0">
+              <a:solidFill>
+                <a:schemeClr val="bg1"/>
+              </a:solidFill>
+            </a:endParaRPr>
+          </a:p>
+        </p:txBody>
+      </p:sp>
     </p:spTree>
     <p:extLst>
       <p:ext uri="{BB962C8B-B14F-4D97-AF65-F5344CB8AC3E}">
@@ -23332,6 +23632,13 @@
   <p:clrMapOvr>
     <a:masterClrMapping/>
   </p:clrMapOvr>
+  <p:timing>
+    <p:tnLst>
+      <p:par>
+        <p:cTn id="1" dur="indefinite" restart="never" nodeType="tmRoot"/>
+      </p:par>
+    </p:tnLst>
+  </p:timing>
 </p:sld>
 </file>
 
@@ -23958,6 +24265,13 @@
   <p:clrMapOvr>
     <a:masterClrMapping/>
   </p:clrMapOvr>
+  <p:timing>
+    <p:tnLst>
+      <p:par>
+        <p:cTn id="1" dur="indefinite" restart="never" nodeType="tmRoot"/>
+      </p:par>
+    </p:tnLst>
+  </p:timing>
 </p:sld>
 </file>
 
@@ -24401,6 +24715,13 @@
   <p:clrMapOvr>
     <a:masterClrMapping/>
   </p:clrMapOvr>
+  <p:timing>
+    <p:tnLst>
+      <p:par>
+        <p:cTn id="1" dur="indefinite" restart="never" nodeType="tmRoot"/>
+      </p:par>
+    </p:tnLst>
+  </p:timing>
 </p:sld>
 </file>
 
@@ -24554,6 +24875,13 @@
   <p:clrMapOvr>
     <a:masterClrMapping/>
   </p:clrMapOvr>
+  <p:timing>
+    <p:tnLst>
+      <p:par>
+        <p:cTn id="1" dur="indefinite" restart="never" nodeType="tmRoot"/>
+      </p:par>
+    </p:tnLst>
+  </p:timing>
 </p:sld>
 </file>
 
@@ -24686,6 +25014,13 @@
   <p:clrMapOvr>
     <a:masterClrMapping/>
   </p:clrMapOvr>
+  <p:timing>
+    <p:tnLst>
+      <p:par>
+        <p:cTn id="1" dur="indefinite" restart="never" nodeType="tmRoot"/>
+      </p:par>
+    </p:tnLst>
+  </p:timing>
 </p:sld>
 </file>
 
@@ -24729,13 +25064,13 @@
           <p:nvPr/>
         </p:nvPicPr>
         <p:blipFill>
-          <a:blip r:embed="rId3">
+          <a:blip r:embed="rId3" cstate="hqprint">
             <a:extLst>
               <a:ext uri="{28A0092B-C50C-407E-A947-70E740481C1C}">
                 <a14:useLocalDpi xmlns:a14="http://schemas.microsoft.com/office/drawing/2010/main" val="0"/>
               </a:ext>
               <a:ext uri="{96DAC541-7B7A-43D3-8B79-37D633B846F1}">
-                <asvg:svgBlip xmlns:asvg="http://schemas.microsoft.com/office/drawing/2016/SVG/main" r:embed="rId4"/>
+                <asvg:svgBlip xmlns:asvg="http://schemas.microsoft.com/office/drawing/2016/SVG/main" xmlns="" r:embed="rId4"/>
               </a:ext>
             </a:extLst>
           </a:blip>
@@ -25668,6 +26003,13 @@
   <p:clrMapOvr>
     <a:masterClrMapping/>
   </p:clrMapOvr>
+  <p:timing>
+    <p:tnLst>
+      <p:par>
+        <p:cTn id="1" dur="indefinite" restart="never" nodeType="tmRoot"/>
+      </p:par>
+    </p:tnLst>
+  </p:timing>
 </p:sld>
 </file>
 
@@ -25710,7 +26052,7 @@
         </p:nvSpPr>
         <p:spPr>
           <a:xfrm>
-            <a:off x="2484234" y="2967335"/>
+            <a:off x="4065384" y="4377035"/>
             <a:ext cx="7223532" cy="923330"/>
           </a:xfrm>
           <a:prstGeom prst="rect">
@@ -25985,6 +26327,279 @@
           </a:p>
         </p:txBody>
       </p:sp>
+      <p:sp>
+        <p:nvSpPr>
+          <p:cNvPr id="5" name="Rechteck 4">
+            <a:extLst>
+              <a:ext uri="{FF2B5EF4-FFF2-40B4-BE49-F238E27FC236}">
+                <a16:creationId xmlns:a16="http://schemas.microsoft.com/office/drawing/2014/main" id="{5FD08E23-8BA9-4DA9-B317-140050312C18}"/>
+              </a:ext>
+            </a:extLst>
+          </p:cNvPr>
+          <p:cNvSpPr/>
+          <p:nvPr/>
+        </p:nvSpPr>
+        <p:spPr>
+          <a:xfrm>
+            <a:off x="4065384" y="2479390"/>
+            <a:ext cx="6096000" cy="923330"/>
+          </a:xfrm>
+          <a:prstGeom prst="rect">
+            <a:avLst/>
+          </a:prstGeom>
+        </p:spPr>
+        <p:txBody>
+          <a:bodyPr>
+            <a:spAutoFit/>
+          </a:bodyPr>
+          <a:lstStyle/>
+          <a:p>
+            <a:r>
+              <a:rPr lang="de-DE">
+                <a:solidFill>
+                  <a:srgbClr val="FF79C6"/>
+                </a:solidFill>
+                <a:latin typeface="Fira Code" panose="020B0509050000020004" pitchFamily="49" charset="0"/>
+              </a:rPr>
+              <a:t>type</a:t>
+            </a:r>
+            <a:r>
+              <a:rPr lang="de-DE">
+                <a:solidFill>
+                  <a:srgbClr val="F8F8F2"/>
+                </a:solidFill>
+                <a:latin typeface="Fira Code" panose="020B0509050000020004" pitchFamily="49" charset="0"/>
+              </a:rPr>
+              <a:t> </a:t>
+            </a:r>
+            <a:r>
+              <a:rPr lang="de-DE" i="1" smtClean="0">
+                <a:solidFill>
+                  <a:srgbClr val="8BE9FD"/>
+                </a:solidFill>
+                <a:latin typeface="Fira Code" panose="020B0509050000020004" pitchFamily="49" charset="0"/>
+              </a:rPr>
+              <a:t>Mutation</a:t>
+            </a:r>
+            <a:r>
+              <a:rPr lang="de-DE" smtClean="0">
+                <a:solidFill>
+                  <a:srgbClr val="F8F8F2"/>
+                </a:solidFill>
+                <a:latin typeface="Fira Code" panose="020B0509050000020004" pitchFamily="49" charset="0"/>
+              </a:rPr>
+              <a:t> </a:t>
+            </a:r>
+            <a:r>
+              <a:rPr lang="de-DE" dirty="0">
+                <a:solidFill>
+                  <a:srgbClr val="F8F8F2"/>
+                </a:solidFill>
+                <a:latin typeface="Fira Code" panose="020B0509050000020004" pitchFamily="49" charset="0"/>
+              </a:rPr>
+              <a:t>{</a:t>
+            </a:r>
+          </a:p>
+          <a:p>
+            <a:r>
+              <a:rPr lang="de-DE">
+                <a:solidFill>
+                  <a:srgbClr val="F8F8F2"/>
+                </a:solidFill>
+                <a:latin typeface="Fira Code" panose="020B0509050000020004" pitchFamily="49" charset="0"/>
+              </a:rPr>
+              <a:t>    </a:t>
+            </a:r>
+            <a:r>
+              <a:rPr lang="de-DE" smtClean="0">
+                <a:solidFill>
+                  <a:srgbClr val="F8F8F2"/>
+                </a:solidFill>
+                <a:latin typeface="Fira Code" panose="020B0509050000020004" pitchFamily="49" charset="0"/>
+              </a:rPr>
+              <a:t>createPost(post</a:t>
+            </a:r>
+            <a:r>
+              <a:rPr lang="de-DE" smtClean="0">
+                <a:solidFill>
+                  <a:srgbClr val="FF79C6"/>
+                </a:solidFill>
+                <a:latin typeface="Fira Code" panose="020B0509050000020004" pitchFamily="49" charset="0"/>
+              </a:rPr>
+              <a:t>:</a:t>
+            </a:r>
+            <a:r>
+              <a:rPr lang="de-DE" smtClean="0">
+                <a:solidFill>
+                  <a:srgbClr val="F8F8F2"/>
+                </a:solidFill>
+                <a:latin typeface="Fira Code" panose="020B0509050000020004" pitchFamily="49" charset="0"/>
+              </a:rPr>
+              <a:t> </a:t>
+            </a:r>
+            <a:r>
+              <a:rPr lang="de-DE" i="1" smtClean="0">
+                <a:solidFill>
+                  <a:srgbClr val="8BE9FD"/>
+                </a:solidFill>
+                <a:latin typeface="Fira Code" panose="020B0509050000020004" pitchFamily="49" charset="0"/>
+              </a:rPr>
+              <a:t>Post</a:t>
+            </a:r>
+            <a:r>
+              <a:rPr lang="de-DE" smtClean="0">
+                <a:solidFill>
+                  <a:srgbClr val="FF79C6"/>
+                </a:solidFill>
+                <a:latin typeface="Fira Code" panose="020B0509050000020004" pitchFamily="49" charset="0"/>
+              </a:rPr>
+              <a:t>!</a:t>
+            </a:r>
+            <a:r>
+              <a:rPr lang="de-DE" smtClean="0">
+                <a:solidFill>
+                  <a:srgbClr val="F8F8F2"/>
+                </a:solidFill>
+                <a:latin typeface="Fira Code" panose="020B0509050000020004" pitchFamily="49" charset="0"/>
+              </a:rPr>
+              <a:t>)</a:t>
+            </a:r>
+            <a:r>
+              <a:rPr lang="de-DE" smtClean="0">
+                <a:solidFill>
+                  <a:srgbClr val="FF79C6"/>
+                </a:solidFill>
+                <a:latin typeface="Fira Code" panose="020B0509050000020004" pitchFamily="49" charset="0"/>
+              </a:rPr>
+              <a:t>:</a:t>
+            </a:r>
+            <a:r>
+              <a:rPr lang="de-DE" smtClean="0">
+                <a:solidFill>
+                  <a:srgbClr val="F8F8F2"/>
+                </a:solidFill>
+                <a:latin typeface="Fira Code" panose="020B0509050000020004" pitchFamily="49" charset="0"/>
+              </a:rPr>
+              <a:t> </a:t>
+            </a:r>
+            <a:r>
+              <a:rPr lang="de-DE" i="1" smtClean="0">
+                <a:solidFill>
+                  <a:srgbClr val="8BE9FD"/>
+                </a:solidFill>
+                <a:latin typeface="Fira Code" panose="020B0509050000020004" pitchFamily="49" charset="0"/>
+              </a:rPr>
+              <a:t>Post</a:t>
+            </a:r>
+            <a:endParaRPr lang="de-DE" dirty="0">
+              <a:solidFill>
+                <a:srgbClr val="F8F8F2"/>
+              </a:solidFill>
+              <a:latin typeface="Fira Code" panose="020B0509050000020004" pitchFamily="49" charset="0"/>
+            </a:endParaRPr>
+          </a:p>
+          <a:p>
+            <a:r>
+              <a:rPr lang="de-DE" smtClean="0">
+                <a:solidFill>
+                  <a:srgbClr val="F8F8F2"/>
+                </a:solidFill>
+                <a:latin typeface="Fira Code" panose="020B0509050000020004" pitchFamily="49" charset="0"/>
+              </a:rPr>
+              <a:t>}</a:t>
+            </a:r>
+            <a:endParaRPr lang="de-DE" dirty="0">
+              <a:solidFill>
+                <a:srgbClr val="F8F8F2"/>
+              </a:solidFill>
+              <a:latin typeface="Fira Code" panose="020B0509050000020004" pitchFamily="49" charset="0"/>
+            </a:endParaRPr>
+          </a:p>
+        </p:txBody>
+      </p:sp>
+      <p:sp>
+        <p:nvSpPr>
+          <p:cNvPr id="6" name="Textfeld 5">
+            <a:extLst>
+              <a:ext uri="{FF2B5EF4-FFF2-40B4-BE49-F238E27FC236}">
+                <a16:creationId xmlns:a16="http://schemas.microsoft.com/office/drawing/2014/main" id="{B3C89B06-EE7D-44D8-A605-79603E5D69A5}"/>
+              </a:ext>
+            </a:extLst>
+          </p:cNvPr>
+          <p:cNvSpPr txBox="1"/>
+          <p:nvPr/>
+        </p:nvSpPr>
+        <p:spPr>
+          <a:xfrm>
+            <a:off x="1331705" y="4421687"/>
+            <a:ext cx="1710925" cy="523220"/>
+          </a:xfrm>
+          <a:prstGeom prst="rect">
+            <a:avLst/>
+          </a:prstGeom>
+          <a:noFill/>
+        </p:spPr>
+        <p:txBody>
+          <a:bodyPr wrap="square" rtlCol="0">
+            <a:spAutoFit/>
+          </a:bodyPr>
+          <a:lstStyle/>
+          <a:p>
+            <a:r>
+              <a:rPr lang="de-DE" sz="2800" dirty="0">
+                <a:solidFill>
+                  <a:schemeClr val="bg1"/>
+                </a:solidFill>
+              </a:rPr>
+              <a:t>Query</a:t>
+            </a:r>
+          </a:p>
+        </p:txBody>
+      </p:sp>
+      <p:sp>
+        <p:nvSpPr>
+          <p:cNvPr id="7" name="Textfeld 6">
+            <a:extLst>
+              <a:ext uri="{FF2B5EF4-FFF2-40B4-BE49-F238E27FC236}">
+                <a16:creationId xmlns:a16="http://schemas.microsoft.com/office/drawing/2014/main" id="{B3C89B06-EE7D-44D8-A605-79603E5D69A5}"/>
+              </a:ext>
+            </a:extLst>
+          </p:cNvPr>
+          <p:cNvSpPr txBox="1"/>
+          <p:nvPr/>
+        </p:nvSpPr>
+        <p:spPr>
+          <a:xfrm>
+            <a:off x="1331705" y="2594435"/>
+            <a:ext cx="1710925" cy="523220"/>
+          </a:xfrm>
+          <a:prstGeom prst="rect">
+            <a:avLst/>
+          </a:prstGeom>
+          <a:noFill/>
+        </p:spPr>
+        <p:txBody>
+          <a:bodyPr wrap="square" rtlCol="0">
+            <a:spAutoFit/>
+          </a:bodyPr>
+          <a:lstStyle/>
+          <a:p>
+            <a:r>
+              <a:rPr lang="de-DE" sz="2800" smtClean="0">
+                <a:solidFill>
+                  <a:schemeClr val="bg1"/>
+                </a:solidFill>
+              </a:rPr>
+              <a:t>Schema</a:t>
+            </a:r>
+            <a:endParaRPr lang="de-DE" sz="2800" dirty="0">
+              <a:solidFill>
+                <a:schemeClr val="bg1"/>
+              </a:solidFill>
+            </a:endParaRPr>
+          </a:p>
+        </p:txBody>
+      </p:sp>
     </p:spTree>
     <p:extLst>
       <p:ext uri="{BB962C8B-B14F-4D97-AF65-F5344CB8AC3E}">
@@ -25995,6 +26610,13 @@
   <p:clrMapOvr>
     <a:masterClrMapping/>
   </p:clrMapOvr>
+  <p:timing>
+    <p:tnLst>
+      <p:par>
+        <p:cTn id="1" dur="indefinite" restart="never" nodeType="tmRoot"/>
+      </p:par>
+    </p:tnLst>
+  </p:timing>
 </p:sld>
 </file>
 
@@ -26755,6 +27377,13 @@
   <p:clrMapOvr>
     <a:masterClrMapping/>
   </p:clrMapOvr>
+  <p:timing>
+    <p:tnLst>
+      <p:par>
+        <p:cTn id="1" dur="indefinite" restart="never" nodeType="tmRoot"/>
+      </p:par>
+    </p:tnLst>
+  </p:timing>
 </p:sld>
 </file>
 
@@ -27805,6 +28434,13 @@
   <p:clrMapOvr>
     <a:masterClrMapping/>
   </p:clrMapOvr>
+  <p:timing>
+    <p:tnLst>
+      <p:par>
+        <p:cTn id="1" dur="indefinite" restart="never" nodeType="tmRoot"/>
+      </p:par>
+    </p:tnLst>
+  </p:timing>
 </p:sld>
 </file>
 
@@ -27958,6 +28594,13 @@
   <p:clrMapOvr>
     <a:masterClrMapping/>
   </p:clrMapOvr>
+  <p:timing>
+    <p:tnLst>
+      <p:par>
+        <p:cTn id="1" dur="indefinite" restart="never" nodeType="tmRoot"/>
+      </p:par>
+    </p:tnLst>
+  </p:timing>
 </p:sld>
 </file>
 
@@ -28090,6 +28733,13 @@
   <p:clrMapOvr>
     <a:masterClrMapping/>
   </p:clrMapOvr>
+  <p:timing>
+    <p:tnLst>
+      <p:par>
+        <p:cTn id="1" dur="indefinite" restart="never" nodeType="tmRoot"/>
+      </p:par>
+    </p:tnLst>
+  </p:timing>
 </p:sld>
 </file>
 
@@ -28224,15 +28874,15 @@
         </p:nvSpPr>
         <p:spPr>
           <a:xfrm>
-            <a:off x="3048000" y="2136339"/>
-            <a:ext cx="6096000" cy="2585323"/>
+            <a:off x="1476375" y="2984064"/>
+            <a:ext cx="4124325" cy="2585323"/>
           </a:xfrm>
           <a:prstGeom prst="rect">
             <a:avLst/>
           </a:prstGeom>
         </p:spPr>
         <p:txBody>
-          <a:bodyPr>
+          <a:bodyPr wrap="square">
             <a:spAutoFit/>
           </a:bodyPr>
           <a:lstStyle/>
@@ -28439,6 +29089,236 @@
               </a:solidFill>
               <a:effectLst/>
               <a:latin typeface="Fira Code" panose="020B0509050000020004" pitchFamily="49" charset="0"/>
+            </a:endParaRPr>
+          </a:p>
+        </p:txBody>
+      </p:sp>
+      <p:sp>
+        <p:nvSpPr>
+          <p:cNvPr id="5" name="Rechteck 4">
+            <a:extLst>
+              <a:ext uri="{FF2B5EF4-FFF2-40B4-BE49-F238E27FC236}">
+                <a16:creationId xmlns:a16="http://schemas.microsoft.com/office/drawing/2014/main" id="{5FD08E23-8BA9-4DA9-B317-140050312C18}"/>
+              </a:ext>
+            </a:extLst>
+          </p:cNvPr>
+          <p:cNvSpPr/>
+          <p:nvPr/>
+        </p:nvSpPr>
+        <p:spPr>
+          <a:xfrm>
+            <a:off x="6894309" y="2984064"/>
+            <a:ext cx="4545216" cy="923330"/>
+          </a:xfrm>
+          <a:prstGeom prst="rect">
+            <a:avLst/>
+          </a:prstGeom>
+        </p:spPr>
+        <p:txBody>
+          <a:bodyPr wrap="square">
+            <a:spAutoFit/>
+          </a:bodyPr>
+          <a:lstStyle/>
+          <a:p>
+            <a:r>
+              <a:rPr lang="de-DE">
+                <a:solidFill>
+                  <a:srgbClr val="FF79C6"/>
+                </a:solidFill>
+                <a:latin typeface="Fira Code" panose="020B0509050000020004" pitchFamily="49" charset="0"/>
+              </a:rPr>
+              <a:t>type</a:t>
+            </a:r>
+            <a:r>
+              <a:rPr lang="de-DE">
+                <a:solidFill>
+                  <a:srgbClr val="F8F8F2"/>
+                </a:solidFill>
+                <a:latin typeface="Fira Code" panose="020B0509050000020004" pitchFamily="49" charset="0"/>
+              </a:rPr>
+              <a:t> </a:t>
+            </a:r>
+            <a:r>
+              <a:rPr lang="de-DE" i="1" smtClean="0">
+                <a:solidFill>
+                  <a:srgbClr val="8BE9FD"/>
+                </a:solidFill>
+                <a:latin typeface="Fira Code" panose="020B0509050000020004" pitchFamily="49" charset="0"/>
+              </a:rPr>
+              <a:t>Subscription</a:t>
+            </a:r>
+            <a:r>
+              <a:rPr lang="de-DE" smtClean="0">
+                <a:solidFill>
+                  <a:srgbClr val="F8F8F2"/>
+                </a:solidFill>
+                <a:latin typeface="Fira Code" panose="020B0509050000020004" pitchFamily="49" charset="0"/>
+              </a:rPr>
+              <a:t> </a:t>
+            </a:r>
+            <a:r>
+              <a:rPr lang="de-DE" dirty="0">
+                <a:solidFill>
+                  <a:srgbClr val="F8F8F2"/>
+                </a:solidFill>
+                <a:latin typeface="Fira Code" panose="020B0509050000020004" pitchFamily="49" charset="0"/>
+              </a:rPr>
+              <a:t>{</a:t>
+            </a:r>
+          </a:p>
+          <a:p>
+            <a:r>
+              <a:rPr lang="de-DE">
+                <a:solidFill>
+                  <a:srgbClr val="F8F8F2"/>
+                </a:solidFill>
+                <a:latin typeface="Fira Code" panose="020B0509050000020004" pitchFamily="49" charset="0"/>
+              </a:rPr>
+              <a:t>    </a:t>
+            </a:r>
+            <a:r>
+              <a:rPr lang="de-DE" smtClean="0">
+                <a:solidFill>
+                  <a:srgbClr val="F8F8F2"/>
+                </a:solidFill>
+                <a:latin typeface="Fira Code" panose="020B0509050000020004" pitchFamily="49" charset="0"/>
+              </a:rPr>
+              <a:t>postAdded</a:t>
+            </a:r>
+            <a:r>
+              <a:rPr lang="de-DE" smtClean="0">
+                <a:solidFill>
+                  <a:srgbClr val="FF79C6"/>
+                </a:solidFill>
+                <a:latin typeface="Fira Code" panose="020B0509050000020004" pitchFamily="49" charset="0"/>
+              </a:rPr>
+              <a:t>:</a:t>
+            </a:r>
+            <a:r>
+              <a:rPr lang="de-DE" smtClean="0">
+                <a:solidFill>
+                  <a:srgbClr val="F8F8F2"/>
+                </a:solidFill>
+                <a:latin typeface="Fira Code" panose="020B0509050000020004" pitchFamily="49" charset="0"/>
+              </a:rPr>
+              <a:t> </a:t>
+            </a:r>
+            <a:r>
+              <a:rPr lang="de-DE" i="1" smtClean="0">
+                <a:solidFill>
+                  <a:srgbClr val="8BE9FD"/>
+                </a:solidFill>
+                <a:latin typeface="Fira Code" panose="020B0509050000020004" pitchFamily="49" charset="0"/>
+              </a:rPr>
+              <a:t>Post</a:t>
+            </a:r>
+            <a:endParaRPr lang="de-DE" dirty="0">
+              <a:solidFill>
+                <a:srgbClr val="F8F8F2"/>
+              </a:solidFill>
+              <a:latin typeface="Fira Code" panose="020B0509050000020004" pitchFamily="49" charset="0"/>
+            </a:endParaRPr>
+          </a:p>
+          <a:p>
+            <a:r>
+              <a:rPr lang="de-DE" smtClean="0">
+                <a:solidFill>
+                  <a:srgbClr val="F8F8F2"/>
+                </a:solidFill>
+                <a:latin typeface="Fira Code" panose="020B0509050000020004" pitchFamily="49" charset="0"/>
+              </a:rPr>
+              <a:t>}</a:t>
+            </a:r>
+            <a:endParaRPr lang="de-DE" dirty="0">
+              <a:solidFill>
+                <a:srgbClr val="F8F8F2"/>
+              </a:solidFill>
+              <a:latin typeface="Fira Code" panose="020B0509050000020004" pitchFamily="49" charset="0"/>
+            </a:endParaRPr>
+          </a:p>
+        </p:txBody>
+      </p:sp>
+      <p:sp>
+        <p:nvSpPr>
+          <p:cNvPr id="6" name="Textfeld 5">
+            <a:extLst>
+              <a:ext uri="{FF2B5EF4-FFF2-40B4-BE49-F238E27FC236}">
+                <a16:creationId xmlns:a16="http://schemas.microsoft.com/office/drawing/2014/main" id="{B3C89B06-EE7D-44D8-A605-79603E5D69A5}"/>
+              </a:ext>
+            </a:extLst>
+          </p:cNvPr>
+          <p:cNvSpPr txBox="1"/>
+          <p:nvPr/>
+        </p:nvSpPr>
+        <p:spPr>
+          <a:xfrm>
+            <a:off x="1800291" y="2150302"/>
+            <a:ext cx="1710925" cy="523220"/>
+          </a:xfrm>
+          <a:prstGeom prst="rect">
+            <a:avLst/>
+          </a:prstGeom>
+          <a:noFill/>
+        </p:spPr>
+        <p:txBody>
+          <a:bodyPr wrap="square" rtlCol="0">
+            <a:spAutoFit/>
+          </a:bodyPr>
+          <a:lstStyle/>
+          <a:p>
+            <a:pPr algn="ctr"/>
+            <a:r>
+              <a:rPr lang="de-DE" sz="2800" dirty="0">
+                <a:solidFill>
+                  <a:schemeClr val="bg1"/>
+                </a:solidFill>
+              </a:rPr>
+              <a:t>Query</a:t>
+            </a:r>
+          </a:p>
+        </p:txBody>
+      </p:sp>
+      <p:sp>
+        <p:nvSpPr>
+          <p:cNvPr id="7" name="Textfeld 6">
+            <a:extLst>
+              <a:ext uri="{FF2B5EF4-FFF2-40B4-BE49-F238E27FC236}">
+                <a16:creationId xmlns:a16="http://schemas.microsoft.com/office/drawing/2014/main" id="{B3C89B06-EE7D-44D8-A605-79603E5D69A5}"/>
+              </a:ext>
+            </a:extLst>
+          </p:cNvPr>
+          <p:cNvSpPr txBox="1"/>
+          <p:nvPr/>
+        </p:nvSpPr>
+        <p:spPr>
+          <a:xfrm>
+            <a:off x="7433075" y="2150302"/>
+            <a:ext cx="1710925" cy="523220"/>
+          </a:xfrm>
+          <a:prstGeom prst="rect">
+            <a:avLst/>
+          </a:prstGeom>
+          <a:noFill/>
+        </p:spPr>
+        <p:txBody>
+          <a:bodyPr wrap="square" rtlCol="0">
+            <a:spAutoFit/>
+          </a:bodyPr>
+          <a:lstStyle/>
+          <a:p>
+            <a:pPr algn="ctr"/>
+            <a:r>
+              <a:rPr lang="de-DE" sz="2800" smtClean="0">
+                <a:solidFill>
+                  <a:schemeClr val="bg1"/>
+                </a:solidFill>
+              </a:rPr>
+              <a:t>Schema</a:t>
+            </a:r>
+            <a:endParaRPr lang="de-DE" sz="2800" dirty="0">
+              <a:solidFill>
+                <a:schemeClr val="bg1"/>
+              </a:solidFill>
             </a:endParaRPr>
           </a:p>
         </p:txBody>
@@ -28453,6 +29333,13 @@
   <p:clrMapOvr>
     <a:masterClrMapping/>
   </p:clrMapOvr>
+  <p:timing>
+    <p:tnLst>
+      <p:par>
+        <p:cTn id="1" dur="indefinite" restart="never" nodeType="tmRoot"/>
+      </p:par>
+    </p:tnLst>
+  </p:timing>
 </p:sld>
 </file>
 
@@ -28606,6 +29493,13 @@
   <p:clrMapOvr>
     <a:masterClrMapping/>
   </p:clrMapOvr>
+  <p:timing>
+    <p:tnLst>
+      <p:par>
+        <p:cTn id="1" dur="indefinite" restart="never" nodeType="tmRoot"/>
+      </p:par>
+    </p:tnLst>
+  </p:timing>
 </p:sld>
 </file>
 
@@ -29097,6 +29991,13 @@
   <p:clrMapOvr>
     <a:masterClrMapping/>
   </p:clrMapOvr>
+  <p:timing>
+    <p:tnLst>
+      <p:par>
+        <p:cTn id="1" dur="indefinite" restart="never" nodeType="tmRoot"/>
+      </p:par>
+    </p:tnLst>
+  </p:timing>
 </p:sld>
 </file>
 
@@ -30469,6 +31370,13 @@
   <p:clrMapOvr>
     <a:masterClrMapping/>
   </p:clrMapOvr>
+  <p:timing>
+    <p:tnLst>
+      <p:par>
+        <p:cTn id="1" dur="indefinite" restart="never" nodeType="tmRoot"/>
+      </p:par>
+    </p:tnLst>
+  </p:timing>
 </p:sld>
 </file>
 
@@ -30777,6 +31685,13 @@
   <p:clrMapOvr>
     <a:masterClrMapping/>
   </p:clrMapOvr>
+  <p:timing>
+    <p:tnLst>
+      <p:par>
+        <p:cTn id="1" dur="indefinite" restart="never" nodeType="tmRoot"/>
+      </p:par>
+    </p:tnLst>
+  </p:timing>
 </p:sld>
 </file>
 
@@ -31013,6 +31928,13 @@
   <p:clrMapOvr>
     <a:masterClrMapping/>
   </p:clrMapOvr>
+  <p:timing>
+    <p:tnLst>
+      <p:par>
+        <p:cTn id="1" dur="indefinite" restart="never" nodeType="tmRoot"/>
+      </p:par>
+    </p:tnLst>
+  </p:timing>
 </p:sld>
 </file>
 
@@ -31317,6 +32239,13 @@
   <p:clrMapOvr>
     <a:masterClrMapping/>
   </p:clrMapOvr>
+  <p:timing>
+    <p:tnLst>
+      <p:par>
+        <p:cTn id="1" dur="indefinite" restart="never" nodeType="tmRoot"/>
+      </p:par>
+    </p:tnLst>
+  </p:timing>
 </p:sld>
 </file>
 
@@ -31670,6 +32599,13 @@
   <p:clrMapOvr>
     <a:masterClrMapping/>
   </p:clrMapOvr>
+  <p:timing>
+    <p:tnLst>
+      <p:par>
+        <p:cTn id="1" dur="indefinite" restart="never" nodeType="tmRoot"/>
+      </p:par>
+    </p:tnLst>
+  </p:timing>
 </p:sld>
 </file>
 
@@ -32039,6 +32975,13 @@
   <p:clrMapOvr>
     <a:masterClrMapping/>
   </p:clrMapOvr>
+  <p:timing>
+    <p:tnLst>
+      <p:par>
+        <p:cTn id="1" dur="indefinite" restart="never" nodeType="tmRoot"/>
+      </p:par>
+    </p:tnLst>
+  </p:timing>
 </p:sld>
 </file>
 
@@ -32216,6 +33159,13 @@
   <p:clrMapOvr>
     <a:masterClrMapping/>
   </p:clrMapOvr>
+  <p:timing>
+    <p:tnLst>
+      <p:par>
+        <p:cTn id="1" dur="indefinite" restart="never" nodeType="tmRoot"/>
+      </p:par>
+    </p:tnLst>
+  </p:timing>
 </p:sld>
 </file>
 
@@ -32384,7 +33334,7 @@
                 <a:hlinkClick r:id="rId4">
                   <a:extLst>
                     <a:ext uri="{A12FA001-AC4F-418D-AE19-62706E023703}">
-                      <ahyp:hlinkClr xmlns:ahyp="http://schemas.microsoft.com/office/drawing/2018/hyperlinkcolor" val="tx"/>
+                      <ahyp:hlinkClr xmlns:ahyp="http://schemas.microsoft.com/office/drawing/2018/hyperlinkcolor" xmlns="" val="tx"/>
                     </a:ext>
                   </a:extLst>
                 </a:hlinkClick>
@@ -32434,7 +33384,7 @@
                 <a:hlinkClick r:id="rId5">
                   <a:extLst>
                     <a:ext uri="{A12FA001-AC4F-418D-AE19-62706E023703}">
-                      <ahyp:hlinkClr xmlns:ahyp="http://schemas.microsoft.com/office/drawing/2018/hyperlinkcolor" val="tx"/>
+                      <ahyp:hlinkClr xmlns:ahyp="http://schemas.microsoft.com/office/drawing/2018/hyperlinkcolor" xmlns="" val="tx"/>
                     </a:ext>
                   </a:extLst>
                 </a:hlinkClick>
@@ -32484,7 +33434,7 @@
                 <a:hlinkClick r:id="rId6">
                   <a:extLst>
                     <a:ext uri="{A12FA001-AC4F-418D-AE19-62706E023703}">
-                      <ahyp:hlinkClr xmlns:ahyp="http://schemas.microsoft.com/office/drawing/2018/hyperlinkcolor" val="tx"/>
+                      <ahyp:hlinkClr xmlns:ahyp="http://schemas.microsoft.com/office/drawing/2018/hyperlinkcolor" xmlns="" val="tx"/>
                     </a:ext>
                   </a:extLst>
                 </a:hlinkClick>
@@ -32534,7 +33484,7 @@
                 <a:hlinkClick r:id="rId7">
                   <a:extLst>
                     <a:ext uri="{A12FA001-AC4F-418D-AE19-62706E023703}">
-                      <ahyp:hlinkClr xmlns:ahyp="http://schemas.microsoft.com/office/drawing/2018/hyperlinkcolor" val="tx"/>
+                      <ahyp:hlinkClr xmlns:ahyp="http://schemas.microsoft.com/office/drawing/2018/hyperlinkcolor" xmlns="" val="tx"/>
                     </a:ext>
                   </a:extLst>
                 </a:hlinkClick>
@@ -32559,6 +33509,13 @@
   <p:clrMapOvr>
     <a:masterClrMapping/>
   </p:clrMapOvr>
+  <p:timing>
+    <p:tnLst>
+      <p:par>
+        <p:cTn id="1" dur="indefinite" restart="never" nodeType="tmRoot"/>
+      </p:par>
+    </p:tnLst>
+  </p:timing>
 </p:sld>
 </file>
 
@@ -32623,6 +33580,14 @@
               </a:rPr>
               <a:t>Credits</a:t>
             </a:r>
+            <a:r>
+              <a:rPr lang="de-DE" dirty="0">
+                <a:solidFill>
+                  <a:schemeClr val="bg1"/>
+                </a:solidFill>
+              </a:rPr>
+              <a:t/>
+            </a:r>
             <a:br>
               <a:rPr lang="de-DE" dirty="0">
                 <a:solidFill>
@@ -32630,6 +33595,14 @@
                 </a:solidFill>
               </a:rPr>
             </a:br>
+            <a:r>
+              <a:rPr lang="de-DE" dirty="0">
+                <a:solidFill>
+                  <a:schemeClr val="bg1"/>
+                </a:solidFill>
+              </a:rPr>
+              <a:t/>
+            </a:r>
             <a:br>
               <a:rPr lang="de-DE" dirty="0">
                 <a:solidFill>
@@ -32652,6 +33625,14 @@
                 </a:solidFill>
               </a:rPr>
               <a:t>:</a:t>
+            </a:r>
+            <a:r>
+              <a:rPr lang="de-DE" dirty="0">
+                <a:solidFill>
+                  <a:schemeClr val="bg1"/>
+                </a:solidFill>
+              </a:rPr>
+              <a:t/>
             </a:r>
             <a:br>
               <a:rPr lang="de-DE" dirty="0">
@@ -32808,6 +33789,13 @@
   <p:clrMapOvr>
     <a:masterClrMapping/>
   </p:clrMapOvr>
+  <p:timing>
+    <p:tnLst>
+      <p:par>
+        <p:cTn id="1" dur="indefinite" restart="never" nodeType="tmRoot"/>
+      </p:par>
+    </p:tnLst>
+  </p:timing>
 </p:sld>
 </file>
 
@@ -33309,6 +34297,13 @@
   <p:clrMapOvr>
     <a:masterClrMapping/>
   </p:clrMapOvr>
+  <p:timing>
+    <p:tnLst>
+      <p:par>
+        <p:cTn id="1" dur="indefinite" restart="never" nodeType="tmRoot"/>
+      </p:par>
+    </p:tnLst>
+  </p:timing>
 </p:sld>
 </file>
 
@@ -33712,7 +34707,7 @@
                 <a:hlinkClick r:id="rId2">
                   <a:extLst>
                     <a:ext uri="{A12FA001-AC4F-418D-AE19-62706E023703}">
-                      <ahyp:hlinkClr xmlns:ahyp="http://schemas.microsoft.com/office/drawing/2018/hyperlinkcolor" val="tx"/>
+                      <ahyp:hlinkClr xmlns:ahyp="http://schemas.microsoft.com/office/drawing/2018/hyperlinkcolor" xmlns="" val="tx"/>
                     </a:ext>
                   </a:extLst>
                 </a:hlinkClick>
@@ -33742,13 +34737,13 @@
           <p:nvPr/>
         </p:nvPicPr>
         <p:blipFill>
-          <a:blip r:embed="rId3">
+          <a:blip r:embed="rId3" cstate="hqprint">
             <a:extLst>
               <a:ext uri="{28A0092B-C50C-407E-A947-70E740481C1C}">
                 <a14:useLocalDpi xmlns:a14="http://schemas.microsoft.com/office/drawing/2010/main" val="0"/>
               </a:ext>
               <a:ext uri="{96DAC541-7B7A-43D3-8B79-37D633B846F1}">
-                <asvg:svgBlip xmlns:asvg="http://schemas.microsoft.com/office/drawing/2016/SVG/main" r:embed="rId4"/>
+                <asvg:svgBlip xmlns:asvg="http://schemas.microsoft.com/office/drawing/2016/SVG/main" xmlns="" r:embed="rId4"/>
               </a:ext>
             </a:extLst>
           </a:blip>
@@ -33801,7 +34796,7 @@
                 <a:hlinkClick r:id="rId5">
                   <a:extLst>
                     <a:ext uri="{A12FA001-AC4F-418D-AE19-62706E023703}">
-                      <ahyp:hlinkClr xmlns:ahyp="http://schemas.microsoft.com/office/drawing/2018/hyperlinkcolor" val="tx"/>
+                      <ahyp:hlinkClr xmlns:ahyp="http://schemas.microsoft.com/office/drawing/2018/hyperlinkcolor" xmlns="" val="tx"/>
                     </a:ext>
                   </a:extLst>
                 </a:hlinkClick>
@@ -33831,13 +34826,13 @@
           <p:nvPr/>
         </p:nvPicPr>
         <p:blipFill>
-          <a:blip r:embed="rId6">
+          <a:blip r:embed="rId6" cstate="hqprint">
             <a:extLst>
               <a:ext uri="{28A0092B-C50C-407E-A947-70E740481C1C}">
                 <a14:useLocalDpi xmlns:a14="http://schemas.microsoft.com/office/drawing/2010/main" val="0"/>
               </a:ext>
               <a:ext uri="{96DAC541-7B7A-43D3-8B79-37D633B846F1}">
-                <asvg:svgBlip xmlns:asvg="http://schemas.microsoft.com/office/drawing/2016/SVG/main" r:embed="rId7"/>
+                <asvg:svgBlip xmlns:asvg="http://schemas.microsoft.com/office/drawing/2016/SVG/main" xmlns="" r:embed="rId7"/>
               </a:ext>
             </a:extLst>
           </a:blip>
@@ -33870,13 +34865,13 @@
           <p:nvPr/>
         </p:nvPicPr>
         <p:blipFill>
-          <a:blip r:embed="rId8">
+          <a:blip r:embed="rId8" cstate="hqprint">
             <a:extLst>
               <a:ext uri="{28A0092B-C50C-407E-A947-70E740481C1C}">
                 <a14:useLocalDpi xmlns:a14="http://schemas.microsoft.com/office/drawing/2010/main" val="0"/>
               </a:ext>
               <a:ext uri="{96DAC541-7B7A-43D3-8B79-37D633B846F1}">
-                <asvg:svgBlip xmlns:asvg="http://schemas.microsoft.com/office/drawing/2016/SVG/main" r:embed="rId9"/>
+                <asvg:svgBlip xmlns:asvg="http://schemas.microsoft.com/office/drawing/2016/SVG/main" xmlns="" r:embed="rId9"/>
               </a:ext>
             </a:extLst>
           </a:blip>
@@ -33909,13 +34904,13 @@
           <p:nvPr/>
         </p:nvPicPr>
         <p:blipFill>
-          <a:blip r:embed="rId10">
+          <a:blip r:embed="rId10" cstate="hqprint">
             <a:extLst>
               <a:ext uri="{28A0092B-C50C-407E-A947-70E740481C1C}">
                 <a14:useLocalDpi xmlns:a14="http://schemas.microsoft.com/office/drawing/2010/main" val="0"/>
               </a:ext>
               <a:ext uri="{96DAC541-7B7A-43D3-8B79-37D633B846F1}">
-                <asvg:svgBlip xmlns:asvg="http://schemas.microsoft.com/office/drawing/2016/SVG/main" r:embed="rId11"/>
+                <asvg:svgBlip xmlns:asvg="http://schemas.microsoft.com/office/drawing/2016/SVG/main" xmlns="" r:embed="rId11"/>
               </a:ext>
             </a:extLst>
           </a:blip>
@@ -33948,13 +34943,13 @@
           <p:nvPr/>
         </p:nvPicPr>
         <p:blipFill>
-          <a:blip r:embed="rId12">
+          <a:blip r:embed="rId12" cstate="hqprint">
             <a:extLst>
               <a:ext uri="{28A0092B-C50C-407E-A947-70E740481C1C}">
                 <a14:useLocalDpi xmlns:a14="http://schemas.microsoft.com/office/drawing/2010/main" val="0"/>
               </a:ext>
               <a:ext uri="{96DAC541-7B7A-43D3-8B79-37D633B846F1}">
-                <asvg:svgBlip xmlns:asvg="http://schemas.microsoft.com/office/drawing/2016/SVG/main" r:embed="rId13"/>
+                <asvg:svgBlip xmlns:asvg="http://schemas.microsoft.com/office/drawing/2016/SVG/main" xmlns="" r:embed="rId13"/>
               </a:ext>
             </a:extLst>
           </a:blip>
@@ -34444,13 +35439,13 @@
           <p:nvPr/>
         </p:nvPicPr>
         <p:blipFill>
-          <a:blip r:embed="rId3">
+          <a:blip r:embed="rId3" cstate="hqprint">
             <a:extLst>
               <a:ext uri="{28A0092B-C50C-407E-A947-70E740481C1C}">
                 <a14:useLocalDpi xmlns:a14="http://schemas.microsoft.com/office/drawing/2010/main" val="0"/>
               </a:ext>
               <a:ext uri="{96DAC541-7B7A-43D3-8B79-37D633B846F1}">
-                <asvg:svgBlip xmlns:asvg="http://schemas.microsoft.com/office/drawing/2016/SVG/main" r:embed="rId4"/>
+                <asvg:svgBlip xmlns:asvg="http://schemas.microsoft.com/office/drawing/2016/SVG/main" xmlns="" r:embed="rId4"/>
               </a:ext>
             </a:extLst>
           </a:blip>
@@ -35168,6 +36163,13 @@
   <p:clrMapOvr>
     <a:masterClrMapping/>
   </p:clrMapOvr>
+  <p:timing>
+    <p:tnLst>
+      <p:par>
+        <p:cTn id="1" dur="indefinite" restart="never" nodeType="tmRoot"/>
+      </p:par>
+    </p:tnLst>
+  </p:timing>
 </p:sld>
 </file>
 

</xml_diff>

<commit_message>
change last colors in slides
</commit_message>
<xml_diff>
--- a/slides/GraphqlSlides.pptx
+++ b/slides/GraphqlSlides.pptx
@@ -255,7 +255,7 @@
           <a:p>
             <a:fld id="{858036E5-7FF6-491F-BDEF-E833DBCA9680}" type="datetimeFigureOut">
               <a:rPr lang="de-DE" smtClean="0"/>
-              <a:t>04.04.2019</a:t>
+              <a:t>05.04.2019</a:t>
             </a:fld>
             <a:endParaRPr lang="de-DE"/>
           </a:p>
@@ -566,10 +566,7 @@
           <a:bodyPr/>
           <a:lstStyle/>
           <a:p>
-            <a:r>
-              <a:rPr lang="de-DE" dirty="0"/>
-              <a:t>TODO: Überschriften!!!</a:t>
-            </a:r>
+            <a:endParaRPr lang="de-DE" dirty="0"/>
           </a:p>
         </p:txBody>
       </p:sp>
@@ -4149,7 +4146,7 @@
           <a:p>
             <a:fld id="{3A538C34-53B0-4EA9-8596-22F17B12308D}" type="datetimeFigureOut">
               <a:rPr lang="de-DE" smtClean="0"/>
-              <a:t>04.04.2019</a:t>
+              <a:t>05.04.2019</a:t>
             </a:fld>
             <a:endParaRPr lang="de-DE"/>
           </a:p>
@@ -4347,7 +4344,7 @@
           <a:p>
             <a:fld id="{3A538C34-53B0-4EA9-8596-22F17B12308D}" type="datetimeFigureOut">
               <a:rPr lang="de-DE" smtClean="0"/>
-              <a:t>04.04.2019</a:t>
+              <a:t>05.04.2019</a:t>
             </a:fld>
             <a:endParaRPr lang="de-DE"/>
           </a:p>
@@ -4555,7 +4552,7 @@
           <a:p>
             <a:fld id="{3A538C34-53B0-4EA9-8596-22F17B12308D}" type="datetimeFigureOut">
               <a:rPr lang="de-DE" smtClean="0"/>
-              <a:t>04.04.2019</a:t>
+              <a:t>05.04.2019</a:t>
             </a:fld>
             <a:endParaRPr lang="de-DE"/>
           </a:p>
@@ -4753,7 +4750,7 @@
           <a:p>
             <a:fld id="{3A538C34-53B0-4EA9-8596-22F17B12308D}" type="datetimeFigureOut">
               <a:rPr lang="de-DE" smtClean="0"/>
-              <a:t>04.04.2019</a:t>
+              <a:t>05.04.2019</a:t>
             </a:fld>
             <a:endParaRPr lang="de-DE"/>
           </a:p>
@@ -5028,7 +5025,7 @@
           <a:p>
             <a:fld id="{3A538C34-53B0-4EA9-8596-22F17B12308D}" type="datetimeFigureOut">
               <a:rPr lang="de-DE" smtClean="0"/>
-              <a:t>04.04.2019</a:t>
+              <a:t>05.04.2019</a:t>
             </a:fld>
             <a:endParaRPr lang="de-DE"/>
           </a:p>
@@ -5293,7 +5290,7 @@
           <a:p>
             <a:fld id="{3A538C34-53B0-4EA9-8596-22F17B12308D}" type="datetimeFigureOut">
               <a:rPr lang="de-DE" smtClean="0"/>
-              <a:t>04.04.2019</a:t>
+              <a:t>05.04.2019</a:t>
             </a:fld>
             <a:endParaRPr lang="de-DE"/>
           </a:p>
@@ -5705,7 +5702,7 @@
           <a:p>
             <a:fld id="{3A538C34-53B0-4EA9-8596-22F17B12308D}" type="datetimeFigureOut">
               <a:rPr lang="de-DE" smtClean="0"/>
-              <a:t>04.04.2019</a:t>
+              <a:t>05.04.2019</a:t>
             </a:fld>
             <a:endParaRPr lang="de-DE"/>
           </a:p>
@@ -5846,7 +5843,7 @@
           <a:p>
             <a:fld id="{3A538C34-53B0-4EA9-8596-22F17B12308D}" type="datetimeFigureOut">
               <a:rPr lang="de-DE" smtClean="0"/>
-              <a:t>04.04.2019</a:t>
+              <a:t>05.04.2019</a:t>
             </a:fld>
             <a:endParaRPr lang="de-DE"/>
           </a:p>
@@ -5959,7 +5956,7 @@
           <a:p>
             <a:fld id="{3A538C34-53B0-4EA9-8596-22F17B12308D}" type="datetimeFigureOut">
               <a:rPr lang="de-DE" smtClean="0"/>
-              <a:t>04.04.2019</a:t>
+              <a:t>05.04.2019</a:t>
             </a:fld>
             <a:endParaRPr lang="de-DE"/>
           </a:p>
@@ -6270,7 +6267,7 @@
           <a:p>
             <a:fld id="{3A538C34-53B0-4EA9-8596-22F17B12308D}" type="datetimeFigureOut">
               <a:rPr lang="de-DE" smtClean="0"/>
-              <a:t>04.04.2019</a:t>
+              <a:t>05.04.2019</a:t>
             </a:fld>
             <a:endParaRPr lang="de-DE"/>
           </a:p>
@@ -6558,7 +6555,7 @@
           <a:p>
             <a:fld id="{3A538C34-53B0-4EA9-8596-22F17B12308D}" type="datetimeFigureOut">
               <a:rPr lang="de-DE" smtClean="0"/>
-              <a:t>04.04.2019</a:t>
+              <a:t>05.04.2019</a:t>
             </a:fld>
             <a:endParaRPr lang="de-DE"/>
           </a:p>
@@ -6799,7 +6796,7 @@
           <a:p>
             <a:fld id="{3A538C34-53B0-4EA9-8596-22F17B12308D}" type="datetimeFigureOut">
               <a:rPr lang="de-DE" smtClean="0"/>
-              <a:t>04.04.2019</a:t>
+              <a:t>05.04.2019</a:t>
             </a:fld>
             <a:endParaRPr lang="de-DE"/>
           </a:p>
@@ -17285,7 +17282,7 @@
         </p:nvSpPr>
         <p:spPr>
           <a:xfrm>
-            <a:off x="2558845" y="3201837"/>
+            <a:off x="2558845" y="3168244"/>
             <a:ext cx="1629613" cy="369332"/>
           </a:xfrm>
           <a:prstGeom prst="rect">
@@ -17909,7 +17906,7 @@
           <a:noFill/>
           <a:ln w="12700" cap="flat" cmpd="sng" algn="ctr">
             <a:solidFill>
-              <a:srgbClr val="FFB86C"/>
+              <a:srgbClr val="B1108E"/>
             </a:solidFill>
             <a:prstDash val="solid"/>
             <a:round/>
@@ -17939,7 +17936,7 @@
             <a:r>
               <a:rPr lang="de-DE" dirty="0">
                 <a:solidFill>
-                  <a:srgbClr val="FFB86C"/>
+                  <a:srgbClr val="B1108E"/>
                 </a:solidFill>
               </a:rPr>
               <a:t>Arguments</a:t>
@@ -17971,7 +17968,7 @@
           </a:prstGeom>
           <a:ln w="12700">
             <a:solidFill>
-              <a:srgbClr val="FFB86C"/>
+              <a:srgbClr val="B1108E"/>
             </a:solidFill>
             <a:tailEnd type="triangle"/>
           </a:ln>
@@ -18015,7 +18012,7 @@
           </a:prstGeom>
           <a:ln w="12700">
             <a:solidFill>
-              <a:srgbClr val="FFB86C"/>
+              <a:srgbClr val="B1108E"/>
             </a:solidFill>
             <a:tailEnd type="triangle"/>
           </a:ln>
@@ -19184,7 +19181,7 @@
             <a:r>
               <a:rPr lang="de-DE" dirty="0" err="1">
                 <a:solidFill>
-                  <a:srgbClr val="FF79C6"/>
+                  <a:srgbClr val="7B30D0"/>
                 </a:solidFill>
                 <a:latin typeface="Fira Code" panose="020B0509050000020004" pitchFamily="49" charset="0"/>
               </a:rPr>
@@ -19193,7 +19190,7 @@
             <a:r>
               <a:rPr lang="de-DE" dirty="0">
                 <a:solidFill>
-                  <a:srgbClr val="F8F8F2"/>
+                  <a:srgbClr val="236EBF"/>
                 </a:solidFill>
                 <a:latin typeface="Fira Code" panose="020B0509050000020004" pitchFamily="49" charset="0"/>
               </a:rPr>
@@ -19202,7 +19199,7 @@
             <a:r>
               <a:rPr lang="de-DE" dirty="0" err="1">
                 <a:solidFill>
-                  <a:srgbClr val="50FA7B"/>
+                  <a:srgbClr val="B1108E"/>
                 </a:solidFill>
                 <a:latin typeface="Fira Code" panose="020B0509050000020004" pitchFamily="49" charset="0"/>
               </a:rPr>
@@ -19211,25 +19208,25 @@
             <a:r>
               <a:rPr lang="de-DE" dirty="0">
                 <a:solidFill>
-                  <a:srgbClr val="F8F8F2"/>
+                  <a:srgbClr val="236EBF"/>
                 </a:solidFill>
                 <a:latin typeface="Fira Code" panose="020B0509050000020004" pitchFamily="49" charset="0"/>
               </a:rPr>
               <a:t>(</a:t>
             </a:r>
             <a:r>
-              <a:rPr lang="de-DE" i="1" dirty="0">
-                <a:solidFill>
-                  <a:srgbClr val="FFB86C"/>
+              <a:rPr lang="de-DE" dirty="0">
+                <a:solidFill>
+                  <a:srgbClr val="B1108E"/>
                 </a:solidFill>
                 <a:latin typeface="Fira Code" panose="020B0509050000020004" pitchFamily="49" charset="0"/>
               </a:rPr>
               <a:t>$</a:t>
             </a:r>
             <a:r>
-              <a:rPr lang="de-DE" i="1" dirty="0" err="1">
-                <a:solidFill>
-                  <a:srgbClr val="FFB86C"/>
+              <a:rPr lang="de-DE" dirty="0" err="1">
+                <a:solidFill>
+                  <a:srgbClr val="B1108E"/>
                 </a:solidFill>
                 <a:latin typeface="Fira Code" panose="020B0509050000020004" pitchFamily="49" charset="0"/>
               </a:rPr>
@@ -19238,119 +19235,110 @@
             <a:r>
               <a:rPr lang="de-DE" dirty="0">
                 <a:solidFill>
-                  <a:srgbClr val="FF79C6"/>
-                </a:solidFill>
-                <a:latin typeface="Fira Code" panose="020B0509050000020004" pitchFamily="49" charset="0"/>
-              </a:rPr>
-              <a:t>:</a:t>
+                  <a:srgbClr val="236EBF"/>
+                </a:solidFill>
+                <a:latin typeface="Fira Code" panose="020B0509050000020004" pitchFamily="49" charset="0"/>
+              </a:rPr>
+              <a:t>: </a:t>
+            </a:r>
+            <a:r>
+              <a:rPr lang="de-DE" dirty="0" err="1">
+                <a:solidFill>
+                  <a:srgbClr val="DC3EB7"/>
+                </a:solidFill>
+                <a:latin typeface="Fira Code" panose="020B0509050000020004" pitchFamily="49" charset="0"/>
+              </a:rPr>
+              <a:t>PostInput</a:t>
             </a:r>
             <a:r>
               <a:rPr lang="de-DE" dirty="0">
                 <a:solidFill>
-                  <a:srgbClr val="F8F8F2"/>
-                </a:solidFill>
-                <a:latin typeface="Fira Code" panose="020B0509050000020004" pitchFamily="49" charset="0"/>
-              </a:rPr>
-              <a:t> </a:t>
-            </a:r>
-            <a:r>
-              <a:rPr lang="de-DE" i="1" dirty="0" err="1">
-                <a:solidFill>
-                  <a:srgbClr val="8BE9FD"/>
-                </a:solidFill>
-                <a:latin typeface="Fira Code" panose="020B0509050000020004" pitchFamily="49" charset="0"/>
-              </a:rPr>
-              <a:t>PostInput</a:t>
-            </a:r>
+                  <a:srgbClr val="236EBF"/>
+                </a:solidFill>
+                <a:latin typeface="Fira Code" panose="020B0509050000020004" pitchFamily="49" charset="0"/>
+              </a:rPr>
+              <a:t>) {</a:t>
+            </a:r>
+          </a:p>
+          <a:p>
             <a:r>
               <a:rPr lang="de-DE" dirty="0">
                 <a:solidFill>
-                  <a:srgbClr val="F8F8F2"/>
-                </a:solidFill>
-                <a:latin typeface="Fira Code" panose="020B0509050000020004" pitchFamily="49" charset="0"/>
-              </a:rPr>
-              <a:t>) {</a:t>
-            </a:r>
-          </a:p>
-          <a:p>
+                  <a:srgbClr val="2F86D2"/>
+                </a:solidFill>
+                <a:latin typeface="Fira Code" panose="020B0509050000020004" pitchFamily="49" charset="0"/>
+              </a:rPr>
+              <a:t>  </a:t>
+            </a:r>
+            <a:r>
+              <a:rPr lang="de-DE" dirty="0" err="1">
+                <a:solidFill>
+                  <a:srgbClr val="2F86D2"/>
+                </a:solidFill>
+                <a:latin typeface="Fira Code" panose="020B0509050000020004" pitchFamily="49" charset="0"/>
+              </a:rPr>
+              <a:t>createPost</a:t>
+            </a:r>
             <a:r>
               <a:rPr lang="de-DE" dirty="0">
                 <a:solidFill>
-                  <a:srgbClr val="F1FA8C"/>
-                </a:solidFill>
-                <a:latin typeface="Fira Code" panose="020B0509050000020004" pitchFamily="49" charset="0"/>
-              </a:rPr>
-              <a:t>  </a:t>
+                  <a:srgbClr val="236EBF"/>
+                </a:solidFill>
+                <a:latin typeface="Fira Code" panose="020B0509050000020004" pitchFamily="49" charset="0"/>
+              </a:rPr>
+              <a:t>(</a:t>
             </a:r>
             <a:r>
               <a:rPr lang="de-DE" dirty="0" err="1">
                 <a:solidFill>
-                  <a:srgbClr val="F1FA8C"/>
-                </a:solidFill>
-                <a:latin typeface="Fira Code" panose="020B0509050000020004" pitchFamily="49" charset="0"/>
-              </a:rPr>
-              <a:t>createPost</a:t>
+                  <a:srgbClr val="B1108E"/>
+                </a:solidFill>
+                <a:latin typeface="Fira Code" panose="020B0509050000020004" pitchFamily="49" charset="0"/>
+              </a:rPr>
+              <a:t>post</a:t>
             </a:r>
             <a:r>
               <a:rPr lang="de-DE" dirty="0">
                 <a:solidFill>
-                  <a:srgbClr val="F8F8F2"/>
-                </a:solidFill>
-                <a:latin typeface="Fira Code" panose="020B0509050000020004" pitchFamily="49" charset="0"/>
-              </a:rPr>
-              <a:t>(</a:t>
-            </a:r>
-            <a:r>
-              <a:rPr lang="de-DE" i="1" dirty="0" err="1">
-                <a:solidFill>
-                  <a:srgbClr val="FFB86C"/>
-                </a:solidFill>
-                <a:latin typeface="Fira Code" panose="020B0509050000020004" pitchFamily="49" charset="0"/>
-              </a:rPr>
-              <a:t>post</a:t>
+                  <a:srgbClr val="236EBF"/>
+                </a:solidFill>
+                <a:latin typeface="Fira Code" panose="020B0509050000020004" pitchFamily="49" charset="0"/>
+              </a:rPr>
+              <a:t>: </a:t>
             </a:r>
             <a:r>
               <a:rPr lang="de-DE" dirty="0">
                 <a:solidFill>
-                  <a:srgbClr val="FF79C6"/>
-                </a:solidFill>
-                <a:latin typeface="Fira Code" panose="020B0509050000020004" pitchFamily="49" charset="0"/>
-              </a:rPr>
-              <a:t>:</a:t>
+                  <a:srgbClr val="2F86D2"/>
+                </a:solidFill>
+                <a:latin typeface="Fira Code" panose="020B0509050000020004" pitchFamily="49" charset="0"/>
+              </a:rPr>
+              <a:t>$</a:t>
+            </a:r>
+            <a:r>
+              <a:rPr lang="de-DE" dirty="0" err="1">
+                <a:solidFill>
+                  <a:srgbClr val="2F86D2"/>
+                </a:solidFill>
+                <a:latin typeface="Fira Code" panose="020B0509050000020004" pitchFamily="49" charset="0"/>
+              </a:rPr>
+              <a:t>newPost</a:t>
             </a:r>
             <a:r>
               <a:rPr lang="de-DE" dirty="0">
                 <a:solidFill>
-                  <a:srgbClr val="F8F8F2"/>
-                </a:solidFill>
-                <a:latin typeface="Fira Code" panose="020B0509050000020004" pitchFamily="49" charset="0"/>
-              </a:rPr>
-              <a:t> $</a:t>
-            </a:r>
-            <a:r>
-              <a:rPr lang="de-DE" dirty="0" err="1">
-                <a:solidFill>
-                  <a:srgbClr val="F8F8F2"/>
-                </a:solidFill>
-                <a:latin typeface="Fira Code" panose="020B0509050000020004" pitchFamily="49" charset="0"/>
-              </a:rPr>
-              <a:t>newPost</a:t>
-            </a:r>
+                  <a:srgbClr val="236EBF"/>
+                </a:solidFill>
+                <a:latin typeface="Fira Code" panose="020B0509050000020004" pitchFamily="49" charset="0"/>
+              </a:rPr>
+              <a:t>)</a:t>
+            </a:r>
+          </a:p>
+          <a:p>
             <a:r>
               <a:rPr lang="de-DE" dirty="0">
                 <a:solidFill>
-                  <a:srgbClr val="F8F8F2"/>
-                </a:solidFill>
-                <a:latin typeface="Fira Code" panose="020B0509050000020004" pitchFamily="49" charset="0"/>
-              </a:rPr>
-              <a:t>)</a:t>
-            </a:r>
-          </a:p>
-          <a:p>
-            <a:r>
-              <a:rPr lang="de-DE" dirty="0">
-                <a:solidFill>
-                  <a:srgbClr val="F8F8F2"/>
+                  <a:srgbClr val="236EBF"/>
                 </a:solidFill>
                 <a:latin typeface="Fira Code" panose="020B0509050000020004" pitchFamily="49" charset="0"/>
               </a:rPr>
@@ -19467,128 +19455,119 @@
           <a:lstStyle/>
           <a:p>
             <a:r>
-              <a:rPr lang="de-DE">
-                <a:solidFill>
-                  <a:srgbClr val="FF79C6"/>
+              <a:rPr lang="de-DE" dirty="0">
+                <a:solidFill>
+                  <a:srgbClr val="7B30D0"/>
                 </a:solidFill>
                 <a:latin typeface="Fira Code" panose="020B0509050000020004" pitchFamily="49" charset="0"/>
               </a:rPr>
               <a:t>type</a:t>
             </a:r>
             <a:r>
-              <a:rPr lang="de-DE">
-                <a:solidFill>
-                  <a:srgbClr val="F8F8F2"/>
+              <a:rPr lang="de-DE" dirty="0">
+                <a:solidFill>
+                  <a:srgbClr val="236EBF"/>
                 </a:solidFill>
                 <a:latin typeface="Fira Code" panose="020B0509050000020004" pitchFamily="49" charset="0"/>
               </a:rPr>
               <a:t> </a:t>
             </a:r>
             <a:r>
-              <a:rPr lang="de-DE" i="1">
-                <a:solidFill>
-                  <a:srgbClr val="8BE9FD"/>
+              <a:rPr lang="de-DE" dirty="0">
+                <a:solidFill>
+                  <a:srgbClr val="DC3EB7"/>
                 </a:solidFill>
                 <a:latin typeface="Fira Code" panose="020B0509050000020004" pitchFamily="49" charset="0"/>
               </a:rPr>
               <a:t>Mutation</a:t>
             </a:r>
             <a:r>
-              <a:rPr lang="de-DE">
-                <a:solidFill>
-                  <a:srgbClr val="F8F8F2"/>
-                </a:solidFill>
-                <a:latin typeface="Fira Code" panose="020B0509050000020004" pitchFamily="49" charset="0"/>
-              </a:rPr>
-              <a:t> </a:t>
-            </a:r>
-            <a:r>
               <a:rPr lang="de-DE" dirty="0">
                 <a:solidFill>
-                  <a:srgbClr val="F8F8F2"/>
-                </a:solidFill>
-                <a:latin typeface="Fira Code" panose="020B0509050000020004" pitchFamily="49" charset="0"/>
-              </a:rPr>
-              <a:t>{</a:t>
-            </a:r>
-          </a:p>
-          <a:p>
-            <a:r>
-              <a:rPr lang="de-DE">
-                <a:solidFill>
-                  <a:srgbClr val="F8F8F2"/>
-                </a:solidFill>
-                <a:latin typeface="Fira Code" panose="020B0509050000020004" pitchFamily="49" charset="0"/>
-              </a:rPr>
-              <a:t>    createPost(post</a:t>
-            </a:r>
-            <a:r>
-              <a:rPr lang="de-DE">
-                <a:solidFill>
-                  <a:srgbClr val="FF79C6"/>
-                </a:solidFill>
-                <a:latin typeface="Fira Code" panose="020B0509050000020004" pitchFamily="49" charset="0"/>
-              </a:rPr>
-              <a:t>:</a:t>
-            </a:r>
-            <a:r>
-              <a:rPr lang="de-DE">
-                <a:solidFill>
-                  <a:srgbClr val="F8F8F2"/>
-                </a:solidFill>
-                <a:latin typeface="Fira Code" panose="020B0509050000020004" pitchFamily="49" charset="0"/>
-              </a:rPr>
-              <a:t> </a:t>
-            </a:r>
-            <a:r>
-              <a:rPr lang="de-DE" i="1">
-                <a:solidFill>
-                  <a:srgbClr val="8BE9FD"/>
+                  <a:srgbClr val="236EBF"/>
+                </a:solidFill>
+                <a:latin typeface="Fira Code" panose="020B0509050000020004" pitchFamily="49" charset="0"/>
+              </a:rPr>
+              <a:t> {</a:t>
+            </a:r>
+          </a:p>
+          <a:p>
+            <a:r>
+              <a:rPr lang="de-DE" dirty="0">
+                <a:solidFill>
+                  <a:srgbClr val="2F86D2"/>
+                </a:solidFill>
+                <a:latin typeface="Fira Code" panose="020B0509050000020004" pitchFamily="49" charset="0"/>
+              </a:rPr>
+              <a:t>  </a:t>
+            </a:r>
+            <a:r>
+              <a:rPr lang="de-DE" dirty="0" err="1">
+                <a:solidFill>
+                  <a:srgbClr val="2F86D2"/>
+                </a:solidFill>
+                <a:latin typeface="Fira Code" panose="020B0509050000020004" pitchFamily="49" charset="0"/>
+              </a:rPr>
+              <a:t>createPost</a:t>
+            </a:r>
+            <a:r>
+              <a:rPr lang="de-DE" dirty="0">
+                <a:solidFill>
+                  <a:srgbClr val="236EBF"/>
+                </a:solidFill>
+                <a:latin typeface="Fira Code" panose="020B0509050000020004" pitchFamily="49" charset="0"/>
+              </a:rPr>
+              <a:t>(</a:t>
+            </a:r>
+            <a:r>
+              <a:rPr lang="de-DE" dirty="0" err="1">
+                <a:solidFill>
+                  <a:srgbClr val="B1108E"/>
+                </a:solidFill>
+                <a:latin typeface="Fira Code" panose="020B0509050000020004" pitchFamily="49" charset="0"/>
+              </a:rPr>
+              <a:t>post</a:t>
+            </a:r>
+            <a:r>
+              <a:rPr lang="de-DE" dirty="0">
+                <a:solidFill>
+                  <a:srgbClr val="236EBF"/>
+                </a:solidFill>
+                <a:latin typeface="Fira Code" panose="020B0509050000020004" pitchFamily="49" charset="0"/>
+              </a:rPr>
+              <a:t>: </a:t>
+            </a:r>
+            <a:r>
+              <a:rPr lang="de-DE" dirty="0">
+                <a:solidFill>
+                  <a:srgbClr val="DC3EB7"/>
                 </a:solidFill>
                 <a:latin typeface="Fira Code" panose="020B0509050000020004" pitchFamily="49" charset="0"/>
               </a:rPr>
               <a:t>Post</a:t>
             </a:r>
             <a:r>
-              <a:rPr lang="de-DE">
-                <a:solidFill>
-                  <a:srgbClr val="FF79C6"/>
+              <a:rPr lang="de-DE" dirty="0">
+                <a:solidFill>
+                  <a:srgbClr val="7B30D0"/>
                 </a:solidFill>
                 <a:latin typeface="Fira Code" panose="020B0509050000020004" pitchFamily="49" charset="0"/>
               </a:rPr>
               <a:t>!</a:t>
             </a:r>
             <a:r>
-              <a:rPr lang="de-DE">
-                <a:solidFill>
-                  <a:srgbClr val="F8F8F2"/>
-                </a:solidFill>
-                <a:latin typeface="Fira Code" panose="020B0509050000020004" pitchFamily="49" charset="0"/>
-              </a:rPr>
-              <a:t>)</a:t>
-            </a:r>
-            <a:r>
-              <a:rPr lang="de-DE">
-                <a:solidFill>
-                  <a:srgbClr val="FF79C6"/>
-                </a:solidFill>
-                <a:latin typeface="Fira Code" panose="020B0509050000020004" pitchFamily="49" charset="0"/>
-              </a:rPr>
-              <a:t>:</a:t>
-            </a:r>
-            <a:r>
-              <a:rPr lang="de-DE">
-                <a:solidFill>
-                  <a:srgbClr val="F8F8F2"/>
-                </a:solidFill>
-                <a:latin typeface="Fira Code" panose="020B0509050000020004" pitchFamily="49" charset="0"/>
-              </a:rPr>
-              <a:t> </a:t>
-            </a:r>
-            <a:r>
-              <a:rPr lang="de-DE" i="1">
-                <a:solidFill>
-                  <a:srgbClr val="8BE9FD"/>
+              <a:rPr lang="de-DE" dirty="0">
+                <a:solidFill>
+                  <a:srgbClr val="236EBF"/>
+                </a:solidFill>
+                <a:latin typeface="Fira Code" panose="020B0509050000020004" pitchFamily="49" charset="0"/>
+              </a:rPr>
+              <a:t>): </a:t>
+            </a:r>
+            <a:r>
+              <a:rPr lang="de-DE" dirty="0">
+                <a:solidFill>
+                  <a:srgbClr val="DC3EB7"/>
                 </a:solidFill>
                 <a:latin typeface="Fira Code" panose="020B0509050000020004" pitchFamily="49" charset="0"/>
               </a:rPr>
@@ -19596,27 +19575,21 @@
             </a:r>
             <a:endParaRPr lang="de-DE" dirty="0">
               <a:solidFill>
-                <a:srgbClr val="F8F8F2"/>
+                <a:srgbClr val="236EBF"/>
               </a:solidFill>
               <a:latin typeface="Fira Code" panose="020B0509050000020004" pitchFamily="49" charset="0"/>
             </a:endParaRPr>
           </a:p>
           <a:p>
             <a:r>
-              <a:rPr lang="de-DE">
-                <a:solidFill>
-                  <a:srgbClr val="F8F8F2"/>
+              <a:rPr lang="de-DE" dirty="0">
+                <a:solidFill>
+                  <a:srgbClr val="236EBF"/>
                 </a:solidFill>
                 <a:latin typeface="Fira Code" panose="020B0509050000020004" pitchFamily="49" charset="0"/>
               </a:rPr>
               <a:t>}</a:t>
             </a:r>
-            <a:endParaRPr lang="de-DE" dirty="0">
-              <a:solidFill>
-                <a:srgbClr val="F8F8F2"/>
-              </a:solidFill>
-              <a:latin typeface="Fira Code" panose="020B0509050000020004" pitchFamily="49" charset="0"/>
-            </a:endParaRPr>
           </a:p>
         </p:txBody>
       </p:sp>
@@ -19759,7 +19732,7 @@
             <a:r>
               <a:rPr lang="de-DE" dirty="0" err="1">
                 <a:solidFill>
-                  <a:srgbClr val="FF79C6"/>
+                  <a:srgbClr val="7B30D0"/>
                 </a:solidFill>
                 <a:latin typeface="Fira Code" panose="020B0509050000020004" pitchFamily="49" charset="0"/>
               </a:rPr>
@@ -19768,7 +19741,7 @@
             <a:r>
               <a:rPr lang="de-DE" dirty="0">
                 <a:solidFill>
-                  <a:srgbClr val="F8F8F2"/>
+                  <a:srgbClr val="236EBF"/>
                 </a:solidFill>
                 <a:latin typeface="Fira Code" panose="020B0509050000020004" pitchFamily="49" charset="0"/>
               </a:rPr>
@@ -19777,7 +19750,7 @@
             <a:r>
               <a:rPr lang="de-DE" dirty="0" err="1">
                 <a:solidFill>
-                  <a:srgbClr val="50FA7B"/>
+                  <a:srgbClr val="B1108E"/>
                 </a:solidFill>
                 <a:latin typeface="Fira Code" panose="020B0509050000020004" pitchFamily="49" charset="0"/>
               </a:rPr>
@@ -19786,25 +19759,25 @@
             <a:r>
               <a:rPr lang="de-DE" dirty="0">
                 <a:solidFill>
-                  <a:srgbClr val="F8F8F2"/>
+                  <a:srgbClr val="236EBF"/>
                 </a:solidFill>
                 <a:latin typeface="Fira Code" panose="020B0509050000020004" pitchFamily="49" charset="0"/>
               </a:rPr>
               <a:t>(</a:t>
             </a:r>
             <a:r>
-              <a:rPr lang="de-DE" i="1" dirty="0">
-                <a:solidFill>
-                  <a:srgbClr val="FFB86C"/>
+              <a:rPr lang="de-DE" dirty="0">
+                <a:solidFill>
+                  <a:srgbClr val="B1108E"/>
                 </a:solidFill>
                 <a:latin typeface="Fira Code" panose="020B0509050000020004" pitchFamily="49" charset="0"/>
               </a:rPr>
               <a:t>$</a:t>
             </a:r>
             <a:r>
-              <a:rPr lang="de-DE" i="1" dirty="0" err="1">
-                <a:solidFill>
-                  <a:srgbClr val="FFB86C"/>
+              <a:rPr lang="de-DE" dirty="0" err="1">
+                <a:solidFill>
+                  <a:srgbClr val="B1108E"/>
                 </a:solidFill>
                 <a:latin typeface="Fira Code" panose="020B0509050000020004" pitchFamily="49" charset="0"/>
               </a:rPr>
@@ -19813,34 +19786,25 @@
             <a:r>
               <a:rPr lang="de-DE" dirty="0">
                 <a:solidFill>
-                  <a:srgbClr val="FF79C6"/>
-                </a:solidFill>
-                <a:latin typeface="Fira Code" panose="020B0509050000020004" pitchFamily="49" charset="0"/>
-              </a:rPr>
-              <a:t>:</a:t>
+                  <a:srgbClr val="236EBF"/>
+                </a:solidFill>
+                <a:latin typeface="Fira Code" panose="020B0509050000020004" pitchFamily="49" charset="0"/>
+              </a:rPr>
+              <a:t>: </a:t>
+            </a:r>
+            <a:r>
+              <a:rPr lang="de-DE" dirty="0" err="1">
+                <a:solidFill>
+                  <a:srgbClr val="DC3EB7"/>
+                </a:solidFill>
+                <a:latin typeface="Fira Code" panose="020B0509050000020004" pitchFamily="49" charset="0"/>
+              </a:rPr>
+              <a:t>PostInput</a:t>
             </a:r>
             <a:r>
               <a:rPr lang="de-DE" dirty="0">
                 <a:solidFill>
-                  <a:srgbClr val="F8F8F2"/>
-                </a:solidFill>
-                <a:latin typeface="Fira Code" panose="020B0509050000020004" pitchFamily="49" charset="0"/>
-              </a:rPr>
-              <a:t> </a:t>
-            </a:r>
-            <a:r>
-              <a:rPr lang="de-DE" i="1" dirty="0" err="1">
-                <a:solidFill>
-                  <a:srgbClr val="8BE9FD"/>
-                </a:solidFill>
-                <a:latin typeface="Fira Code" panose="020B0509050000020004" pitchFamily="49" charset="0"/>
-              </a:rPr>
-              <a:t>PostInput</a:t>
-            </a:r>
-            <a:r>
-              <a:rPr lang="de-DE" i="1" dirty="0">
-                <a:solidFill>
-                  <a:srgbClr val="8BE9FD"/>
+                  <a:srgbClr val="7B30D0"/>
                 </a:solidFill>
                 <a:latin typeface="Fira Code" panose="020B0509050000020004" pitchFamily="49" charset="0"/>
               </a:rPr>
@@ -19849,7 +19813,7 @@
             <a:r>
               <a:rPr lang="de-DE" dirty="0">
                 <a:solidFill>
-                  <a:srgbClr val="F8F8F2"/>
+                  <a:srgbClr val="236EBF"/>
                 </a:solidFill>
                 <a:latin typeface="Fira Code" panose="020B0509050000020004" pitchFamily="49" charset="0"/>
               </a:rPr>
@@ -19860,7 +19824,7 @@
             <a:r>
               <a:rPr lang="de-DE" dirty="0">
                 <a:solidFill>
-                  <a:srgbClr val="F1FA8C"/>
+                  <a:srgbClr val="2F86D2"/>
                 </a:solidFill>
                 <a:latin typeface="Fira Code" panose="020B0509050000020004" pitchFamily="49" charset="0"/>
               </a:rPr>
@@ -19869,7 +19833,7 @@
             <a:r>
               <a:rPr lang="de-DE" dirty="0" err="1">
                 <a:solidFill>
-                  <a:srgbClr val="F1FA8C"/>
+                  <a:srgbClr val="2F86D2"/>
                 </a:solidFill>
                 <a:latin typeface="Fira Code" panose="020B0509050000020004" pitchFamily="49" charset="0"/>
               </a:rPr>
@@ -19878,16 +19842,16 @@
             <a:r>
               <a:rPr lang="de-DE" dirty="0">
                 <a:solidFill>
-                  <a:srgbClr val="F8F8F2"/>
+                  <a:srgbClr val="236EBF"/>
                 </a:solidFill>
                 <a:latin typeface="Fira Code" panose="020B0509050000020004" pitchFamily="49" charset="0"/>
               </a:rPr>
               <a:t>(</a:t>
             </a:r>
             <a:r>
-              <a:rPr lang="de-DE" i="1" dirty="0" err="1">
-                <a:solidFill>
-                  <a:srgbClr val="FFB86C"/>
+              <a:rPr lang="de-DE" dirty="0" err="1">
+                <a:solidFill>
+                  <a:srgbClr val="B1108E"/>
                 </a:solidFill>
                 <a:latin typeface="Fira Code" panose="020B0509050000020004" pitchFamily="49" charset="0"/>
               </a:rPr>
@@ -19896,25 +19860,25 @@
             <a:r>
               <a:rPr lang="de-DE" dirty="0">
                 <a:solidFill>
-                  <a:srgbClr val="FF79C6"/>
-                </a:solidFill>
-                <a:latin typeface="Fira Code" panose="020B0509050000020004" pitchFamily="49" charset="0"/>
-              </a:rPr>
-              <a:t>:</a:t>
+                  <a:srgbClr val="236EBF"/>
+                </a:solidFill>
+                <a:latin typeface="Fira Code" panose="020B0509050000020004" pitchFamily="49" charset="0"/>
+              </a:rPr>
+              <a:t>: </a:t>
             </a:r>
             <a:r>
               <a:rPr lang="de-DE" dirty="0">
                 <a:solidFill>
-                  <a:srgbClr val="F8F8F2"/>
-                </a:solidFill>
-                <a:latin typeface="Fira Code" panose="020B0509050000020004" pitchFamily="49" charset="0"/>
-              </a:rPr>
-              <a:t> $</a:t>
+                  <a:srgbClr val="2F86D2"/>
+                </a:solidFill>
+                <a:latin typeface="Fira Code" panose="020B0509050000020004" pitchFamily="49" charset="0"/>
+              </a:rPr>
+              <a:t>$</a:t>
             </a:r>
             <a:r>
               <a:rPr lang="de-DE" dirty="0" err="1">
                 <a:solidFill>
-                  <a:srgbClr val="F8F8F2"/>
+                  <a:srgbClr val="2F86D2"/>
                 </a:solidFill>
                 <a:latin typeface="Fira Code" panose="020B0509050000020004" pitchFamily="49" charset="0"/>
               </a:rPr>
@@ -19923,7 +19887,7 @@
             <a:r>
               <a:rPr lang="de-DE" dirty="0">
                 <a:solidFill>
-                  <a:srgbClr val="F8F8F2"/>
+                  <a:srgbClr val="236EBF"/>
                 </a:solidFill>
                 <a:latin typeface="Fira Code" panose="020B0509050000020004" pitchFamily="49" charset="0"/>
               </a:rPr>
@@ -19934,7 +19898,7 @@
             <a:r>
               <a:rPr lang="de-DE" dirty="0">
                 <a:solidFill>
-                  <a:srgbClr val="F8F8F2"/>
+                  <a:srgbClr val="2F86D2"/>
                 </a:solidFill>
                 <a:latin typeface="Fira Code" panose="020B0509050000020004" pitchFamily="49" charset="0"/>
               </a:rPr>
@@ -19943,7 +19907,7 @@
             <a:r>
               <a:rPr lang="de-DE" dirty="0" err="1">
                 <a:solidFill>
-                  <a:srgbClr val="F1FA8C"/>
+                  <a:srgbClr val="2F86D2"/>
                 </a:solidFill>
                 <a:latin typeface="Fira Code" panose="020B0509050000020004" pitchFamily="49" charset="0"/>
               </a:rPr>
@@ -19951,7 +19915,7 @@
             </a:r>
             <a:endParaRPr lang="de-DE" dirty="0">
               <a:solidFill>
-                <a:srgbClr val="F1FA8C"/>
+                <a:srgbClr val="236EBF"/>
               </a:solidFill>
               <a:latin typeface="Fira Code" panose="020B0509050000020004" pitchFamily="49" charset="0"/>
             </a:endParaRPr>
@@ -19960,7 +19924,7 @@
             <a:r>
               <a:rPr lang="de-DE" dirty="0">
                 <a:solidFill>
-                  <a:srgbClr val="F8F8F2"/>
+                  <a:srgbClr val="236EBF"/>
                 </a:solidFill>
                 <a:latin typeface="Fira Code" panose="020B0509050000020004" pitchFamily="49" charset="0"/>
               </a:rPr>
@@ -19971,7 +19935,7 @@
             <a:r>
               <a:rPr lang="de-DE" dirty="0">
                 <a:solidFill>
-                  <a:srgbClr val="F8F8F2"/>
+                  <a:srgbClr val="236EBF"/>
                 </a:solidFill>
                 <a:latin typeface="Fira Code" panose="020B0509050000020004" pitchFamily="49" charset="0"/>
               </a:rPr>
@@ -20010,7 +19974,7 @@
             <a:r>
               <a:rPr lang="en-US" dirty="0">
                 <a:solidFill>
-                  <a:srgbClr val="F8F8F2"/>
+                  <a:srgbClr val="236EBF"/>
                 </a:solidFill>
                 <a:latin typeface="Fira Code" panose="020B0509050000020004" pitchFamily="49" charset="0"/>
               </a:rPr>
@@ -20021,7 +19985,7 @@
             <a:r>
               <a:rPr lang="en-US" dirty="0">
                 <a:solidFill>
-                  <a:srgbClr val="8BE9FE"/>
+                  <a:srgbClr val="DC3EB7"/>
                 </a:solidFill>
                 <a:latin typeface="Fira Code" panose="020B0509050000020004" pitchFamily="49" charset="0"/>
               </a:rPr>
@@ -20030,7 +19994,7 @@
             <a:r>
               <a:rPr lang="en-US" dirty="0" err="1">
                 <a:solidFill>
-                  <a:srgbClr val="8BE9FD"/>
+                  <a:srgbClr val="DC3EB7"/>
                 </a:solidFill>
                 <a:latin typeface="Fira Code" panose="020B0509050000020004" pitchFamily="49" charset="0"/>
               </a:rPr>
@@ -20039,7 +20003,7 @@
             <a:r>
               <a:rPr lang="en-US" dirty="0">
                 <a:solidFill>
-                  <a:srgbClr val="8BE9FE"/>
+                  <a:srgbClr val="DC3EB7"/>
                 </a:solidFill>
                 <a:latin typeface="Fira Code" panose="020B0509050000020004" pitchFamily="49" charset="0"/>
               </a:rPr>
@@ -20048,45 +20012,112 @@
             <a:r>
               <a:rPr lang="en-US" dirty="0">
                 <a:solidFill>
-                  <a:srgbClr val="FF79C6"/>
-                </a:solidFill>
-                <a:latin typeface="Fira Code" panose="020B0509050000020004" pitchFamily="49" charset="0"/>
-              </a:rPr>
-              <a:t>:</a:t>
-            </a:r>
+                  <a:srgbClr val="236EBF"/>
+                </a:solidFill>
+                <a:latin typeface="Fira Code" panose="020B0509050000020004" pitchFamily="49" charset="0"/>
+              </a:rPr>
+              <a:t>: {</a:t>
+            </a:r>
+          </a:p>
+          <a:p>
             <a:r>
               <a:rPr lang="en-US" dirty="0">
                 <a:solidFill>
-                  <a:srgbClr val="F8F8F2"/>
-                </a:solidFill>
-                <a:latin typeface="Fira Code" panose="020B0509050000020004" pitchFamily="49" charset="0"/>
-              </a:rPr>
-              <a:t> {</a:t>
-            </a:r>
-          </a:p>
-          <a:p>
+                  <a:srgbClr val="DC3EB7"/>
+                </a:solidFill>
+                <a:latin typeface="Fira Code" panose="020B0509050000020004" pitchFamily="49" charset="0"/>
+              </a:rPr>
+              <a:t>    "title"</a:t>
+            </a:r>
             <a:r>
               <a:rPr lang="en-US" dirty="0">
                 <a:solidFill>
-                  <a:srgbClr val="8BE9FE"/>
-                </a:solidFill>
-                <a:latin typeface="Fira Code" panose="020B0509050000020004" pitchFamily="49" charset="0"/>
-              </a:rPr>
-              <a:t>    “</a:t>
+                  <a:srgbClr val="236EBF"/>
+                </a:solidFill>
+                <a:latin typeface="Fira Code" panose="020B0509050000020004" pitchFamily="49" charset="0"/>
+              </a:rPr>
+              <a:t>: </a:t>
             </a:r>
             <a:r>
               <a:rPr lang="en-US" dirty="0">
                 <a:solidFill>
-                  <a:srgbClr val="8BE9FD"/>
-                </a:solidFill>
-                <a:latin typeface="Fira Code" panose="020B0509050000020004" pitchFamily="49" charset="0"/>
-              </a:rPr>
-              <a:t>title</a:t>
+                  <a:srgbClr val="00820F"/>
+                </a:solidFill>
+                <a:latin typeface="Fira Code" panose="020B0509050000020004" pitchFamily="49" charset="0"/>
+              </a:rPr>
+              <a:t>"new title"</a:t>
             </a:r>
             <a:r>
               <a:rPr lang="en-US" dirty="0">
                 <a:solidFill>
-                  <a:srgbClr val="8BE9FE"/>
+                  <a:srgbClr val="236EBF"/>
+                </a:solidFill>
+                <a:latin typeface="Fira Code" panose="020B0509050000020004" pitchFamily="49" charset="0"/>
+              </a:rPr>
+              <a:t>,</a:t>
+            </a:r>
+          </a:p>
+          <a:p>
+            <a:r>
+              <a:rPr lang="en-US" dirty="0">
+                <a:solidFill>
+                  <a:srgbClr val="DC3EB7"/>
+                </a:solidFill>
+                <a:latin typeface="Fira Code" panose="020B0509050000020004" pitchFamily="49" charset="0"/>
+              </a:rPr>
+              <a:t>    "content"</a:t>
+            </a:r>
+            <a:r>
+              <a:rPr lang="en-US" dirty="0">
+                <a:solidFill>
+                  <a:srgbClr val="236EBF"/>
+                </a:solidFill>
+                <a:latin typeface="Fira Code" panose="020B0509050000020004" pitchFamily="49" charset="0"/>
+              </a:rPr>
+              <a:t>: </a:t>
+            </a:r>
+            <a:r>
+              <a:rPr lang="en-US" dirty="0">
+                <a:solidFill>
+                  <a:srgbClr val="00820F"/>
+                </a:solidFill>
+                <a:latin typeface="Fira Code" panose="020B0509050000020004" pitchFamily="49" charset="0"/>
+              </a:rPr>
+              <a:t>"new content"</a:t>
+            </a:r>
+            <a:r>
+              <a:rPr lang="en-US" dirty="0">
+                <a:solidFill>
+                  <a:srgbClr val="236EBF"/>
+                </a:solidFill>
+                <a:latin typeface="Fira Code" panose="020B0509050000020004" pitchFamily="49" charset="0"/>
+              </a:rPr>
+              <a:t>,</a:t>
+            </a:r>
+          </a:p>
+          <a:p>
+            <a:r>
+              <a:rPr lang="en-US" dirty="0">
+                <a:solidFill>
+                  <a:srgbClr val="DC3EB7"/>
+                </a:solidFill>
+                <a:latin typeface="Fira Code" panose="020B0509050000020004" pitchFamily="49" charset="0"/>
+              </a:rPr>
+              <a:t>    "</a:t>
+            </a:r>
+            <a:r>
+              <a:rPr lang="en-US" dirty="0" err="1">
+                <a:solidFill>
+                  <a:srgbClr val="DC3EB7"/>
+                </a:solidFill>
+                <a:latin typeface="Fira Code" panose="020B0509050000020004" pitchFamily="49" charset="0"/>
+              </a:rPr>
+              <a:t>author_id</a:t>
+            </a:r>
+            <a:r>
+              <a:rPr lang="en-US" dirty="0">
+                <a:solidFill>
+                  <a:srgbClr val="DC3EB7"/>
                 </a:solidFill>
                 <a:latin typeface="Fira Code" panose="020B0509050000020004" pitchFamily="49" charset="0"/>
               </a:rPr>
@@ -20095,191 +20126,16 @@
             <a:r>
               <a:rPr lang="en-US" dirty="0">
                 <a:solidFill>
-                  <a:srgbClr val="FF79C6"/>
-                </a:solidFill>
-                <a:latin typeface="Fira Code" panose="020B0509050000020004" pitchFamily="49" charset="0"/>
-              </a:rPr>
-              <a:t>:</a:t>
+                  <a:srgbClr val="236EBF"/>
+                </a:solidFill>
+                <a:latin typeface="Fira Code" panose="020B0509050000020004" pitchFamily="49" charset="0"/>
+              </a:rPr>
+              <a:t>: </a:t>
             </a:r>
             <a:r>
               <a:rPr lang="en-US" dirty="0">
                 <a:solidFill>
-                  <a:srgbClr val="F8F8F2"/>
-                </a:solidFill>
-                <a:latin typeface="Fira Code" panose="020B0509050000020004" pitchFamily="49" charset="0"/>
-              </a:rPr>
-              <a:t> </a:t>
-            </a:r>
-            <a:r>
-              <a:rPr lang="en-US" dirty="0">
-                <a:solidFill>
-                  <a:srgbClr val="E9F284"/>
-                </a:solidFill>
-                <a:latin typeface="Fira Code" panose="020B0509050000020004" pitchFamily="49" charset="0"/>
-              </a:rPr>
-              <a:t>"new </a:t>
-            </a:r>
-            <a:r>
-              <a:rPr lang="en-US" dirty="0">
-                <a:solidFill>
-                  <a:srgbClr val="F1FA8C"/>
-                </a:solidFill>
-                <a:latin typeface="Fira Code" panose="020B0509050000020004" pitchFamily="49" charset="0"/>
-              </a:rPr>
-              <a:t>title</a:t>
-            </a:r>
-            <a:r>
-              <a:rPr lang="en-US" dirty="0">
-                <a:solidFill>
-                  <a:srgbClr val="E9F284"/>
-                </a:solidFill>
-                <a:latin typeface="Fira Code" panose="020B0509050000020004" pitchFamily="49" charset="0"/>
-              </a:rPr>
-              <a:t>"</a:t>
-            </a:r>
-            <a:r>
-              <a:rPr lang="en-US" dirty="0">
-                <a:solidFill>
-                  <a:srgbClr val="F8F8F2"/>
-                </a:solidFill>
-                <a:latin typeface="Fira Code" panose="020B0509050000020004" pitchFamily="49" charset="0"/>
-              </a:rPr>
-              <a:t>,</a:t>
-            </a:r>
-          </a:p>
-          <a:p>
-            <a:r>
-              <a:rPr lang="en-US" dirty="0">
-                <a:solidFill>
-                  <a:srgbClr val="8BE9FE"/>
-                </a:solidFill>
-                <a:latin typeface="Fira Code" panose="020B0509050000020004" pitchFamily="49" charset="0"/>
-              </a:rPr>
-              <a:t>    "</a:t>
-            </a:r>
-            <a:r>
-              <a:rPr lang="en-US" dirty="0">
-                <a:solidFill>
-                  <a:srgbClr val="8BE9FD"/>
-                </a:solidFill>
-                <a:latin typeface="Fira Code" panose="020B0509050000020004" pitchFamily="49" charset="0"/>
-              </a:rPr>
-              <a:t>content</a:t>
-            </a:r>
-            <a:r>
-              <a:rPr lang="en-US" dirty="0">
-                <a:solidFill>
-                  <a:srgbClr val="8BE9FE"/>
-                </a:solidFill>
-                <a:latin typeface="Fira Code" panose="020B0509050000020004" pitchFamily="49" charset="0"/>
-              </a:rPr>
-              <a:t>"</a:t>
-            </a:r>
-            <a:r>
-              <a:rPr lang="en-US" dirty="0">
-                <a:solidFill>
-                  <a:srgbClr val="FF79C6"/>
-                </a:solidFill>
-                <a:latin typeface="Fira Code" panose="020B0509050000020004" pitchFamily="49" charset="0"/>
-              </a:rPr>
-              <a:t>:</a:t>
-            </a:r>
-            <a:r>
-              <a:rPr lang="en-US" dirty="0">
-                <a:solidFill>
-                  <a:srgbClr val="F8F8F2"/>
-                </a:solidFill>
-                <a:latin typeface="Fira Code" panose="020B0509050000020004" pitchFamily="49" charset="0"/>
-              </a:rPr>
-              <a:t> </a:t>
-            </a:r>
-            <a:r>
-              <a:rPr lang="en-US" dirty="0">
-                <a:solidFill>
-                  <a:srgbClr val="E9F284"/>
-                </a:solidFill>
-                <a:latin typeface="Fira Code" panose="020B0509050000020004" pitchFamily="49" charset="0"/>
-              </a:rPr>
-              <a:t>"new </a:t>
-            </a:r>
-            <a:r>
-              <a:rPr lang="en-US" dirty="0">
-                <a:solidFill>
-                  <a:srgbClr val="F1FA8C"/>
-                </a:solidFill>
-                <a:latin typeface="Fira Code" panose="020B0509050000020004" pitchFamily="49" charset="0"/>
-              </a:rPr>
-              <a:t>content</a:t>
-            </a:r>
-            <a:r>
-              <a:rPr lang="en-US" dirty="0">
-                <a:solidFill>
-                  <a:srgbClr val="E9F284"/>
-                </a:solidFill>
-                <a:latin typeface="Fira Code" panose="020B0509050000020004" pitchFamily="49" charset="0"/>
-              </a:rPr>
-              <a:t>"</a:t>
-            </a:r>
-            <a:r>
-              <a:rPr lang="en-US" dirty="0">
-                <a:solidFill>
-                  <a:srgbClr val="F8F8F2"/>
-                </a:solidFill>
-                <a:latin typeface="Fira Code" panose="020B0509050000020004" pitchFamily="49" charset="0"/>
-              </a:rPr>
-              <a:t>,</a:t>
-            </a:r>
-          </a:p>
-          <a:p>
-            <a:r>
-              <a:rPr lang="en-US" dirty="0">
-                <a:solidFill>
-                  <a:srgbClr val="8BE9FE"/>
-                </a:solidFill>
-                <a:latin typeface="Fira Code" panose="020B0509050000020004" pitchFamily="49" charset="0"/>
-              </a:rPr>
-              <a:t>    "</a:t>
-            </a:r>
-            <a:r>
-              <a:rPr lang="en-US" dirty="0" err="1">
-                <a:solidFill>
-                  <a:srgbClr val="8BE9FD"/>
-                </a:solidFill>
-                <a:latin typeface="Fira Code" panose="020B0509050000020004" pitchFamily="49" charset="0"/>
-              </a:rPr>
-              <a:t>author_id</a:t>
-            </a:r>
-            <a:r>
-              <a:rPr lang="en-US" dirty="0">
-                <a:solidFill>
-                  <a:srgbClr val="8BE9FE"/>
-                </a:solidFill>
-                <a:latin typeface="Fira Code" panose="020B0509050000020004" pitchFamily="49" charset="0"/>
-              </a:rPr>
-              <a:t>"</a:t>
-            </a:r>
-            <a:r>
-              <a:rPr lang="en-US" dirty="0">
-                <a:solidFill>
-                  <a:srgbClr val="FF79C6"/>
-                </a:solidFill>
-                <a:latin typeface="Fira Code" panose="020B0509050000020004" pitchFamily="49" charset="0"/>
-              </a:rPr>
-              <a:t>:</a:t>
-            </a:r>
-            <a:r>
-              <a:rPr lang="en-US" dirty="0">
-                <a:solidFill>
-                  <a:srgbClr val="F8F8F2"/>
-                </a:solidFill>
-                <a:latin typeface="Fira Code" panose="020B0509050000020004" pitchFamily="49" charset="0"/>
-              </a:rPr>
-              <a:t> </a:t>
-            </a:r>
-            <a:r>
-              <a:rPr lang="en-US" dirty="0">
-                <a:solidFill>
-                  <a:srgbClr val="BD93F9"/>
+                  <a:srgbClr val="174781"/>
                 </a:solidFill>
                 <a:latin typeface="Fira Code" panose="020B0509050000020004" pitchFamily="49" charset="0"/>
               </a:rPr>
@@ -20287,7 +20143,7 @@
             </a:r>
             <a:endParaRPr lang="en-US" dirty="0">
               <a:solidFill>
-                <a:srgbClr val="F8F8F2"/>
+                <a:srgbClr val="236EBF"/>
               </a:solidFill>
               <a:latin typeface="Fira Code" panose="020B0509050000020004" pitchFamily="49" charset="0"/>
             </a:endParaRPr>
@@ -20296,7 +20152,7 @@
             <a:r>
               <a:rPr lang="en-US" dirty="0">
                 <a:solidFill>
-                  <a:srgbClr val="F8F8F2"/>
+                  <a:srgbClr val="236EBF"/>
                 </a:solidFill>
                 <a:latin typeface="Fira Code" panose="020B0509050000020004" pitchFamily="49" charset="0"/>
               </a:rPr>
@@ -20307,19 +20163,12 @@
             <a:r>
               <a:rPr lang="en-US" dirty="0">
                 <a:solidFill>
-                  <a:srgbClr val="F8F8F2"/>
+                  <a:srgbClr val="236EBF"/>
                 </a:solidFill>
                 <a:latin typeface="Fira Code" panose="020B0509050000020004" pitchFamily="49" charset="0"/>
               </a:rPr>
               <a:t>}</a:t>
             </a:r>
-            <a:endParaRPr lang="en-US" b="0" dirty="0">
-              <a:solidFill>
-                <a:srgbClr val="F8F8F2"/>
-              </a:solidFill>
-              <a:effectLst/>
-              <a:latin typeface="Fira Code" panose="020B0509050000020004" pitchFamily="49" charset="0"/>
-            </a:endParaRPr>
           </a:p>
         </p:txBody>
       </p:sp>
@@ -20515,7 +20364,7 @@
             <a:r>
               <a:rPr lang="de-DE" dirty="0" err="1">
                 <a:solidFill>
-                  <a:srgbClr val="FF79C6"/>
+                  <a:srgbClr val="7B30D0"/>
                 </a:solidFill>
                 <a:latin typeface="Fira Code" panose="020B0509050000020004" pitchFamily="49" charset="0"/>
               </a:rPr>
@@ -20524,7 +20373,7 @@
             <a:r>
               <a:rPr lang="de-DE" dirty="0">
                 <a:solidFill>
-                  <a:srgbClr val="F8F8F2"/>
+                  <a:srgbClr val="236EBF"/>
                 </a:solidFill>
                 <a:latin typeface="Fira Code" panose="020B0509050000020004" pitchFamily="49" charset="0"/>
               </a:rPr>
@@ -20533,7 +20382,7 @@
             <a:r>
               <a:rPr lang="de-DE" dirty="0" err="1">
                 <a:solidFill>
-                  <a:srgbClr val="50FA7B"/>
+                  <a:srgbClr val="B1108E"/>
                 </a:solidFill>
                 <a:latin typeface="Fira Code" panose="020B0509050000020004" pitchFamily="49" charset="0"/>
               </a:rPr>
@@ -20542,25 +20391,25 @@
             <a:r>
               <a:rPr lang="de-DE" dirty="0">
                 <a:solidFill>
-                  <a:srgbClr val="F8F8F2"/>
+                  <a:srgbClr val="236EBF"/>
                 </a:solidFill>
                 <a:latin typeface="Fira Code" panose="020B0509050000020004" pitchFamily="49" charset="0"/>
               </a:rPr>
               <a:t>(</a:t>
             </a:r>
             <a:r>
-              <a:rPr lang="de-DE" i="1" dirty="0">
-                <a:solidFill>
-                  <a:srgbClr val="FFB86C"/>
+              <a:rPr lang="de-DE" dirty="0">
+                <a:solidFill>
+                  <a:srgbClr val="B1108E"/>
                 </a:solidFill>
                 <a:latin typeface="Fira Code" panose="020B0509050000020004" pitchFamily="49" charset="0"/>
               </a:rPr>
               <a:t>$</a:t>
             </a:r>
             <a:r>
-              <a:rPr lang="de-DE" i="1" dirty="0" err="1">
-                <a:solidFill>
-                  <a:srgbClr val="FFB86C"/>
+              <a:rPr lang="de-DE" dirty="0" err="1">
+                <a:solidFill>
+                  <a:srgbClr val="B1108E"/>
                 </a:solidFill>
                 <a:latin typeface="Fira Code" panose="020B0509050000020004" pitchFamily="49" charset="0"/>
               </a:rPr>
@@ -20569,34 +20418,34 @@
             <a:r>
               <a:rPr lang="de-DE" dirty="0">
                 <a:solidFill>
-                  <a:srgbClr val="FF79C6"/>
-                </a:solidFill>
-                <a:latin typeface="Fira Code" panose="020B0509050000020004" pitchFamily="49" charset="0"/>
-              </a:rPr>
-              <a:t>:</a:t>
+                  <a:srgbClr val="236EBF"/>
+                </a:solidFill>
+                <a:latin typeface="Fira Code" panose="020B0509050000020004" pitchFamily="49" charset="0"/>
+              </a:rPr>
+              <a:t>: </a:t>
+            </a:r>
+            <a:r>
+              <a:rPr lang="de-DE" dirty="0" err="1">
+                <a:solidFill>
+                  <a:srgbClr val="DC3EB7"/>
+                </a:solidFill>
+                <a:latin typeface="Fira Code" panose="020B0509050000020004" pitchFamily="49" charset="0"/>
+              </a:rPr>
+              <a:t>PostInput</a:t>
             </a:r>
             <a:r>
               <a:rPr lang="de-DE" dirty="0">
                 <a:solidFill>
-                  <a:srgbClr val="F8F8F2"/>
-                </a:solidFill>
-                <a:latin typeface="Fira Code" panose="020B0509050000020004" pitchFamily="49" charset="0"/>
-              </a:rPr>
-              <a:t> </a:t>
-            </a:r>
-            <a:r>
-              <a:rPr lang="de-DE" i="1" dirty="0" err="1">
-                <a:solidFill>
-                  <a:srgbClr val="8BE9FD"/>
-                </a:solidFill>
-                <a:latin typeface="Fira Code" panose="020B0509050000020004" pitchFamily="49" charset="0"/>
-              </a:rPr>
-              <a:t>PostInput</a:t>
+                  <a:srgbClr val="7B30D0"/>
+                </a:solidFill>
+                <a:latin typeface="Fira Code" panose="020B0509050000020004" pitchFamily="49" charset="0"/>
+              </a:rPr>
+              <a:t>!</a:t>
             </a:r>
             <a:r>
               <a:rPr lang="de-DE" dirty="0">
                 <a:solidFill>
-                  <a:srgbClr val="F8F8F2"/>
+                  <a:srgbClr val="236EBF"/>
                 </a:solidFill>
                 <a:latin typeface="Fira Code" panose="020B0509050000020004" pitchFamily="49" charset="0"/>
               </a:rPr>
@@ -20607,7 +20456,7 @@
             <a:r>
               <a:rPr lang="de-DE" dirty="0">
                 <a:solidFill>
-                  <a:srgbClr val="F1FA8C"/>
+                  <a:srgbClr val="2F86D2"/>
                 </a:solidFill>
                 <a:latin typeface="Fira Code" panose="020B0509050000020004" pitchFamily="49" charset="0"/>
               </a:rPr>
@@ -20616,7 +20465,7 @@
             <a:r>
               <a:rPr lang="de-DE" dirty="0" err="1">
                 <a:solidFill>
-                  <a:srgbClr val="F1FA8C"/>
+                  <a:srgbClr val="2F86D2"/>
                 </a:solidFill>
                 <a:latin typeface="Fira Code" panose="020B0509050000020004" pitchFamily="49" charset="0"/>
               </a:rPr>
@@ -20625,16 +20474,16 @@
             <a:r>
               <a:rPr lang="de-DE" dirty="0">
                 <a:solidFill>
-                  <a:srgbClr val="F8F8F2"/>
+                  <a:srgbClr val="236EBF"/>
                 </a:solidFill>
                 <a:latin typeface="Fira Code" panose="020B0509050000020004" pitchFamily="49" charset="0"/>
               </a:rPr>
               <a:t>(</a:t>
             </a:r>
             <a:r>
-              <a:rPr lang="de-DE" i="1" dirty="0" err="1">
-                <a:solidFill>
-                  <a:srgbClr val="FFB86C"/>
+              <a:rPr lang="de-DE" dirty="0" err="1">
+                <a:solidFill>
+                  <a:srgbClr val="B1108E"/>
                 </a:solidFill>
                 <a:latin typeface="Fira Code" panose="020B0509050000020004" pitchFamily="49" charset="0"/>
               </a:rPr>
@@ -20643,25 +20492,25 @@
             <a:r>
               <a:rPr lang="de-DE" dirty="0">
                 <a:solidFill>
-                  <a:srgbClr val="FF79C6"/>
-                </a:solidFill>
-                <a:latin typeface="Fira Code" panose="020B0509050000020004" pitchFamily="49" charset="0"/>
-              </a:rPr>
-              <a:t>:</a:t>
+                  <a:srgbClr val="236EBF"/>
+                </a:solidFill>
+                <a:latin typeface="Fira Code" panose="020B0509050000020004" pitchFamily="49" charset="0"/>
+              </a:rPr>
+              <a:t>: </a:t>
             </a:r>
             <a:r>
               <a:rPr lang="de-DE" dirty="0">
                 <a:solidFill>
-                  <a:srgbClr val="F8F8F2"/>
-                </a:solidFill>
-                <a:latin typeface="Fira Code" panose="020B0509050000020004" pitchFamily="49" charset="0"/>
-              </a:rPr>
-              <a:t> $</a:t>
+                  <a:srgbClr val="2F86D2"/>
+                </a:solidFill>
+                <a:latin typeface="Fira Code" panose="020B0509050000020004" pitchFamily="49" charset="0"/>
+              </a:rPr>
+              <a:t>$</a:t>
             </a:r>
             <a:r>
               <a:rPr lang="de-DE" dirty="0" err="1">
                 <a:solidFill>
-                  <a:srgbClr val="F8F8F2"/>
+                  <a:srgbClr val="2F86D2"/>
                 </a:solidFill>
                 <a:latin typeface="Fira Code" panose="020B0509050000020004" pitchFamily="49" charset="0"/>
               </a:rPr>
@@ -20670,7 +20519,7 @@
             <a:r>
               <a:rPr lang="de-DE" dirty="0">
                 <a:solidFill>
-                  <a:srgbClr val="F8F8F2"/>
+                  <a:srgbClr val="236EBF"/>
                 </a:solidFill>
                 <a:latin typeface="Fira Code" panose="020B0509050000020004" pitchFamily="49" charset="0"/>
               </a:rPr>
@@ -20681,7 +20530,7 @@
             <a:r>
               <a:rPr lang="de-DE" dirty="0">
                 <a:solidFill>
-                  <a:srgbClr val="F8F8F2"/>
+                  <a:srgbClr val="2F86D2"/>
                 </a:solidFill>
                 <a:latin typeface="Fira Code" panose="020B0509050000020004" pitchFamily="49" charset="0"/>
               </a:rPr>
@@ -20690,7 +20539,7 @@
             <a:r>
               <a:rPr lang="de-DE" dirty="0" err="1">
                 <a:solidFill>
-                  <a:srgbClr val="F1FA8C"/>
+                  <a:srgbClr val="2F86D2"/>
                 </a:solidFill>
                 <a:latin typeface="Fira Code" panose="020B0509050000020004" pitchFamily="49" charset="0"/>
               </a:rPr>
@@ -20698,7 +20547,7 @@
             </a:r>
             <a:endParaRPr lang="de-DE" dirty="0">
               <a:solidFill>
-                <a:srgbClr val="F1FA8C"/>
+                <a:srgbClr val="236EBF"/>
               </a:solidFill>
               <a:latin typeface="Fira Code" panose="020B0509050000020004" pitchFamily="49" charset="0"/>
             </a:endParaRPr>
@@ -20707,7 +20556,7 @@
             <a:r>
               <a:rPr lang="de-DE" dirty="0">
                 <a:solidFill>
-                  <a:srgbClr val="F8F8F2"/>
+                  <a:srgbClr val="236EBF"/>
                 </a:solidFill>
                 <a:latin typeface="Fira Code" panose="020B0509050000020004" pitchFamily="49" charset="0"/>
               </a:rPr>
@@ -20718,7 +20567,7 @@
             <a:r>
               <a:rPr lang="de-DE" dirty="0">
                 <a:solidFill>
-                  <a:srgbClr val="F8F8F2"/>
+                  <a:srgbClr val="236EBF"/>
                 </a:solidFill>
                 <a:latin typeface="Fira Code" panose="020B0509050000020004" pitchFamily="49" charset="0"/>
               </a:rPr>
@@ -20757,7 +20606,7 @@
             <a:r>
               <a:rPr lang="de-DE" dirty="0">
                 <a:solidFill>
-                  <a:srgbClr val="F8F8F2"/>
+                  <a:srgbClr val="236EBF"/>
                 </a:solidFill>
                 <a:latin typeface="Fira Code" panose="020B0509050000020004" pitchFamily="49" charset="0"/>
               </a:rPr>
@@ -20768,7 +20617,7 @@
             <a:r>
               <a:rPr lang="de-DE" dirty="0">
                 <a:solidFill>
-                  <a:srgbClr val="8BE9FE"/>
+                  <a:srgbClr val="DC3EB7"/>
                 </a:solidFill>
                 <a:latin typeface="Fira Code" panose="020B0509050000020004" pitchFamily="49" charset="0"/>
               </a:rPr>
@@ -20777,7 +20626,7 @@
             <a:r>
               <a:rPr lang="de-DE" dirty="0" err="1">
                 <a:solidFill>
-                  <a:srgbClr val="8BE9FD"/>
+                  <a:srgbClr val="DC3EB7"/>
                 </a:solidFill>
                 <a:latin typeface="Fira Code" panose="020B0509050000020004" pitchFamily="49" charset="0"/>
               </a:rPr>
@@ -20786,7 +20635,7 @@
             <a:r>
               <a:rPr lang="de-DE" dirty="0">
                 <a:solidFill>
-                  <a:srgbClr val="8BE9FE"/>
+                  <a:srgbClr val="DC3EB7"/>
                 </a:solidFill>
                 <a:latin typeface="Fira Code" panose="020B0509050000020004" pitchFamily="49" charset="0"/>
               </a:rPr>
@@ -20795,45 +20644,74 @@
             <a:r>
               <a:rPr lang="de-DE" dirty="0">
                 <a:solidFill>
-                  <a:srgbClr val="FF79C6"/>
-                </a:solidFill>
-                <a:latin typeface="Fira Code" panose="020B0509050000020004" pitchFamily="49" charset="0"/>
-              </a:rPr>
-              <a:t>:</a:t>
-            </a:r>
+                  <a:srgbClr val="236EBF"/>
+                </a:solidFill>
+                <a:latin typeface="Fira Code" panose="020B0509050000020004" pitchFamily="49" charset="0"/>
+              </a:rPr>
+              <a:t>: {</a:t>
+            </a:r>
+          </a:p>
+          <a:p>
             <a:r>
               <a:rPr lang="de-DE" dirty="0">
                 <a:solidFill>
-                  <a:srgbClr val="F8F8F2"/>
-                </a:solidFill>
-                <a:latin typeface="Fira Code" panose="020B0509050000020004" pitchFamily="49" charset="0"/>
-              </a:rPr>
-              <a:t> {</a:t>
-            </a:r>
-          </a:p>
-          <a:p>
+                  <a:srgbClr val="DC3EB7"/>
+                </a:solidFill>
+                <a:latin typeface="Fira Code" panose="020B0509050000020004" pitchFamily="49" charset="0"/>
+              </a:rPr>
+              <a:t>    "</a:t>
+            </a:r>
+            <a:r>
+              <a:rPr lang="de-DE" dirty="0" err="1">
+                <a:solidFill>
+                  <a:srgbClr val="DC3EB7"/>
+                </a:solidFill>
+                <a:latin typeface="Fira Code" panose="020B0509050000020004" pitchFamily="49" charset="0"/>
+              </a:rPr>
+              <a:t>createPost</a:t>
+            </a:r>
             <a:r>
               <a:rPr lang="de-DE" dirty="0">
                 <a:solidFill>
-                  <a:srgbClr val="8BE9FE"/>
-                </a:solidFill>
-                <a:latin typeface="Fira Code" panose="020B0509050000020004" pitchFamily="49" charset="0"/>
-              </a:rPr>
-              <a:t>    "</a:t>
+                  <a:srgbClr val="DC3EB7"/>
+                </a:solidFill>
+                <a:latin typeface="Fira Code" panose="020B0509050000020004" pitchFamily="49" charset="0"/>
+              </a:rPr>
+              <a:t>"</a:t>
+            </a:r>
+            <a:r>
+              <a:rPr lang="de-DE" dirty="0">
+                <a:solidFill>
+                  <a:srgbClr val="236EBF"/>
+                </a:solidFill>
+                <a:latin typeface="Fira Code" panose="020B0509050000020004" pitchFamily="49" charset="0"/>
+              </a:rPr>
+              <a:t>: {</a:t>
+            </a:r>
+          </a:p>
+          <a:p>
+            <a:r>
+              <a:rPr lang="de-DE" dirty="0">
+                <a:solidFill>
+                  <a:srgbClr val="DC3EB7"/>
+                </a:solidFill>
+                <a:latin typeface="Fira Code" panose="020B0509050000020004" pitchFamily="49" charset="0"/>
+              </a:rPr>
+              <a:t>      "</a:t>
             </a:r>
             <a:r>
               <a:rPr lang="de-DE" dirty="0" err="1">
                 <a:solidFill>
-                  <a:srgbClr val="8BE9FD"/>
-                </a:solidFill>
-                <a:latin typeface="Fira Code" panose="020B0509050000020004" pitchFamily="49" charset="0"/>
-              </a:rPr>
-              <a:t>createPost</a:t>
+                  <a:srgbClr val="DC3EB7"/>
+                </a:solidFill>
+                <a:latin typeface="Fira Code" panose="020B0509050000020004" pitchFamily="49" charset="0"/>
+              </a:rPr>
+              <a:t>id</a:t>
             </a:r>
             <a:r>
               <a:rPr lang="de-DE" dirty="0">
                 <a:solidFill>
-                  <a:srgbClr val="8BE9FE"/>
+                  <a:srgbClr val="DC3EB7"/>
                 </a:solidFill>
                 <a:latin typeface="Fira Code" panose="020B0509050000020004" pitchFamily="49" charset="0"/>
               </a:rPr>
@@ -20842,98 +20720,24 @@
             <a:r>
               <a:rPr lang="de-DE" dirty="0">
                 <a:solidFill>
-                  <a:srgbClr val="FF79C6"/>
-                </a:solidFill>
-                <a:latin typeface="Fira Code" panose="020B0509050000020004" pitchFamily="49" charset="0"/>
-              </a:rPr>
-              <a:t>:</a:t>
+                  <a:srgbClr val="236EBF"/>
+                </a:solidFill>
+                <a:latin typeface="Fira Code" panose="020B0509050000020004" pitchFamily="49" charset="0"/>
+              </a:rPr>
+              <a:t>: </a:t>
             </a:r>
             <a:r>
               <a:rPr lang="de-DE" dirty="0">
                 <a:solidFill>
-                  <a:srgbClr val="F8F8F2"/>
-                </a:solidFill>
-                <a:latin typeface="Fira Code" panose="020B0509050000020004" pitchFamily="49" charset="0"/>
-              </a:rPr>
-              <a:t> {</a:t>
-            </a:r>
-          </a:p>
-          <a:p>
-            <a:r>
-              <a:rPr lang="de-DE" dirty="0">
-                <a:solidFill>
-                  <a:srgbClr val="8BE9FE"/>
-                </a:solidFill>
-                <a:latin typeface="Fira Code" panose="020B0509050000020004" pitchFamily="49" charset="0"/>
-              </a:rPr>
-              <a:t>      "</a:t>
-            </a:r>
-            <a:r>
-              <a:rPr lang="de-DE" dirty="0" err="1">
-                <a:solidFill>
-                  <a:srgbClr val="8BE9FD"/>
-                </a:solidFill>
-                <a:latin typeface="Fira Code" panose="020B0509050000020004" pitchFamily="49" charset="0"/>
-              </a:rPr>
-              <a:t>id</a:t>
-            </a:r>
-            <a:r>
-              <a:rPr lang="de-DE" dirty="0">
-                <a:solidFill>
-                  <a:srgbClr val="8BE9FE"/>
-                </a:solidFill>
-                <a:latin typeface="Fira Code" panose="020B0509050000020004" pitchFamily="49" charset="0"/>
-              </a:rPr>
-              <a:t>"</a:t>
-            </a:r>
-            <a:r>
-              <a:rPr lang="de-DE" dirty="0">
-                <a:solidFill>
-                  <a:srgbClr val="FF79C6"/>
-                </a:solidFill>
-                <a:latin typeface="Fira Code" panose="020B0509050000020004" pitchFamily="49" charset="0"/>
-              </a:rPr>
-              <a:t>:</a:t>
-            </a:r>
-            <a:r>
-              <a:rPr lang="de-DE" dirty="0">
-                <a:solidFill>
-                  <a:srgbClr val="F8F8F2"/>
-                </a:solidFill>
-                <a:latin typeface="Fira Code" panose="020B0509050000020004" pitchFamily="49" charset="0"/>
-              </a:rPr>
-              <a:t> </a:t>
-            </a:r>
-            <a:r>
-              <a:rPr lang="de-DE" dirty="0">
-                <a:solidFill>
-                  <a:srgbClr val="E9F284"/>
-                </a:solidFill>
-                <a:latin typeface="Fira Code" panose="020B0509050000020004" pitchFamily="49" charset="0"/>
-              </a:rPr>
-              <a:t>"</a:t>
-            </a:r>
-            <a:r>
-              <a:rPr lang="de-DE" dirty="0">
-                <a:solidFill>
-                  <a:srgbClr val="F1FA8C"/>
-                </a:solidFill>
-                <a:latin typeface="Fira Code" panose="020B0509050000020004" pitchFamily="49" charset="0"/>
-              </a:rPr>
-              <a:t>150</a:t>
-            </a:r>
-            <a:r>
-              <a:rPr lang="de-DE" dirty="0">
-                <a:solidFill>
-                  <a:srgbClr val="E9F284"/>
-                </a:solidFill>
-                <a:latin typeface="Fira Code" panose="020B0509050000020004" pitchFamily="49" charset="0"/>
-              </a:rPr>
-              <a:t>"</a:t>
+                  <a:srgbClr val="00820F"/>
+                </a:solidFill>
+                <a:latin typeface="Fira Code" panose="020B0509050000020004" pitchFamily="49" charset="0"/>
+              </a:rPr>
+              <a:t>"150"</a:t>
             </a:r>
             <a:endParaRPr lang="de-DE" dirty="0">
               <a:solidFill>
-                <a:srgbClr val="F8F8F2"/>
+                <a:srgbClr val="236EBF"/>
               </a:solidFill>
               <a:latin typeface="Fira Code" panose="020B0509050000020004" pitchFamily="49" charset="0"/>
             </a:endParaRPr>
@@ -20942,7 +20746,7 @@
             <a:r>
               <a:rPr lang="de-DE" dirty="0">
                 <a:solidFill>
-                  <a:srgbClr val="F8F8F2"/>
+                  <a:srgbClr val="236EBF"/>
                 </a:solidFill>
                 <a:latin typeface="Fira Code" panose="020B0509050000020004" pitchFamily="49" charset="0"/>
               </a:rPr>
@@ -20953,7 +20757,7 @@
             <a:r>
               <a:rPr lang="de-DE" dirty="0">
                 <a:solidFill>
-                  <a:srgbClr val="F8F8F2"/>
+                  <a:srgbClr val="236EBF"/>
                 </a:solidFill>
                 <a:latin typeface="Fira Code" panose="020B0509050000020004" pitchFamily="49" charset="0"/>
               </a:rPr>
@@ -20964,19 +20768,12 @@
             <a:r>
               <a:rPr lang="de-DE" dirty="0">
                 <a:solidFill>
-                  <a:srgbClr val="F8F8F2"/>
+                  <a:srgbClr val="236EBF"/>
                 </a:solidFill>
                 <a:latin typeface="Fira Code" panose="020B0509050000020004" pitchFamily="49" charset="0"/>
               </a:rPr>
               <a:t>}</a:t>
             </a:r>
-            <a:endParaRPr lang="de-DE" b="0" dirty="0">
-              <a:solidFill>
-                <a:srgbClr val="F8F8F2"/>
-              </a:solidFill>
-              <a:effectLst/>
-              <a:latin typeface="Fira Code" panose="020B0509050000020004" pitchFamily="49" charset="0"/>
-            </a:endParaRPr>
           </a:p>
         </p:txBody>
       </p:sp>
@@ -21102,7 +20899,7 @@
             <a:r>
               <a:rPr lang="en-US" dirty="0">
                 <a:solidFill>
-                  <a:srgbClr val="F8F8F2"/>
+                  <a:srgbClr val="236EBF"/>
                 </a:solidFill>
                 <a:latin typeface="Fira Code" panose="020B0509050000020004" pitchFamily="49" charset="0"/>
               </a:rPr>
@@ -21113,7 +20910,7 @@
             <a:r>
               <a:rPr lang="en-US" dirty="0">
                 <a:solidFill>
-                  <a:srgbClr val="8BE9FE"/>
+                  <a:srgbClr val="DC3EB7"/>
                 </a:solidFill>
                 <a:latin typeface="Fira Code" panose="020B0509050000020004" pitchFamily="49" charset="0"/>
               </a:rPr>
@@ -21122,7 +20919,7 @@
             <a:r>
               <a:rPr lang="en-US" dirty="0" err="1">
                 <a:solidFill>
-                  <a:srgbClr val="8BE9FD"/>
+                  <a:srgbClr val="DC3EB7"/>
                 </a:solidFill>
                 <a:latin typeface="Fira Code" panose="020B0509050000020004" pitchFamily="49" charset="0"/>
               </a:rPr>
@@ -21131,7 +20928,7 @@
             <a:r>
               <a:rPr lang="en-US" dirty="0">
                 <a:solidFill>
-                  <a:srgbClr val="8BE9FE"/>
+                  <a:srgbClr val="DC3EB7"/>
                 </a:solidFill>
                 <a:latin typeface="Fira Code" panose="020B0509050000020004" pitchFamily="49" charset="0"/>
               </a:rPr>
@@ -21140,45 +20937,112 @@
             <a:r>
               <a:rPr lang="en-US" dirty="0">
                 <a:solidFill>
-                  <a:srgbClr val="FF79C6"/>
-                </a:solidFill>
-                <a:latin typeface="Fira Code" panose="020B0509050000020004" pitchFamily="49" charset="0"/>
-              </a:rPr>
-              <a:t>:</a:t>
-            </a:r>
+                  <a:srgbClr val="236EBF"/>
+                </a:solidFill>
+                <a:latin typeface="Fira Code" panose="020B0509050000020004" pitchFamily="49" charset="0"/>
+              </a:rPr>
+              <a:t>: {</a:t>
+            </a:r>
+          </a:p>
+          <a:p>
             <a:r>
               <a:rPr lang="en-US" dirty="0">
                 <a:solidFill>
-                  <a:srgbClr val="F8F8F2"/>
-                </a:solidFill>
-                <a:latin typeface="Fira Code" panose="020B0509050000020004" pitchFamily="49" charset="0"/>
-              </a:rPr>
-              <a:t> {</a:t>
-            </a:r>
-          </a:p>
-          <a:p>
+                  <a:srgbClr val="DC3EB7"/>
+                </a:solidFill>
+                <a:latin typeface="Fira Code" panose="020B0509050000020004" pitchFamily="49" charset="0"/>
+              </a:rPr>
+              <a:t>    "title"</a:t>
+            </a:r>
             <a:r>
               <a:rPr lang="en-US" dirty="0">
                 <a:solidFill>
-                  <a:srgbClr val="8BE9FE"/>
-                </a:solidFill>
-                <a:latin typeface="Fira Code" panose="020B0509050000020004" pitchFamily="49" charset="0"/>
-              </a:rPr>
-              <a:t>    “</a:t>
+                  <a:srgbClr val="236EBF"/>
+                </a:solidFill>
+                <a:latin typeface="Fira Code" panose="020B0509050000020004" pitchFamily="49" charset="0"/>
+              </a:rPr>
+              <a:t>: </a:t>
             </a:r>
             <a:r>
               <a:rPr lang="en-US" dirty="0">
                 <a:solidFill>
-                  <a:srgbClr val="8BE9FD"/>
-                </a:solidFill>
-                <a:latin typeface="Fira Code" panose="020B0509050000020004" pitchFamily="49" charset="0"/>
-              </a:rPr>
-              <a:t>title</a:t>
+                  <a:srgbClr val="00820F"/>
+                </a:solidFill>
+                <a:latin typeface="Fira Code" panose="020B0509050000020004" pitchFamily="49" charset="0"/>
+              </a:rPr>
+              <a:t>"new title"</a:t>
             </a:r>
             <a:r>
               <a:rPr lang="en-US" dirty="0">
                 <a:solidFill>
-                  <a:srgbClr val="8BE9FE"/>
+                  <a:srgbClr val="236EBF"/>
+                </a:solidFill>
+                <a:latin typeface="Fira Code" panose="020B0509050000020004" pitchFamily="49" charset="0"/>
+              </a:rPr>
+              <a:t>,</a:t>
+            </a:r>
+          </a:p>
+          <a:p>
+            <a:r>
+              <a:rPr lang="en-US" dirty="0">
+                <a:solidFill>
+                  <a:srgbClr val="DC3EB7"/>
+                </a:solidFill>
+                <a:latin typeface="Fira Code" panose="020B0509050000020004" pitchFamily="49" charset="0"/>
+              </a:rPr>
+              <a:t>    "content"</a:t>
+            </a:r>
+            <a:r>
+              <a:rPr lang="en-US" dirty="0">
+                <a:solidFill>
+                  <a:srgbClr val="236EBF"/>
+                </a:solidFill>
+                <a:latin typeface="Fira Code" panose="020B0509050000020004" pitchFamily="49" charset="0"/>
+              </a:rPr>
+              <a:t>: </a:t>
+            </a:r>
+            <a:r>
+              <a:rPr lang="en-US" dirty="0">
+                <a:solidFill>
+                  <a:srgbClr val="00820F"/>
+                </a:solidFill>
+                <a:latin typeface="Fira Code" panose="020B0509050000020004" pitchFamily="49" charset="0"/>
+              </a:rPr>
+              <a:t>"new content"</a:t>
+            </a:r>
+            <a:r>
+              <a:rPr lang="en-US" dirty="0">
+                <a:solidFill>
+                  <a:srgbClr val="236EBF"/>
+                </a:solidFill>
+                <a:latin typeface="Fira Code" panose="020B0509050000020004" pitchFamily="49" charset="0"/>
+              </a:rPr>
+              <a:t>,</a:t>
+            </a:r>
+          </a:p>
+          <a:p>
+            <a:r>
+              <a:rPr lang="en-US" dirty="0">
+                <a:solidFill>
+                  <a:srgbClr val="DC3EB7"/>
+                </a:solidFill>
+                <a:latin typeface="Fira Code" panose="020B0509050000020004" pitchFamily="49" charset="0"/>
+              </a:rPr>
+              <a:t>    "</a:t>
+            </a:r>
+            <a:r>
+              <a:rPr lang="en-US" dirty="0" err="1">
+                <a:solidFill>
+                  <a:srgbClr val="DC3EB7"/>
+                </a:solidFill>
+                <a:latin typeface="Fira Code" panose="020B0509050000020004" pitchFamily="49" charset="0"/>
+              </a:rPr>
+              <a:t>author_id</a:t>
+            </a:r>
+            <a:r>
+              <a:rPr lang="en-US" dirty="0">
+                <a:solidFill>
+                  <a:srgbClr val="DC3EB7"/>
                 </a:solidFill>
                 <a:latin typeface="Fira Code" panose="020B0509050000020004" pitchFamily="49" charset="0"/>
               </a:rPr>
@@ -21187,191 +21051,16 @@
             <a:r>
               <a:rPr lang="en-US" dirty="0">
                 <a:solidFill>
-                  <a:srgbClr val="FF79C6"/>
-                </a:solidFill>
-                <a:latin typeface="Fira Code" panose="020B0509050000020004" pitchFamily="49" charset="0"/>
-              </a:rPr>
-              <a:t>:</a:t>
+                  <a:srgbClr val="236EBF"/>
+                </a:solidFill>
+                <a:latin typeface="Fira Code" panose="020B0509050000020004" pitchFamily="49" charset="0"/>
+              </a:rPr>
+              <a:t>: </a:t>
             </a:r>
             <a:r>
               <a:rPr lang="en-US" dirty="0">
                 <a:solidFill>
-                  <a:srgbClr val="F8F8F2"/>
-                </a:solidFill>
-                <a:latin typeface="Fira Code" panose="020B0509050000020004" pitchFamily="49" charset="0"/>
-              </a:rPr>
-              <a:t> </a:t>
-            </a:r>
-            <a:r>
-              <a:rPr lang="en-US" dirty="0">
-                <a:solidFill>
-                  <a:srgbClr val="E9F284"/>
-                </a:solidFill>
-                <a:latin typeface="Fira Code" panose="020B0509050000020004" pitchFamily="49" charset="0"/>
-              </a:rPr>
-              <a:t>"new </a:t>
-            </a:r>
-            <a:r>
-              <a:rPr lang="en-US" dirty="0">
-                <a:solidFill>
-                  <a:srgbClr val="F1FA8C"/>
-                </a:solidFill>
-                <a:latin typeface="Fira Code" panose="020B0509050000020004" pitchFamily="49" charset="0"/>
-              </a:rPr>
-              <a:t>title</a:t>
-            </a:r>
-            <a:r>
-              <a:rPr lang="en-US" dirty="0">
-                <a:solidFill>
-                  <a:srgbClr val="E9F284"/>
-                </a:solidFill>
-                <a:latin typeface="Fira Code" panose="020B0509050000020004" pitchFamily="49" charset="0"/>
-              </a:rPr>
-              <a:t>"</a:t>
-            </a:r>
-            <a:r>
-              <a:rPr lang="en-US" dirty="0">
-                <a:solidFill>
-                  <a:srgbClr val="F8F8F2"/>
-                </a:solidFill>
-                <a:latin typeface="Fira Code" panose="020B0509050000020004" pitchFamily="49" charset="0"/>
-              </a:rPr>
-              <a:t>,</a:t>
-            </a:r>
-          </a:p>
-          <a:p>
-            <a:r>
-              <a:rPr lang="en-US" dirty="0">
-                <a:solidFill>
-                  <a:srgbClr val="8BE9FE"/>
-                </a:solidFill>
-                <a:latin typeface="Fira Code" panose="020B0509050000020004" pitchFamily="49" charset="0"/>
-              </a:rPr>
-              <a:t>    "</a:t>
-            </a:r>
-            <a:r>
-              <a:rPr lang="en-US" dirty="0">
-                <a:solidFill>
-                  <a:srgbClr val="8BE9FD"/>
-                </a:solidFill>
-                <a:latin typeface="Fira Code" panose="020B0509050000020004" pitchFamily="49" charset="0"/>
-              </a:rPr>
-              <a:t>content</a:t>
-            </a:r>
-            <a:r>
-              <a:rPr lang="en-US" dirty="0">
-                <a:solidFill>
-                  <a:srgbClr val="8BE9FE"/>
-                </a:solidFill>
-                <a:latin typeface="Fira Code" panose="020B0509050000020004" pitchFamily="49" charset="0"/>
-              </a:rPr>
-              <a:t>"</a:t>
-            </a:r>
-            <a:r>
-              <a:rPr lang="en-US" dirty="0">
-                <a:solidFill>
-                  <a:srgbClr val="FF79C6"/>
-                </a:solidFill>
-                <a:latin typeface="Fira Code" panose="020B0509050000020004" pitchFamily="49" charset="0"/>
-              </a:rPr>
-              <a:t>:</a:t>
-            </a:r>
-            <a:r>
-              <a:rPr lang="en-US" dirty="0">
-                <a:solidFill>
-                  <a:srgbClr val="F8F8F2"/>
-                </a:solidFill>
-                <a:latin typeface="Fira Code" panose="020B0509050000020004" pitchFamily="49" charset="0"/>
-              </a:rPr>
-              <a:t> </a:t>
-            </a:r>
-            <a:r>
-              <a:rPr lang="en-US" dirty="0">
-                <a:solidFill>
-                  <a:srgbClr val="E9F284"/>
-                </a:solidFill>
-                <a:latin typeface="Fira Code" panose="020B0509050000020004" pitchFamily="49" charset="0"/>
-              </a:rPr>
-              <a:t>"new </a:t>
-            </a:r>
-            <a:r>
-              <a:rPr lang="en-US" dirty="0">
-                <a:solidFill>
-                  <a:srgbClr val="F1FA8C"/>
-                </a:solidFill>
-                <a:latin typeface="Fira Code" panose="020B0509050000020004" pitchFamily="49" charset="0"/>
-              </a:rPr>
-              <a:t>content</a:t>
-            </a:r>
-            <a:r>
-              <a:rPr lang="en-US" dirty="0">
-                <a:solidFill>
-                  <a:srgbClr val="E9F284"/>
-                </a:solidFill>
-                <a:latin typeface="Fira Code" panose="020B0509050000020004" pitchFamily="49" charset="0"/>
-              </a:rPr>
-              <a:t>"</a:t>
-            </a:r>
-            <a:r>
-              <a:rPr lang="en-US" dirty="0">
-                <a:solidFill>
-                  <a:srgbClr val="F8F8F2"/>
-                </a:solidFill>
-                <a:latin typeface="Fira Code" panose="020B0509050000020004" pitchFamily="49" charset="0"/>
-              </a:rPr>
-              <a:t>,</a:t>
-            </a:r>
-          </a:p>
-          <a:p>
-            <a:r>
-              <a:rPr lang="en-US" dirty="0">
-                <a:solidFill>
-                  <a:srgbClr val="8BE9FE"/>
-                </a:solidFill>
-                <a:latin typeface="Fira Code" panose="020B0509050000020004" pitchFamily="49" charset="0"/>
-              </a:rPr>
-              <a:t>    "</a:t>
-            </a:r>
-            <a:r>
-              <a:rPr lang="en-US" dirty="0" err="1">
-                <a:solidFill>
-                  <a:srgbClr val="8BE9FD"/>
-                </a:solidFill>
-                <a:latin typeface="Fira Code" panose="020B0509050000020004" pitchFamily="49" charset="0"/>
-              </a:rPr>
-              <a:t>author_id</a:t>
-            </a:r>
-            <a:r>
-              <a:rPr lang="en-US" dirty="0">
-                <a:solidFill>
-                  <a:srgbClr val="8BE9FE"/>
-                </a:solidFill>
-                <a:latin typeface="Fira Code" panose="020B0509050000020004" pitchFamily="49" charset="0"/>
-              </a:rPr>
-              <a:t>"</a:t>
-            </a:r>
-            <a:r>
-              <a:rPr lang="en-US" dirty="0">
-                <a:solidFill>
-                  <a:srgbClr val="FF79C6"/>
-                </a:solidFill>
-                <a:latin typeface="Fira Code" panose="020B0509050000020004" pitchFamily="49" charset="0"/>
-              </a:rPr>
-              <a:t>:</a:t>
-            </a:r>
-            <a:r>
-              <a:rPr lang="en-US" dirty="0">
-                <a:solidFill>
-                  <a:srgbClr val="F8F8F2"/>
-                </a:solidFill>
-                <a:latin typeface="Fira Code" panose="020B0509050000020004" pitchFamily="49" charset="0"/>
-              </a:rPr>
-              <a:t> </a:t>
-            </a:r>
-            <a:r>
-              <a:rPr lang="en-US" dirty="0">
-                <a:solidFill>
-                  <a:srgbClr val="BD93F9"/>
+                  <a:srgbClr val="174781"/>
                 </a:solidFill>
                 <a:latin typeface="Fira Code" panose="020B0509050000020004" pitchFamily="49" charset="0"/>
               </a:rPr>
@@ -21379,7 +21068,7 @@
             </a:r>
             <a:endParaRPr lang="en-US" dirty="0">
               <a:solidFill>
-                <a:srgbClr val="F8F8F2"/>
+                <a:srgbClr val="236EBF"/>
               </a:solidFill>
               <a:latin typeface="Fira Code" panose="020B0509050000020004" pitchFamily="49" charset="0"/>
             </a:endParaRPr>
@@ -21388,7 +21077,7 @@
             <a:r>
               <a:rPr lang="en-US" dirty="0">
                 <a:solidFill>
-                  <a:srgbClr val="F8F8F2"/>
+                  <a:srgbClr val="236EBF"/>
                 </a:solidFill>
                 <a:latin typeface="Fira Code" panose="020B0509050000020004" pitchFamily="49" charset="0"/>
               </a:rPr>
@@ -21399,19 +21088,12 @@
             <a:r>
               <a:rPr lang="en-US" dirty="0">
                 <a:solidFill>
-                  <a:srgbClr val="F8F8F2"/>
+                  <a:srgbClr val="236EBF"/>
                 </a:solidFill>
                 <a:latin typeface="Fira Code" panose="020B0509050000020004" pitchFamily="49" charset="0"/>
               </a:rPr>
               <a:t>}</a:t>
             </a:r>
-            <a:endParaRPr lang="en-US" b="0" dirty="0">
-              <a:solidFill>
-                <a:srgbClr val="F8F8F2"/>
-              </a:solidFill>
-              <a:effectLst/>
-              <a:latin typeface="Fira Code" panose="020B0509050000020004" pitchFamily="49" charset="0"/>
-            </a:endParaRPr>
           </a:p>
         </p:txBody>
       </p:sp>
@@ -21439,7 +21121,7 @@
           </a:prstGeom>
           <a:ln w="12700">
             <a:solidFill>
-              <a:srgbClr val="FFB86C"/>
+              <a:srgbClr val="DC3EB7"/>
             </a:solidFill>
             <a:tailEnd type="triangle"/>
           </a:ln>

</xml_diff>

<commit_message>
minor adjustments to slides (add some animations)
</commit_message>
<xml_diff>
--- a/slides/GraphqlSlides.pptx
+++ b/slides/GraphqlSlides.pptx
@@ -566,6 +566,27 @@
           <a:bodyPr/>
           <a:lstStyle/>
           <a:p>
+            <a:r>
+              <a:rPr lang="de-DE" dirty="0"/>
+              <a:t>HighSpeed2 GrandHotel5G</a:t>
+            </a:r>
+          </a:p>
+          <a:p>
+            <a:r>
+              <a:rPr lang="de-DE" dirty="0" err="1"/>
+              <a:t>HighSpeed</a:t>
+            </a:r>
+            <a:r>
+              <a:rPr lang="de-DE" dirty="0"/>
+              <a:t> </a:t>
+            </a:r>
+            <a:r>
+              <a:rPr lang="de-DE" dirty="0" err="1"/>
+              <a:t>GrandHotel</a:t>
+            </a:r>
+            <a:endParaRPr lang="de-DE" dirty="0"/>
+          </a:p>
+          <a:p>
             <a:endParaRPr lang="de-DE" dirty="0"/>
           </a:p>
         </p:txBody>
@@ -728,7 +749,7 @@
           <a:p>
             <a:fld id="{4951A4F0-27A8-4C6D-A90A-FB4CDD31FFC6}" type="slidenum">
               <a:rPr lang="de-DE" smtClean="0"/>
-              <a:t>20</a:t>
+              <a:t>19</a:t>
             </a:fld>
             <a:endParaRPr lang="de-DE"/>
           </a:p>
@@ -737,7 +758,7 @@
     </p:spTree>
     <p:extLst>
       <p:ext uri="{BB962C8B-B14F-4D97-AF65-F5344CB8AC3E}">
-        <p14:creationId xmlns:p14="http://schemas.microsoft.com/office/powerpoint/2010/main" val="2094132076"/>
+        <p14:creationId xmlns:p14="http://schemas.microsoft.com/office/powerpoint/2010/main" val="3704860397"/>
       </p:ext>
     </p:extLst>
   </p:cSld>
@@ -869,7 +890,7 @@
           <a:p>
             <a:fld id="{4951A4F0-27A8-4C6D-A90A-FB4CDD31FFC6}" type="slidenum">
               <a:rPr lang="de-DE" smtClean="0"/>
-              <a:t>21</a:t>
+              <a:t>20</a:t>
             </a:fld>
             <a:endParaRPr lang="de-DE"/>
           </a:p>
@@ -878,7 +899,7 @@
     </p:spTree>
     <p:extLst>
       <p:ext uri="{BB962C8B-B14F-4D97-AF65-F5344CB8AC3E}">
-        <p14:creationId xmlns:p14="http://schemas.microsoft.com/office/powerpoint/2010/main" val="2996534864"/>
+        <p14:creationId xmlns:p14="http://schemas.microsoft.com/office/powerpoint/2010/main" val="2094132076"/>
       </p:ext>
     </p:extLst>
   </p:cSld>
@@ -1010,7 +1031,7 @@
           <a:p>
             <a:fld id="{4951A4F0-27A8-4C6D-A90A-FB4CDD31FFC6}" type="slidenum">
               <a:rPr lang="de-DE" smtClean="0"/>
-              <a:t>22</a:t>
+              <a:t>21</a:t>
             </a:fld>
             <a:endParaRPr lang="de-DE"/>
           </a:p>
@@ -1019,7 +1040,7 @@
     </p:spTree>
     <p:extLst>
       <p:ext uri="{BB962C8B-B14F-4D97-AF65-F5344CB8AC3E}">
-        <p14:creationId xmlns:p14="http://schemas.microsoft.com/office/powerpoint/2010/main" val="970813291"/>
+        <p14:creationId xmlns:p14="http://schemas.microsoft.com/office/powerpoint/2010/main" val="2996534864"/>
       </p:ext>
     </p:extLst>
   </p:cSld>
@@ -1075,164 +1096,61 @@
           <a:p>
             <a:r>
               <a:rPr lang="de-DE" dirty="0" err="1"/>
-              <a:t>Int</a:t>
+              <a:t>Author</a:t>
             </a:r>
             <a:r>
               <a:rPr lang="de-DE" dirty="0"/>
-              <a:t>: </a:t>
+              <a:t> = </a:t>
             </a:r>
             <a:r>
               <a:rPr lang="de-DE" dirty="0" err="1"/>
-              <a:t>signed</a:t>
+              <a:t>Object</a:t>
             </a:r>
             <a:r>
               <a:rPr lang="de-DE" dirty="0"/>
-              <a:t> 32bit integer</a:t>
-            </a:r>
-          </a:p>
-          <a:p>
+              <a:t> Type =&gt; Typ mit einem oder mehreren Datenfeldern. Kommt am Häufigsten in einem Schema vor</a:t>
+            </a:r>
+          </a:p>
+          <a:p>
+            <a:r>
+              <a:rPr lang="de-DE" dirty="0"/>
+              <a:t>Name = Feld des </a:t>
+            </a:r>
             <a:r>
               <a:rPr lang="de-DE" dirty="0" err="1"/>
-              <a:t>Float</a:t>
+              <a:t>Author</a:t>
             </a:r>
             <a:r>
               <a:rPr lang="de-DE" dirty="0"/>
-              <a:t> </a:t>
+              <a:t> Typs</a:t>
+            </a:r>
+          </a:p>
+          <a:p>
+            <a:r>
+              <a:rPr lang="de-DE" dirty="0"/>
+              <a:t>String = einer der eingebauten Scalar Typen von </a:t>
             </a:r>
             <a:r>
               <a:rPr lang="de-DE" dirty="0" err="1"/>
-              <a:t>signed</a:t>
+              <a:t>GraphQL</a:t>
             </a:r>
             <a:r>
               <a:rPr lang="de-DE" dirty="0"/>
-              <a:t> double </a:t>
+              <a:t>, können keine Unterselektion mehr besitzen und lösen sich zu einem einzigen Wert auf</a:t>
+            </a:r>
+          </a:p>
+          <a:p>
+            <a:r>
+              <a:rPr lang="de-DE" dirty="0"/>
+              <a:t>! = Das Feld ist nicht </a:t>
             </a:r>
             <a:r>
               <a:rPr lang="de-DE" dirty="0" err="1"/>
-              <a:t>precision</a:t>
+              <a:t>nullable</a:t>
             </a:r>
             <a:r>
               <a:rPr lang="de-DE" dirty="0"/>
-              <a:t> </a:t>
-            </a:r>
-            <a:r>
-              <a:rPr lang="de-DE" dirty="0" err="1"/>
-              <a:t>float</a:t>
-            </a:r>
-            <a:endParaRPr lang="de-DE" dirty="0"/>
-          </a:p>
-          <a:p>
-            <a:r>
-              <a:rPr lang="de-DE" dirty="0"/>
-              <a:t>String: UTF-8 </a:t>
-            </a:r>
-            <a:r>
-              <a:rPr lang="de-DE" dirty="0" err="1"/>
-              <a:t>character</a:t>
-            </a:r>
-            <a:r>
-              <a:rPr lang="de-DE" dirty="0"/>
-              <a:t> </a:t>
-            </a:r>
-            <a:r>
-              <a:rPr lang="de-DE" dirty="0" err="1"/>
-              <a:t>sequenz</a:t>
-            </a:r>
-            <a:endParaRPr lang="de-DE" dirty="0"/>
-          </a:p>
-          <a:p>
-            <a:r>
-              <a:rPr lang="de-DE" dirty="0"/>
-              <a:t>Boolean: </a:t>
-            </a:r>
-            <a:r>
-              <a:rPr lang="de-DE" dirty="0" err="1"/>
-              <a:t>true</a:t>
-            </a:r>
-            <a:r>
-              <a:rPr lang="de-DE" dirty="0"/>
-              <a:t> / </a:t>
-            </a:r>
-            <a:r>
-              <a:rPr lang="de-DE" dirty="0" err="1"/>
-              <a:t>false</a:t>
-            </a:r>
-            <a:endParaRPr lang="de-DE" dirty="0"/>
-          </a:p>
-          <a:p>
-            <a:r>
-              <a:rPr lang="de-DE" dirty="0"/>
-              <a:t>Date: wird von manchen </a:t>
-            </a:r>
-            <a:r>
-              <a:rPr lang="de-DE" dirty="0" err="1"/>
-              <a:t>libraries</a:t>
-            </a:r>
-            <a:r>
-              <a:rPr lang="de-DE" dirty="0"/>
-              <a:t> schon implementiert, wenn nicht bieten die Frameworks an, eigene Scalar Typen zu implementieren.</a:t>
-            </a:r>
-          </a:p>
-          <a:p>
-            <a:r>
-              <a:rPr lang="de-DE" dirty="0"/>
-              <a:t>ID: </a:t>
-            </a:r>
-            <a:r>
-              <a:rPr lang="de-DE" dirty="0" err="1"/>
-              <a:t>unique</a:t>
-            </a:r>
-            <a:r>
-              <a:rPr lang="de-DE" dirty="0"/>
-              <a:t> </a:t>
-            </a:r>
-            <a:r>
-              <a:rPr lang="de-DE" dirty="0" err="1"/>
-              <a:t>identifier</a:t>
-            </a:r>
-            <a:r>
-              <a:rPr lang="de-DE" dirty="0"/>
-              <a:t>, um </a:t>
-            </a:r>
-            <a:r>
-              <a:rPr lang="de-DE" dirty="0" err="1"/>
-              <a:t>objekt</a:t>
-            </a:r>
-            <a:r>
-              <a:rPr lang="de-DE" dirty="0"/>
-              <a:t> wieder zu holen, oder als </a:t>
-            </a:r>
-            <a:r>
-              <a:rPr lang="de-DE" dirty="0" err="1"/>
-              <a:t>schlüssel</a:t>
-            </a:r>
-            <a:r>
-              <a:rPr lang="de-DE" dirty="0"/>
-              <a:t> für eine </a:t>
-            </a:r>
-            <a:r>
-              <a:rPr lang="de-DE" dirty="0" err="1"/>
-              <a:t>cache</a:t>
-            </a:r>
-            <a:r>
-              <a:rPr lang="de-DE" dirty="0"/>
-              <a:t> </a:t>
-            </a:r>
-            <a:r>
-              <a:rPr lang="de-DE" dirty="0" err="1"/>
-              <a:t>implementierung</a:t>
-            </a:r>
-            <a:r>
-              <a:rPr lang="de-DE" dirty="0"/>
-              <a:t>; wird auf die gleiche weise wie ein </a:t>
-            </a:r>
-            <a:r>
-              <a:rPr lang="de-DE" dirty="0" err="1"/>
-              <a:t>string</a:t>
-            </a:r>
-            <a:r>
-              <a:rPr lang="de-DE" dirty="0"/>
-              <a:t> serialisiert</a:t>
+              <a:t> =&gt; Server verspricht immer einen Wert zurück zu liefern</a:t>
             </a:r>
           </a:p>
         </p:txBody>
@@ -1254,7 +1172,7 @@
           <a:p>
             <a:fld id="{4951A4F0-27A8-4C6D-A90A-FB4CDD31FFC6}" type="slidenum">
               <a:rPr lang="de-DE" smtClean="0"/>
-              <a:t>23</a:t>
+              <a:t>22</a:t>
             </a:fld>
             <a:endParaRPr lang="de-DE"/>
           </a:p>
@@ -1263,7 +1181,7 @@
     </p:spTree>
     <p:extLst>
       <p:ext uri="{BB962C8B-B14F-4D97-AF65-F5344CB8AC3E}">
-        <p14:creationId xmlns:p14="http://schemas.microsoft.com/office/powerpoint/2010/main" val="1288450928"/>
+        <p14:creationId xmlns:p14="http://schemas.microsoft.com/office/powerpoint/2010/main" val="970813291"/>
       </p:ext>
     </p:extLst>
   </p:cSld>
@@ -1318,106 +1236,166 @@
           <a:lstStyle/>
           <a:p>
             <a:r>
-              <a:rPr lang="de-DE" sz="1200" b="0" i="1" kern="1200" dirty="0">
-                <a:solidFill>
-                  <a:schemeClr val="tx1"/>
-                </a:solidFill>
-                <a:effectLst/>
-                <a:latin typeface="+mn-lt"/>
-                <a:ea typeface="+mn-ea"/>
-                <a:cs typeface="+mn-cs"/>
-              </a:rPr>
-              <a:t>[]: Es kommt eine Liste von Objekten vom Typ Post zurück. Da mit Ausrufezeichen markiert ist garantiert das 0 oder mehr Einträge zurück kommen, die alle vom Typ Post sind.</a:t>
-            </a:r>
-          </a:p>
-          <a:p>
-            <a:r>
-              <a:rPr lang="de-DE" sz="1200" b="0" i="1" kern="1200" dirty="0" err="1">
-                <a:solidFill>
-                  <a:schemeClr val="tx1"/>
-                </a:solidFill>
-                <a:effectLst/>
-                <a:latin typeface="+mn-lt"/>
-                <a:ea typeface="+mn-ea"/>
-                <a:cs typeface="+mn-cs"/>
-              </a:rPr>
-              <a:t>one-to-many</a:t>
-            </a:r>
-            <a:r>
-              <a:rPr lang="de-DE" sz="1200" b="0" i="0" kern="1200" dirty="0" err="1">
-                <a:solidFill>
-                  <a:schemeClr val="tx1"/>
-                </a:solidFill>
-                <a:effectLst/>
-                <a:latin typeface="+mn-lt"/>
-                <a:ea typeface="+mn-ea"/>
-                <a:cs typeface="+mn-cs"/>
-              </a:rPr>
-              <a:t>-relationship</a:t>
-            </a:r>
-            <a:r>
-              <a:rPr lang="de-DE" sz="1200" b="0" i="0" kern="1200" dirty="0">
-                <a:solidFill>
-                  <a:schemeClr val="tx1"/>
-                </a:solidFill>
-                <a:effectLst/>
-                <a:latin typeface="+mn-lt"/>
-                <a:ea typeface="+mn-ea"/>
-                <a:cs typeface="+mn-cs"/>
-              </a:rPr>
-              <a:t> zwischen </a:t>
-            </a:r>
-            <a:r>
-              <a:rPr lang="de-DE" sz="1200" b="0" i="0" kern="1200" dirty="0" err="1">
-                <a:solidFill>
-                  <a:schemeClr val="tx1"/>
-                </a:solidFill>
-                <a:effectLst/>
-                <a:latin typeface="+mn-lt"/>
-                <a:ea typeface="+mn-ea"/>
-                <a:cs typeface="+mn-cs"/>
-              </a:rPr>
-              <a:t>Author</a:t>
-            </a:r>
-            <a:r>
-              <a:rPr lang="de-DE" sz="1200" b="0" i="0" kern="1200" dirty="0">
-                <a:solidFill>
-                  <a:schemeClr val="tx1"/>
-                </a:solidFill>
-                <a:effectLst/>
-                <a:latin typeface="+mn-lt"/>
-                <a:ea typeface="+mn-ea"/>
-                <a:cs typeface="+mn-cs"/>
-              </a:rPr>
-              <a:t> und Post. Ein </a:t>
-            </a:r>
-            <a:r>
-              <a:rPr lang="de-DE" sz="1200" b="0" i="0" kern="1200" dirty="0" err="1">
-                <a:solidFill>
-                  <a:schemeClr val="tx1"/>
-                </a:solidFill>
-                <a:effectLst/>
-                <a:latin typeface="+mn-lt"/>
-                <a:ea typeface="+mn-ea"/>
-                <a:cs typeface="+mn-cs"/>
-              </a:rPr>
-              <a:t>Author</a:t>
-            </a:r>
-            <a:r>
-              <a:rPr lang="de-DE" sz="1200" b="0" i="0" kern="1200" dirty="0">
-                <a:solidFill>
-                  <a:schemeClr val="tx1"/>
-                </a:solidFill>
-                <a:effectLst/>
-                <a:latin typeface="+mn-lt"/>
-                <a:ea typeface="+mn-ea"/>
-                <a:cs typeface="+mn-cs"/>
-              </a:rPr>
-              <a:t> kann ein oder viele Posts verfasst haben =&gt; Array von Posts als Feldtyp</a:t>
-            </a:r>
-          </a:p>
-          <a:p>
+              <a:rPr lang="de-DE" dirty="0" err="1"/>
+              <a:t>Int</a:t>
+            </a:r>
+            <a:r>
+              <a:rPr lang="de-DE" dirty="0"/>
+              <a:t>: </a:t>
+            </a:r>
+            <a:r>
+              <a:rPr lang="de-DE" dirty="0" err="1"/>
+              <a:t>signed</a:t>
+            </a:r>
+            <a:r>
+              <a:rPr lang="de-DE" dirty="0"/>
+              <a:t> 32bit integer</a:t>
+            </a:r>
+          </a:p>
+          <a:p>
+            <a:r>
+              <a:rPr lang="de-DE" dirty="0" err="1"/>
+              <a:t>Float</a:t>
+            </a:r>
+            <a:r>
+              <a:rPr lang="de-DE" dirty="0"/>
+              <a:t> </a:t>
+            </a:r>
+            <a:r>
+              <a:rPr lang="de-DE" dirty="0" err="1"/>
+              <a:t>signed</a:t>
+            </a:r>
+            <a:r>
+              <a:rPr lang="de-DE" dirty="0"/>
+              <a:t> double </a:t>
+            </a:r>
+            <a:r>
+              <a:rPr lang="de-DE" dirty="0" err="1"/>
+              <a:t>precision</a:t>
+            </a:r>
+            <a:r>
+              <a:rPr lang="de-DE" dirty="0"/>
+              <a:t> </a:t>
+            </a:r>
+            <a:r>
+              <a:rPr lang="de-DE" dirty="0" err="1"/>
+              <a:t>float</a:t>
+            </a:r>
             <a:endParaRPr lang="de-DE" dirty="0"/>
+          </a:p>
+          <a:p>
+            <a:r>
+              <a:rPr lang="de-DE" dirty="0"/>
+              <a:t>String: UTF-8 </a:t>
+            </a:r>
+            <a:r>
+              <a:rPr lang="de-DE" dirty="0" err="1"/>
+              <a:t>character</a:t>
+            </a:r>
+            <a:r>
+              <a:rPr lang="de-DE" dirty="0"/>
+              <a:t> </a:t>
+            </a:r>
+            <a:r>
+              <a:rPr lang="de-DE" dirty="0" err="1"/>
+              <a:t>sequenz</a:t>
+            </a:r>
+            <a:endParaRPr lang="de-DE" dirty="0"/>
+          </a:p>
+          <a:p>
+            <a:r>
+              <a:rPr lang="de-DE" dirty="0"/>
+              <a:t>Boolean: </a:t>
+            </a:r>
+            <a:r>
+              <a:rPr lang="de-DE" dirty="0" err="1"/>
+              <a:t>true</a:t>
+            </a:r>
+            <a:r>
+              <a:rPr lang="de-DE" dirty="0"/>
+              <a:t> / </a:t>
+            </a:r>
+            <a:r>
+              <a:rPr lang="de-DE" dirty="0" err="1"/>
+              <a:t>false</a:t>
+            </a:r>
+            <a:endParaRPr lang="de-DE" dirty="0"/>
+          </a:p>
+          <a:p>
+            <a:r>
+              <a:rPr lang="de-DE" dirty="0"/>
+              <a:t>Date: wird von manchen </a:t>
+            </a:r>
+            <a:r>
+              <a:rPr lang="de-DE" dirty="0" err="1"/>
+              <a:t>libraries</a:t>
+            </a:r>
+            <a:r>
+              <a:rPr lang="de-DE" dirty="0"/>
+              <a:t> schon implementiert, wenn nicht bieten die Frameworks an, eigene Scalar Typen zu implementieren.</a:t>
+            </a:r>
+          </a:p>
+          <a:p>
+            <a:r>
+              <a:rPr lang="de-DE" dirty="0"/>
+              <a:t>ID: </a:t>
+            </a:r>
+            <a:r>
+              <a:rPr lang="de-DE" dirty="0" err="1"/>
+              <a:t>unique</a:t>
+            </a:r>
+            <a:r>
+              <a:rPr lang="de-DE" dirty="0"/>
+              <a:t> </a:t>
+            </a:r>
+            <a:r>
+              <a:rPr lang="de-DE" dirty="0" err="1"/>
+              <a:t>identifier</a:t>
+            </a:r>
+            <a:r>
+              <a:rPr lang="de-DE" dirty="0"/>
+              <a:t>, um </a:t>
+            </a:r>
+            <a:r>
+              <a:rPr lang="de-DE" dirty="0" err="1"/>
+              <a:t>objekt</a:t>
+            </a:r>
+            <a:r>
+              <a:rPr lang="de-DE" dirty="0"/>
+              <a:t> wieder zu holen, oder als </a:t>
+            </a:r>
+            <a:r>
+              <a:rPr lang="de-DE" dirty="0" err="1"/>
+              <a:t>schlüssel</a:t>
+            </a:r>
+            <a:r>
+              <a:rPr lang="de-DE" dirty="0"/>
+              <a:t> für eine </a:t>
+            </a:r>
+            <a:r>
+              <a:rPr lang="de-DE" dirty="0" err="1"/>
+              <a:t>cache</a:t>
+            </a:r>
+            <a:r>
+              <a:rPr lang="de-DE" dirty="0"/>
+              <a:t> </a:t>
+            </a:r>
+            <a:r>
+              <a:rPr lang="de-DE" dirty="0" err="1"/>
+              <a:t>implementierung</a:t>
+            </a:r>
+            <a:r>
+              <a:rPr lang="de-DE" dirty="0"/>
+              <a:t>; wird auf die gleiche weise wie ein </a:t>
+            </a:r>
+            <a:r>
+              <a:rPr lang="de-DE" dirty="0" err="1"/>
+              <a:t>string</a:t>
+            </a:r>
+            <a:r>
+              <a:rPr lang="de-DE" dirty="0"/>
+              <a:t> serialisiert</a:t>
+            </a:r>
           </a:p>
         </p:txBody>
       </p:sp>
@@ -1438,7 +1416,7 @@
           <a:p>
             <a:fld id="{4951A4F0-27A8-4C6D-A90A-FB4CDD31FFC6}" type="slidenum">
               <a:rPr lang="de-DE" smtClean="0"/>
-              <a:t>24</a:t>
+              <a:t>23</a:t>
             </a:fld>
             <a:endParaRPr lang="de-DE"/>
           </a:p>
@@ -1447,7 +1425,7 @@
     </p:spTree>
     <p:extLst>
       <p:ext uri="{BB962C8B-B14F-4D97-AF65-F5344CB8AC3E}">
-        <p14:creationId xmlns:p14="http://schemas.microsoft.com/office/powerpoint/2010/main" val="1973032472"/>
+        <p14:creationId xmlns:p14="http://schemas.microsoft.com/office/powerpoint/2010/main" val="1288450928"/>
       </p:ext>
     </p:extLst>
   </p:cSld>
@@ -1622,7 +1600,7 @@
           <a:p>
             <a:fld id="{4951A4F0-27A8-4C6D-A90A-FB4CDD31FFC6}" type="slidenum">
               <a:rPr lang="de-DE" smtClean="0"/>
-              <a:t>25</a:t>
+              <a:t>24</a:t>
             </a:fld>
             <a:endParaRPr lang="de-DE"/>
           </a:p>
@@ -1631,7 +1609,7 @@
     </p:spTree>
     <p:extLst>
       <p:ext uri="{BB962C8B-B14F-4D97-AF65-F5344CB8AC3E}">
-        <p14:creationId xmlns:p14="http://schemas.microsoft.com/office/powerpoint/2010/main" val="356632614"/>
+        <p14:creationId xmlns:p14="http://schemas.microsoft.com/office/powerpoint/2010/main" val="1973032472"/>
       </p:ext>
     </p:extLst>
   </p:cSld>
@@ -1806,7 +1784,7 @@
           <a:p>
             <a:fld id="{4951A4F0-27A8-4C6D-A90A-FB4CDD31FFC6}" type="slidenum">
               <a:rPr lang="de-DE" smtClean="0"/>
-              <a:t>26</a:t>
+              <a:t>25</a:t>
             </a:fld>
             <a:endParaRPr lang="de-DE"/>
           </a:p>
@@ -1815,7 +1793,7 @@
     </p:spTree>
     <p:extLst>
       <p:ext uri="{BB962C8B-B14F-4D97-AF65-F5344CB8AC3E}">
-        <p14:creationId xmlns:p14="http://schemas.microsoft.com/office/powerpoint/2010/main" val="251186594"/>
+        <p14:creationId xmlns:p14="http://schemas.microsoft.com/office/powerpoint/2010/main" val="356632614"/>
       </p:ext>
     </p:extLst>
   </p:cSld>
@@ -1990,7 +1968,7 @@
           <a:p>
             <a:fld id="{4951A4F0-27A8-4C6D-A90A-FB4CDD31FFC6}" type="slidenum">
               <a:rPr lang="de-DE" smtClean="0"/>
-              <a:t>27</a:t>
+              <a:t>26</a:t>
             </a:fld>
             <a:endParaRPr lang="de-DE"/>
           </a:p>
@@ -1999,7 +1977,7 @@
     </p:spTree>
     <p:extLst>
       <p:ext uri="{BB962C8B-B14F-4D97-AF65-F5344CB8AC3E}">
-        <p14:creationId xmlns:p14="http://schemas.microsoft.com/office/powerpoint/2010/main" val="1847234564"/>
+        <p14:creationId xmlns:p14="http://schemas.microsoft.com/office/powerpoint/2010/main" val="251186594"/>
       </p:ext>
     </p:extLst>
   </p:cSld>
@@ -2054,29 +2032,105 @@
           <a:lstStyle/>
           <a:p>
             <a:r>
-              <a:rPr lang="de-DE" dirty="0"/>
-              <a:t>Noch anpassen an </a:t>
-            </a:r>
-            <a:r>
-              <a:rPr lang="de-DE" dirty="0" err="1"/>
-              <a:t>vorlage</a:t>
-            </a:r>
-            <a:r>
-              <a:rPr lang="de-DE" dirty="0"/>
-              <a:t> Siehe </a:t>
-            </a:r>
-            <a:r>
-              <a:rPr lang="de-DE" dirty="0" err="1"/>
-              <a:t>skizze</a:t>
-            </a:r>
-            <a:r>
-              <a:rPr lang="de-DE" dirty="0"/>
-              <a:t> von </a:t>
-            </a:r>
-            <a:r>
-              <a:rPr lang="de-DE" dirty="0" err="1"/>
-              <a:t>matthias</a:t>
-            </a:r>
+              <a:rPr lang="de-DE" sz="1200" b="0" i="1" kern="1200" dirty="0">
+                <a:solidFill>
+                  <a:schemeClr val="tx1"/>
+                </a:solidFill>
+                <a:effectLst/>
+                <a:latin typeface="+mn-lt"/>
+                <a:ea typeface="+mn-ea"/>
+                <a:cs typeface="+mn-cs"/>
+              </a:rPr>
+              <a:t>[]: Es kommt eine Liste von Objekten vom Typ Post zurück. Da mit Ausrufezeichen markiert ist garantiert das 0 oder mehr Einträge zurück kommen, die alle vom Typ Post sind.</a:t>
+            </a:r>
+          </a:p>
+          <a:p>
+            <a:r>
+              <a:rPr lang="de-DE" sz="1200" b="0" i="1" kern="1200" dirty="0" err="1">
+                <a:solidFill>
+                  <a:schemeClr val="tx1"/>
+                </a:solidFill>
+                <a:effectLst/>
+                <a:latin typeface="+mn-lt"/>
+                <a:ea typeface="+mn-ea"/>
+                <a:cs typeface="+mn-cs"/>
+              </a:rPr>
+              <a:t>one-to-many</a:t>
+            </a:r>
+            <a:r>
+              <a:rPr lang="de-DE" sz="1200" b="0" i="0" kern="1200" dirty="0" err="1">
+                <a:solidFill>
+                  <a:schemeClr val="tx1"/>
+                </a:solidFill>
+                <a:effectLst/>
+                <a:latin typeface="+mn-lt"/>
+                <a:ea typeface="+mn-ea"/>
+                <a:cs typeface="+mn-cs"/>
+              </a:rPr>
+              <a:t>-relationship</a:t>
+            </a:r>
+            <a:r>
+              <a:rPr lang="de-DE" sz="1200" b="0" i="0" kern="1200" dirty="0">
+                <a:solidFill>
+                  <a:schemeClr val="tx1"/>
+                </a:solidFill>
+                <a:effectLst/>
+                <a:latin typeface="+mn-lt"/>
+                <a:ea typeface="+mn-ea"/>
+                <a:cs typeface="+mn-cs"/>
+              </a:rPr>
+              <a:t> zwischen </a:t>
+            </a:r>
+            <a:r>
+              <a:rPr lang="de-DE" sz="1200" b="0" i="0" kern="1200" dirty="0" err="1">
+                <a:solidFill>
+                  <a:schemeClr val="tx1"/>
+                </a:solidFill>
+                <a:effectLst/>
+                <a:latin typeface="+mn-lt"/>
+                <a:ea typeface="+mn-ea"/>
+                <a:cs typeface="+mn-cs"/>
+              </a:rPr>
+              <a:t>Author</a:t>
+            </a:r>
+            <a:r>
+              <a:rPr lang="de-DE" sz="1200" b="0" i="0" kern="1200" dirty="0">
+                <a:solidFill>
+                  <a:schemeClr val="tx1"/>
+                </a:solidFill>
+                <a:effectLst/>
+                <a:latin typeface="+mn-lt"/>
+                <a:ea typeface="+mn-ea"/>
+                <a:cs typeface="+mn-cs"/>
+              </a:rPr>
+              <a:t> und Post. Ein </a:t>
+            </a:r>
+            <a:r>
+              <a:rPr lang="de-DE" sz="1200" b="0" i="0" kern="1200" dirty="0" err="1">
+                <a:solidFill>
+                  <a:schemeClr val="tx1"/>
+                </a:solidFill>
+                <a:effectLst/>
+                <a:latin typeface="+mn-lt"/>
+                <a:ea typeface="+mn-ea"/>
+                <a:cs typeface="+mn-cs"/>
+              </a:rPr>
+              <a:t>Author</a:t>
+            </a:r>
+            <a:r>
+              <a:rPr lang="de-DE" sz="1200" b="0" i="0" kern="1200" dirty="0">
+                <a:solidFill>
+                  <a:schemeClr val="tx1"/>
+                </a:solidFill>
+                <a:effectLst/>
+                <a:latin typeface="+mn-lt"/>
+                <a:ea typeface="+mn-ea"/>
+                <a:cs typeface="+mn-cs"/>
+              </a:rPr>
+              <a:t> kann ein oder viele Posts verfasst haben =&gt; Array von Posts als Feldtyp</a:t>
+            </a:r>
+          </a:p>
+          <a:p>
             <a:endParaRPr lang="de-DE" dirty="0"/>
           </a:p>
         </p:txBody>
@@ -2098,7 +2152,7 @@
           <a:p>
             <a:fld id="{4951A4F0-27A8-4C6D-A90A-FB4CDD31FFC6}" type="slidenum">
               <a:rPr lang="de-DE" smtClean="0"/>
-              <a:t>28</a:t>
+              <a:t>27</a:t>
             </a:fld>
             <a:endParaRPr lang="de-DE"/>
           </a:p>
@@ -2107,7 +2161,7 @@
     </p:spTree>
     <p:extLst>
       <p:ext uri="{BB962C8B-B14F-4D97-AF65-F5344CB8AC3E}">
-        <p14:creationId xmlns:p14="http://schemas.microsoft.com/office/powerpoint/2010/main" val="4182998493"/>
+        <p14:creationId xmlns:p14="http://schemas.microsoft.com/office/powerpoint/2010/main" val="1847234564"/>
       </p:ext>
     </p:extLst>
   </p:cSld>
@@ -2162,29 +2216,30 @@
           <a:lstStyle/>
           <a:p>
             <a:r>
+              <a:rPr lang="de-DE" dirty="0"/>
+              <a:t>Noch anpassen an </a:t>
+            </a:r>
+            <a:r>
               <a:rPr lang="de-DE" dirty="0" err="1"/>
-              <a:t>Passed</a:t>
+              <a:t>vorlage</a:t>
             </a:r>
             <a:r>
               <a:rPr lang="de-DE" dirty="0"/>
-              <a:t> </a:t>
+              <a:t> Siehe </a:t>
             </a:r>
             <a:r>
               <a:rPr lang="de-DE" dirty="0" err="1"/>
-              <a:t>by</a:t>
+              <a:t>skizze</a:t>
             </a:r>
             <a:r>
               <a:rPr lang="de-DE" dirty="0"/>
-              <a:t> </a:t>
+              <a:t> von </a:t>
             </a:r>
             <a:r>
               <a:rPr lang="de-DE" dirty="0" err="1"/>
-              <a:t>name</a:t>
-            </a:r>
-            <a:r>
-              <a:rPr lang="de-DE" dirty="0"/>
-              <a:t>, Argumente können zwingend oder optional sein.</a:t>
-            </a:r>
+              <a:t>matthias</a:t>
+            </a:r>
+            <a:endParaRPr lang="de-DE" dirty="0"/>
           </a:p>
         </p:txBody>
       </p:sp>
@@ -2205,7 +2260,7 @@
           <a:p>
             <a:fld id="{4951A4F0-27A8-4C6D-A90A-FB4CDD31FFC6}" type="slidenum">
               <a:rPr lang="de-DE" smtClean="0"/>
-              <a:t>29</a:t>
+              <a:t>28</a:t>
             </a:fld>
             <a:endParaRPr lang="de-DE"/>
           </a:p>
@@ -2214,7 +2269,7 @@
     </p:spTree>
     <p:extLst>
       <p:ext uri="{BB962C8B-B14F-4D97-AF65-F5344CB8AC3E}">
-        <p14:creationId xmlns:p14="http://schemas.microsoft.com/office/powerpoint/2010/main" val="3211781086"/>
+        <p14:creationId xmlns:p14="http://schemas.microsoft.com/office/powerpoint/2010/main" val="4182998493"/>
       </p:ext>
     </p:extLst>
   </p:cSld>
@@ -2508,7 +2563,7 @@
           <a:p>
             <a:fld id="{4951A4F0-27A8-4C6D-A90A-FB4CDD31FFC6}" type="slidenum">
               <a:rPr lang="de-DE" smtClean="0"/>
-              <a:t>30</a:t>
+              <a:t>29</a:t>
             </a:fld>
             <a:endParaRPr lang="de-DE"/>
           </a:p>
@@ -2517,7 +2572,7 @@
     </p:spTree>
     <p:extLst>
       <p:ext uri="{BB962C8B-B14F-4D97-AF65-F5344CB8AC3E}">
-        <p14:creationId xmlns:p14="http://schemas.microsoft.com/office/powerpoint/2010/main" val="590215556"/>
+        <p14:creationId xmlns:p14="http://schemas.microsoft.com/office/powerpoint/2010/main" val="3211781086"/>
       </p:ext>
     </p:extLst>
   </p:cSld>
@@ -2615,7 +2670,7 @@
           <a:p>
             <a:fld id="{4951A4F0-27A8-4C6D-A90A-FB4CDD31FFC6}" type="slidenum">
               <a:rPr lang="de-DE" smtClean="0"/>
-              <a:t>31</a:t>
+              <a:t>30</a:t>
             </a:fld>
             <a:endParaRPr lang="de-DE"/>
           </a:p>
@@ -2624,7 +2679,7 @@
     </p:spTree>
     <p:extLst>
       <p:ext uri="{BB962C8B-B14F-4D97-AF65-F5344CB8AC3E}">
-        <p14:creationId xmlns:p14="http://schemas.microsoft.com/office/powerpoint/2010/main" val="3150571078"/>
+        <p14:creationId xmlns:p14="http://schemas.microsoft.com/office/powerpoint/2010/main" val="590215556"/>
       </p:ext>
     </p:extLst>
   </p:cSld>
@@ -2680,25 +2735,27 @@
           <a:p>
             <a:r>
               <a:rPr lang="de-DE" dirty="0" err="1"/>
-              <a:t>Mutations</a:t>
+              <a:t>Passed</a:t>
             </a:r>
             <a:r>
               <a:rPr lang="de-DE" dirty="0"/>
-              <a:t> werden benutzt um Daten zu erstellen, upzudaten, oder zu löschen</a:t>
-            </a:r>
-          </a:p>
-          <a:p>
+              <a:t> </a:t>
+            </a:r>
+            <a:r>
+              <a:rPr lang="de-DE" dirty="0" err="1"/>
+              <a:t>by</a:t>
+            </a:r>
             <a:r>
               <a:rPr lang="de-DE" dirty="0"/>
-              <a:t>Mehrere </a:t>
+              <a:t> </a:t>
             </a:r>
             <a:r>
               <a:rPr lang="de-DE" dirty="0" err="1"/>
-              <a:t>Mutations</a:t>
+              <a:t>name</a:t>
             </a:r>
             <a:r>
               <a:rPr lang="de-DE" dirty="0"/>
-              <a:t> können mit einem einzigen Request gesendet werden. Sie werden vom Server sequentiell, also in der Reihenfolge wie sie definiert wurden, abgearbeitet.</a:t>
+              <a:t>, Argumente können zwingend oder optional sein.</a:t>
             </a:r>
           </a:p>
         </p:txBody>
@@ -2720,7 +2777,7 @@
           <a:p>
             <a:fld id="{4951A4F0-27A8-4C6D-A90A-FB4CDD31FFC6}" type="slidenum">
               <a:rPr lang="de-DE" smtClean="0"/>
-              <a:t>33</a:t>
+              <a:t>31</a:t>
             </a:fld>
             <a:endParaRPr lang="de-DE"/>
           </a:p>
@@ -2729,7 +2786,7 @@
     </p:spTree>
     <p:extLst>
       <p:ext uri="{BB962C8B-B14F-4D97-AF65-F5344CB8AC3E}">
-        <p14:creationId xmlns:p14="http://schemas.microsoft.com/office/powerpoint/2010/main" val="2770499957"/>
+        <p14:creationId xmlns:p14="http://schemas.microsoft.com/office/powerpoint/2010/main" val="3150571078"/>
       </p:ext>
     </p:extLst>
   </p:cSld>
@@ -2785,11 +2842,25 @@
           <a:p>
             <a:r>
               <a:rPr lang="de-DE" dirty="0" err="1"/>
-              <a:t>InputTypes</a:t>
+              <a:t>Mutations</a:t>
             </a:r>
             <a:r>
               <a:rPr lang="de-DE" dirty="0"/>
-              <a:t> notwendig, da bisher kennen  </a:t>
+              <a:t> werden benutzt um Daten zu erstellen, upzudaten, oder zu löschen</a:t>
+            </a:r>
+          </a:p>
+          <a:p>
+            <a:r>
+              <a:rPr lang="de-DE" dirty="0"/>
+              <a:t>Mehrere </a:t>
+            </a:r>
+            <a:r>
+              <a:rPr lang="de-DE" dirty="0" err="1"/>
+              <a:t>Mutations</a:t>
+            </a:r>
+            <a:r>
+              <a:rPr lang="de-DE" dirty="0"/>
+              <a:t> können mit einem einzigen Request gesendet werden. Sie werden vom Server sequentiell, also in der Reihenfolge wie sie definiert wurden, abgearbeitet.</a:t>
             </a:r>
           </a:p>
         </p:txBody>
@@ -2811,7 +2882,7 @@
           <a:p>
             <a:fld id="{4951A4F0-27A8-4C6D-A90A-FB4CDD31FFC6}" type="slidenum">
               <a:rPr lang="de-DE" smtClean="0"/>
-              <a:t>34</a:t>
+              <a:t>33</a:t>
             </a:fld>
             <a:endParaRPr lang="de-DE"/>
           </a:p>
@@ -2820,7 +2891,7 @@
     </p:spTree>
     <p:extLst>
       <p:ext uri="{BB962C8B-B14F-4D97-AF65-F5344CB8AC3E}">
-        <p14:creationId xmlns:p14="http://schemas.microsoft.com/office/powerpoint/2010/main" val="4248759428"/>
+        <p14:creationId xmlns:p14="http://schemas.microsoft.com/office/powerpoint/2010/main" val="2770499957"/>
       </p:ext>
     </p:extLst>
   </p:cSld>
@@ -2875,58 +2946,13 @@
           <a:lstStyle/>
           <a:p>
             <a:r>
+              <a:rPr lang="de-DE" dirty="0" err="1"/>
+              <a:t>InputTypes</a:t>
+            </a:r>
+            <a:r>
               <a:rPr lang="de-DE" dirty="0"/>
-              <a:t>Im Gegensatz zu Rest verwendet </a:t>
-            </a:r>
-            <a:r>
-              <a:rPr lang="de-DE" dirty="0" err="1"/>
-              <a:t>GraphQL</a:t>
-            </a:r>
-            <a:r>
-              <a:rPr lang="de-DE" dirty="0"/>
-              <a:t> nur einen HTTP Status code. Liefert im Fehlerfall also zum Beispiel keine 404 zurück. Das macht die die Fehlerbehandlung etwas komplexer, da kein direktes Feedback vom Server zurück kommt. Stattdessen wird eine Fehlermeldung in der </a:t>
-            </a:r>
-            <a:r>
-              <a:rPr lang="de-DE" dirty="0" err="1"/>
-              <a:t>Antwortjson</a:t>
-            </a:r>
-            <a:r>
-              <a:rPr lang="de-DE" dirty="0"/>
-              <a:t> </a:t>
-            </a:r>
-            <a:r>
-              <a:rPr lang="de-DE" dirty="0" err="1"/>
-              <a:t>gewrappt</a:t>
-            </a:r>
-            <a:r>
-              <a:rPr lang="de-DE" dirty="0"/>
-              <a:t> und es muss im </a:t>
-            </a:r>
-            <a:r>
-              <a:rPr lang="de-DE" dirty="0" err="1"/>
-              <a:t>client</a:t>
-            </a:r>
-            <a:r>
-              <a:rPr lang="de-DE" dirty="0"/>
-              <a:t> entsprechend darauf reagiert werden</a:t>
-            </a:r>
-          </a:p>
-          <a:p>
-            <a:r>
-              <a:rPr lang="de-DE" dirty="0"/>
-              <a:t>Begründung, </a:t>
-            </a:r>
-            <a:r>
-              <a:rPr lang="de-DE" dirty="0" err="1"/>
-              <a:t>GraphQL</a:t>
-            </a:r>
-            <a:r>
-              <a:rPr lang="de-DE" dirty="0"/>
-              <a:t> ist ja Protokoll agnostisch, könnte theoretisch auch ohne http eingesetzt werden, deshalb kann auch nicht drauf eingegangen werden</a:t>
-            </a:r>
-          </a:p>
-          <a:p>
-            <a:endParaRPr lang="de-DE" dirty="0"/>
+              <a:t> notwendig, da bisher kennen  </a:t>
+            </a:r>
           </a:p>
         </p:txBody>
       </p:sp>
@@ -2947,7 +2973,7 @@
           <a:p>
             <a:fld id="{4951A4F0-27A8-4C6D-A90A-FB4CDD31FFC6}" type="slidenum">
               <a:rPr lang="de-DE" smtClean="0"/>
-              <a:t>44</a:t>
+              <a:t>34</a:t>
             </a:fld>
             <a:endParaRPr lang="de-DE"/>
           </a:p>
@@ -2956,7 +2982,7 @@
     </p:spTree>
     <p:extLst>
       <p:ext uri="{BB962C8B-B14F-4D97-AF65-F5344CB8AC3E}">
-        <p14:creationId xmlns:p14="http://schemas.microsoft.com/office/powerpoint/2010/main" val="2310014062"/>
+        <p14:creationId xmlns:p14="http://schemas.microsoft.com/office/powerpoint/2010/main" val="4248759428"/>
       </p:ext>
     </p:extLst>
   </p:cSld>
@@ -3083,6 +3109,142 @@
           <a:p>
             <a:fld id="{4951A4F0-27A8-4C6D-A90A-FB4CDD31FFC6}" type="slidenum">
               <a:rPr lang="de-DE" smtClean="0"/>
+              <a:t>44</a:t>
+            </a:fld>
+            <a:endParaRPr lang="de-DE"/>
+          </a:p>
+        </p:txBody>
+      </p:sp>
+    </p:spTree>
+    <p:extLst>
+      <p:ext uri="{BB962C8B-B14F-4D97-AF65-F5344CB8AC3E}">
+        <p14:creationId xmlns:p14="http://schemas.microsoft.com/office/powerpoint/2010/main" val="2310014062"/>
+      </p:ext>
+    </p:extLst>
+  </p:cSld>
+  <p:clrMapOvr>
+    <a:masterClrMapping/>
+  </p:clrMapOvr>
+</p:notes>
+</file>
+
+<file path=ppt/notesSlides/notesSlide26.xml><?xml version="1.0" encoding="utf-8"?>
+<p:notes xmlns:a="http://schemas.openxmlformats.org/drawingml/2006/main" xmlns:r="http://schemas.openxmlformats.org/officeDocument/2006/relationships" xmlns:p="http://schemas.openxmlformats.org/presentationml/2006/main">
+  <p:cSld>
+    <p:spTree>
+      <p:nvGrpSpPr>
+        <p:cNvPr id="1" name=""/>
+        <p:cNvGrpSpPr/>
+        <p:nvPr/>
+      </p:nvGrpSpPr>
+      <p:grpSpPr>
+        <a:xfrm>
+          <a:off x="0" y="0"/>
+          <a:ext cx="0" cy="0"/>
+          <a:chOff x="0" y="0"/>
+          <a:chExt cx="0" cy="0"/>
+        </a:xfrm>
+      </p:grpSpPr>
+      <p:sp>
+        <p:nvSpPr>
+          <p:cNvPr id="2" name="Folienbildplatzhalter 1"/>
+          <p:cNvSpPr>
+            <a:spLocks noGrp="1" noRot="1" noChangeAspect="1"/>
+          </p:cNvSpPr>
+          <p:nvPr>
+            <p:ph type="sldImg"/>
+          </p:nvPr>
+        </p:nvSpPr>
+        <p:spPr/>
+      </p:sp>
+      <p:sp>
+        <p:nvSpPr>
+          <p:cNvPr id="3" name="Notizenplatzhalter 2"/>
+          <p:cNvSpPr>
+            <a:spLocks noGrp="1"/>
+          </p:cNvSpPr>
+          <p:nvPr>
+            <p:ph type="body" idx="1"/>
+          </p:nvPr>
+        </p:nvSpPr>
+        <p:spPr/>
+        <p:txBody>
+          <a:bodyPr/>
+          <a:lstStyle/>
+          <a:p>
+            <a:r>
+              <a:rPr lang="de-DE" dirty="0"/>
+              <a:t>Im Gegensatz zu Rest verwendet </a:t>
+            </a:r>
+            <a:r>
+              <a:rPr lang="de-DE" dirty="0" err="1"/>
+              <a:t>GraphQL</a:t>
+            </a:r>
+            <a:r>
+              <a:rPr lang="de-DE" dirty="0"/>
+              <a:t> nur einen HTTP Status code. Liefert im Fehlerfall also zum Beispiel keine 404 zurück. Das macht die die Fehlerbehandlung etwas komplexer, da kein direktes Feedback vom Server zurück kommt. Stattdessen wird eine Fehlermeldung in der </a:t>
+            </a:r>
+            <a:r>
+              <a:rPr lang="de-DE" dirty="0" err="1"/>
+              <a:t>Antwortjson</a:t>
+            </a:r>
+            <a:r>
+              <a:rPr lang="de-DE" dirty="0"/>
+              <a:t> </a:t>
+            </a:r>
+            <a:r>
+              <a:rPr lang="de-DE" dirty="0" err="1"/>
+              <a:t>gewrappt</a:t>
+            </a:r>
+            <a:r>
+              <a:rPr lang="de-DE" dirty="0"/>
+              <a:t> und es muss im </a:t>
+            </a:r>
+            <a:r>
+              <a:rPr lang="de-DE" dirty="0" err="1"/>
+              <a:t>client</a:t>
+            </a:r>
+            <a:r>
+              <a:rPr lang="de-DE" dirty="0"/>
+              <a:t> entsprechend darauf reagiert werden</a:t>
+            </a:r>
+          </a:p>
+          <a:p>
+            <a:r>
+              <a:rPr lang="de-DE" dirty="0"/>
+              <a:t>Begründung, </a:t>
+            </a:r>
+            <a:r>
+              <a:rPr lang="de-DE" dirty="0" err="1"/>
+              <a:t>GraphQL</a:t>
+            </a:r>
+            <a:r>
+              <a:rPr lang="de-DE" dirty="0"/>
+              <a:t> ist ja Protokoll agnostisch, könnte theoretisch auch ohne http eingesetzt werden, deshalb kann auch nicht drauf eingegangen werden</a:t>
+            </a:r>
+          </a:p>
+          <a:p>
+            <a:endParaRPr lang="de-DE" dirty="0"/>
+          </a:p>
+        </p:txBody>
+      </p:sp>
+      <p:sp>
+        <p:nvSpPr>
+          <p:cNvPr id="4" name="Foliennummernplatzhalter 3"/>
+          <p:cNvSpPr>
+            <a:spLocks noGrp="1"/>
+          </p:cNvSpPr>
+          <p:nvPr>
+            <p:ph type="sldNum" sz="quarter" idx="5"/>
+          </p:nvPr>
+        </p:nvSpPr>
+        <p:spPr/>
+        <p:txBody>
+          <a:bodyPr/>
+          <a:lstStyle/>
+          <a:p>
+            <a:fld id="{4951A4F0-27A8-4C6D-A90A-FB4CDD31FFC6}" type="slidenum">
+              <a:rPr lang="de-DE" smtClean="0"/>
               <a:t>45</a:t>
             </a:fld>
             <a:endParaRPr lang="de-DE"/>
@@ -3102,7 +3264,7 @@
 </p:notes>
 </file>
 
-<file path=ppt/notesSlides/notesSlide26.xml><?xml version="1.0" encoding="utf-8"?>
+<file path=ppt/notesSlides/notesSlide27.xml><?xml version="1.0" encoding="utf-8"?>
 <p:notes xmlns:a="http://schemas.openxmlformats.org/drawingml/2006/main" xmlns:r="http://schemas.openxmlformats.org/officeDocument/2006/relationships" xmlns:p="http://schemas.openxmlformats.org/presentationml/2006/main">
   <p:cSld>
     <p:spTree>
@@ -3533,10 +3695,7 @@
           <a:bodyPr/>
           <a:lstStyle/>
           <a:p>
-            <a:r>
-              <a:rPr lang="de-DE" dirty="0"/>
-              <a:t>Wird häufig mit Abfragesprache für Datenbanken verwechselt</a:t>
-            </a:r>
+            <a:endParaRPr lang="de-DE" dirty="0"/>
           </a:p>
         </p:txBody>
       </p:sp>
@@ -3620,64 +3779,7 @@
           <a:bodyPr/>
           <a:lstStyle/>
           <a:p>
-            <a:r>
-              <a:rPr lang="de-DE" dirty="0" err="1"/>
-              <a:t>Author</a:t>
-            </a:r>
-            <a:r>
-              <a:rPr lang="de-DE" dirty="0"/>
-              <a:t> = </a:t>
-            </a:r>
-            <a:r>
-              <a:rPr lang="de-DE" dirty="0" err="1"/>
-              <a:t>Object</a:t>
-            </a:r>
-            <a:r>
-              <a:rPr lang="de-DE" dirty="0"/>
-              <a:t> Type =&gt; Typ mit einem oder mehreren Datenfeldern. Kommt am Häufigsten in einem Schema vor</a:t>
-            </a:r>
-          </a:p>
-          <a:p>
-            <a:r>
-              <a:rPr lang="de-DE" dirty="0"/>
-              <a:t>Name = Feld des </a:t>
-            </a:r>
-            <a:r>
-              <a:rPr lang="de-DE" dirty="0" err="1"/>
-              <a:t>Author</a:t>
-            </a:r>
-            <a:r>
-              <a:rPr lang="de-DE" dirty="0"/>
-              <a:t> Typs</a:t>
-            </a:r>
-          </a:p>
-          <a:p>
-            <a:r>
-              <a:rPr lang="de-DE" dirty="0"/>
-              <a:t>String = einer der eingebauten Scalar Typen von </a:t>
-            </a:r>
-            <a:r>
-              <a:rPr lang="de-DE" dirty="0" err="1"/>
-              <a:t>GraphQL</a:t>
-            </a:r>
-            <a:r>
-              <a:rPr lang="de-DE" dirty="0"/>
-              <a:t>, können keine Unterselektion mehr besitzen und lösen sich zu einem einzigen Wert auf</a:t>
-            </a:r>
-          </a:p>
-          <a:p>
-            <a:r>
-              <a:rPr lang="de-DE" dirty="0"/>
-              <a:t>! = Das Feld ist nicht </a:t>
-            </a:r>
-            <a:r>
-              <a:rPr lang="de-DE" dirty="0" err="1"/>
-              <a:t>nullable</a:t>
-            </a:r>
-            <a:r>
-              <a:rPr lang="de-DE" dirty="0"/>
-              <a:t> =&gt; Server verspricht immer einen Wert zurück zu liefern</a:t>
-            </a:r>
+            <a:endParaRPr lang="de-DE" dirty="0"/>
           </a:p>
         </p:txBody>
       </p:sp>
@@ -3698,7 +3800,7 @@
           <a:p>
             <a:fld id="{4951A4F0-27A8-4C6D-A90A-FB4CDD31FFC6}" type="slidenum">
               <a:rPr lang="de-DE" smtClean="0"/>
-              <a:t>17</a:t>
+              <a:t>9</a:t>
             </a:fld>
             <a:endParaRPr lang="de-DE"/>
           </a:p>
@@ -3707,7 +3809,7 @@
     </p:spTree>
     <p:extLst>
       <p:ext uri="{BB962C8B-B14F-4D97-AF65-F5344CB8AC3E}">
-        <p14:creationId xmlns:p14="http://schemas.microsoft.com/office/powerpoint/2010/main" val="1518922089"/>
+        <p14:creationId xmlns:p14="http://schemas.microsoft.com/office/powerpoint/2010/main" val="3721812299"/>
       </p:ext>
     </p:extLst>
   </p:cSld>
@@ -3839,7 +3941,7 @@
           <a:p>
             <a:fld id="{4951A4F0-27A8-4C6D-A90A-FB4CDD31FFC6}" type="slidenum">
               <a:rPr lang="de-DE" smtClean="0"/>
-              <a:t>18</a:t>
+              <a:t>17</a:t>
             </a:fld>
             <a:endParaRPr lang="de-DE"/>
           </a:p>
@@ -3848,7 +3950,7 @@
     </p:spTree>
     <p:extLst>
       <p:ext uri="{BB962C8B-B14F-4D97-AF65-F5344CB8AC3E}">
-        <p14:creationId xmlns:p14="http://schemas.microsoft.com/office/powerpoint/2010/main" val="2053084685"/>
+        <p14:creationId xmlns:p14="http://schemas.microsoft.com/office/powerpoint/2010/main" val="1518922089"/>
       </p:ext>
     </p:extLst>
   </p:cSld>
@@ -3980,7 +4082,7 @@
           <a:p>
             <a:fld id="{4951A4F0-27A8-4C6D-A90A-FB4CDD31FFC6}" type="slidenum">
               <a:rPr lang="de-DE" smtClean="0"/>
-              <a:t>19</a:t>
+              <a:t>18</a:t>
             </a:fld>
             <a:endParaRPr lang="de-DE"/>
           </a:p>
@@ -3989,7 +4091,7 @@
     </p:spTree>
     <p:extLst>
       <p:ext uri="{BB962C8B-B14F-4D97-AF65-F5344CB8AC3E}">
-        <p14:creationId xmlns:p14="http://schemas.microsoft.com/office/powerpoint/2010/main" val="3704860397"/>
+        <p14:creationId xmlns:p14="http://schemas.microsoft.com/office/powerpoint/2010/main" val="2053084685"/>
       </p:ext>
     </p:extLst>
   </p:cSld>
@@ -7242,7 +7344,7 @@
                 <a14:useLocalDpi xmlns:a14="http://schemas.microsoft.com/office/drawing/2010/main" val="0"/>
               </a:ext>
               <a:ext uri="{96DAC541-7B7A-43D3-8B79-37D633B846F1}">
-                <asvg:svgBlip xmlns:asvg="http://schemas.microsoft.com/office/drawing/2016/SVG/main" xmlns="" r:embed="rId4"/>
+                <asvg:svgBlip xmlns:asvg="http://schemas.microsoft.com/office/drawing/2016/SVG/main" r:embed="rId4"/>
               </a:ext>
             </a:extLst>
           </a:blip>
@@ -7383,13 +7485,6 @@
   <p:clrMapOvr>
     <a:masterClrMapping/>
   </p:clrMapOvr>
-  <p:timing>
-    <p:tnLst>
-      <p:par>
-        <p:cTn id="1" dur="indefinite" restart="never" nodeType="tmRoot"/>
-      </p:par>
-    </p:tnLst>
-  </p:timing>
 </p:sld>
 </file>
 
@@ -7562,26 +7657,7 @@
                 <a:ea typeface="+mn-ea"/>
                 <a:cs typeface="+mn-cs"/>
               </a:rPr>
-              <a:t>  </a:t>
-            </a:r>
-            <a:r>
-              <a:rPr kumimoji="0" lang="en-US" sz="1800" b="0" i="0" u="none" strike="noStrike" kern="1200" cap="none" spc="0" normalizeH="0" baseline="0" noProof="0" smtClean="0">
-                <a:ln>
-                  <a:noFill/>
-                </a:ln>
-                <a:solidFill>
-                  <a:schemeClr val="bg2">
-                    <a:lumMod val="75000"/>
-                  </a:schemeClr>
-                </a:solidFill>
-                <a:effectLst/>
-                <a:uLnTx/>
-                <a:uFillTx/>
-                <a:latin typeface="Fira Code" panose="020B0509050000020004" pitchFamily="49" charset="0"/>
-                <a:ea typeface="+mn-ea"/>
-                <a:cs typeface="+mn-cs"/>
-              </a:rPr>
-              <a:t>posts </a:t>
+              <a:t>  posts </a:t>
             </a:r>
             <a:r>
               <a:rPr kumimoji="0" lang="en-US" sz="1800" b="0" i="0" u="none" strike="noStrike" kern="1200" cap="none" spc="0" normalizeH="0" baseline="0" noProof="0" dirty="0">
@@ -7638,26 +7714,7 @@
                 <a:ea typeface="+mn-ea"/>
                 <a:cs typeface="+mn-cs"/>
               </a:rPr>
-              <a:t>  </a:t>
-            </a:r>
-            <a:r>
-              <a:rPr kumimoji="0" lang="en-US" sz="1800" b="0" i="0" u="none" strike="noStrike" kern="1200" cap="none" spc="0" normalizeH="0" baseline="0" noProof="0" smtClean="0">
-                <a:ln>
-                  <a:noFill/>
-                </a:ln>
-                <a:solidFill>
-                  <a:schemeClr val="bg2">
-                    <a:lumMod val="75000"/>
-                  </a:schemeClr>
-                </a:solidFill>
-                <a:effectLst/>
-                <a:uLnTx/>
-                <a:uFillTx/>
-                <a:latin typeface="Fira Code" panose="020B0509050000020004" pitchFamily="49" charset="0"/>
-                <a:ea typeface="+mn-ea"/>
-                <a:cs typeface="+mn-cs"/>
-              </a:rPr>
-              <a:t>  </a:t>
+              <a:t>    </a:t>
             </a:r>
             <a:r>
               <a:rPr kumimoji="0" lang="en-US" sz="1800" b="0" i="0" u="none" strike="noStrike" kern="1200" cap="none" spc="0" normalizeH="0" baseline="0" noProof="0" dirty="0">
@@ -7714,26 +7771,7 @@
                 <a:ea typeface="+mn-ea"/>
                 <a:cs typeface="+mn-cs"/>
               </a:rPr>
-              <a:t>  </a:t>
-            </a:r>
-            <a:r>
-              <a:rPr kumimoji="0" lang="en-US" sz="1800" b="0" i="0" u="none" strike="noStrike" kern="1200" cap="none" spc="0" normalizeH="0" baseline="0" noProof="0" smtClean="0">
-                <a:ln>
-                  <a:noFill/>
-                </a:ln>
-                <a:solidFill>
-                  <a:schemeClr val="bg2">
-                    <a:lumMod val="75000"/>
-                  </a:schemeClr>
-                </a:solidFill>
-                <a:effectLst/>
-                <a:uLnTx/>
-                <a:uFillTx/>
-                <a:latin typeface="Fira Code" panose="020B0509050000020004" pitchFamily="49" charset="0"/>
-                <a:ea typeface="+mn-ea"/>
-                <a:cs typeface="+mn-cs"/>
-              </a:rPr>
-              <a:t>  </a:t>
+              <a:t>    </a:t>
             </a:r>
             <a:r>
               <a:rPr kumimoji="0" lang="en-US" sz="1800" b="0" i="0" u="none" strike="noStrike" kern="1200" cap="none" spc="0" normalizeH="0" baseline="0" noProof="0" dirty="0">
@@ -7790,26 +7828,7 @@
                 <a:ea typeface="+mn-ea"/>
                 <a:cs typeface="+mn-cs"/>
               </a:rPr>
-              <a:t>  </a:t>
-            </a:r>
-            <a:r>
-              <a:rPr kumimoji="0" lang="en-US" sz="1800" b="0" i="0" u="none" strike="noStrike" kern="1200" cap="none" spc="0" normalizeH="0" baseline="0" noProof="0" smtClean="0">
-                <a:ln>
-                  <a:noFill/>
-                </a:ln>
-                <a:solidFill>
-                  <a:schemeClr val="bg2">
-                    <a:lumMod val="75000"/>
-                  </a:schemeClr>
-                </a:solidFill>
-                <a:effectLst/>
-                <a:uLnTx/>
-                <a:uFillTx/>
-                <a:latin typeface="Fira Code" panose="020B0509050000020004" pitchFamily="49" charset="0"/>
-                <a:ea typeface="+mn-ea"/>
-                <a:cs typeface="+mn-cs"/>
-              </a:rPr>
-              <a:t>}</a:t>
+              <a:t>  }</a:t>
             </a:r>
             <a:endParaRPr kumimoji="0" lang="en-US" sz="1800" b="0" i="0" u="none" strike="noStrike" kern="1200" cap="none" spc="0" normalizeH="0" baseline="0" noProof="0" dirty="0">
               <a:ln>
@@ -8084,13 +8103,6 @@
   <p:clrMapOvr>
     <a:masterClrMapping/>
   </p:clrMapOvr>
-  <p:timing>
-    <p:tnLst>
-      <p:par>
-        <p:cTn id="1" dur="indefinite" restart="never" nodeType="tmRoot"/>
-      </p:par>
-    </p:tnLst>
-  </p:timing>
 </p:sld>
 </file>
 
@@ -8280,26 +8292,7 @@
                 <a:ea typeface="+mn-ea"/>
                 <a:cs typeface="+mn-cs"/>
               </a:rPr>
-              <a:t> </a:t>
-            </a:r>
-            <a:r>
-              <a:rPr kumimoji="0" lang="en-US" sz="1800" b="0" i="0" u="none" strike="noStrike" kern="1200" cap="none" spc="0" normalizeH="0" baseline="0" noProof="0" smtClean="0">
-                <a:ln>
-                  <a:noFill/>
-                </a:ln>
-                <a:solidFill>
-                  <a:srgbClr val="E7E6E6">
-                    <a:lumMod val="75000"/>
-                  </a:srgbClr>
-                </a:solidFill>
-                <a:effectLst/>
-                <a:uLnTx/>
-                <a:uFillTx/>
-                <a:latin typeface="Fira Code" panose="020B0509050000020004" pitchFamily="49" charset="0"/>
-                <a:ea typeface="+mn-ea"/>
-                <a:cs typeface="+mn-cs"/>
-              </a:rPr>
-              <a:t> </a:t>
+              <a:t>  </a:t>
             </a:r>
             <a:r>
               <a:rPr kumimoji="0" lang="en-US" sz="1800" b="0" i="0" u="none" strike="noStrike" kern="1200" cap="none" spc="0" normalizeH="0" baseline="0" noProof="0" dirty="0">
@@ -8356,26 +8349,7 @@
                 <a:ea typeface="+mn-ea"/>
                 <a:cs typeface="+mn-cs"/>
               </a:rPr>
-              <a:t> </a:t>
-            </a:r>
-            <a:r>
-              <a:rPr kumimoji="0" lang="en-US" sz="1800" b="0" i="0" u="none" strike="noStrike" kern="1200" cap="none" spc="0" normalizeH="0" baseline="0" noProof="0" smtClean="0">
-                <a:ln>
-                  <a:noFill/>
-                </a:ln>
-                <a:solidFill>
-                  <a:schemeClr val="bg2">
-                    <a:lumMod val="75000"/>
-                  </a:schemeClr>
-                </a:solidFill>
-                <a:effectLst/>
-                <a:uLnTx/>
-                <a:uFillTx/>
-                <a:latin typeface="Fira Code" panose="020B0509050000020004" pitchFamily="49" charset="0"/>
-                <a:ea typeface="+mn-ea"/>
-                <a:cs typeface="+mn-cs"/>
-              </a:rPr>
-              <a:t>   </a:t>
+              <a:t>    </a:t>
             </a:r>
             <a:r>
               <a:rPr kumimoji="0" lang="en-US" sz="1800" b="0" i="0" u="none" strike="noStrike" kern="1200" cap="none" spc="0" normalizeH="0" baseline="0" noProof="0" dirty="0">
@@ -8432,26 +8406,7 @@
                 <a:ea typeface="+mn-ea"/>
                 <a:cs typeface="+mn-cs"/>
               </a:rPr>
-              <a:t> </a:t>
-            </a:r>
-            <a:r>
-              <a:rPr kumimoji="0" lang="en-US" sz="1800" b="0" i="0" u="none" strike="noStrike" kern="1200" cap="none" spc="0" normalizeH="0" baseline="0" noProof="0" smtClean="0">
-                <a:ln>
-                  <a:noFill/>
-                </a:ln>
-                <a:solidFill>
-                  <a:schemeClr val="bg2">
-                    <a:lumMod val="75000"/>
-                  </a:schemeClr>
-                </a:solidFill>
-                <a:effectLst/>
-                <a:uLnTx/>
-                <a:uFillTx/>
-                <a:latin typeface="Fira Code" panose="020B0509050000020004" pitchFamily="49" charset="0"/>
-                <a:ea typeface="+mn-ea"/>
-                <a:cs typeface="+mn-cs"/>
-              </a:rPr>
-              <a:t>   </a:t>
+              <a:t>    </a:t>
             </a:r>
             <a:r>
               <a:rPr kumimoji="0" lang="en-US" sz="1800" b="0" i="0" u="none" strike="noStrike" kern="1200" cap="none" spc="0" normalizeH="0" baseline="0" noProof="0" dirty="0">
@@ -8508,26 +8463,7 @@
                 <a:ea typeface="+mn-ea"/>
                 <a:cs typeface="+mn-cs"/>
               </a:rPr>
-              <a:t> </a:t>
-            </a:r>
-            <a:r>
-              <a:rPr kumimoji="0" lang="en-US" sz="1800" b="0" i="0" u="none" strike="noStrike" kern="1200" cap="none" spc="0" normalizeH="0" baseline="0" noProof="0" smtClean="0">
-                <a:ln>
-                  <a:noFill/>
-                </a:ln>
-                <a:solidFill>
-                  <a:schemeClr val="bg2">
-                    <a:lumMod val="75000"/>
-                  </a:schemeClr>
-                </a:solidFill>
-                <a:effectLst/>
-                <a:uLnTx/>
-                <a:uFillTx/>
-                <a:latin typeface="Fira Code" panose="020B0509050000020004" pitchFamily="49" charset="0"/>
-                <a:ea typeface="+mn-ea"/>
-                <a:cs typeface="+mn-cs"/>
-              </a:rPr>
-              <a:t> </a:t>
+              <a:t>  </a:t>
             </a:r>
             <a:r>
               <a:rPr kumimoji="0" lang="en-US" sz="1800" b="0" i="0" u="none" strike="noStrike" kern="1200" cap="none" spc="0" normalizeH="0" baseline="0" noProof="0" dirty="0">
@@ -8805,13 +8741,6 @@
   <p:clrMapOvr>
     <a:masterClrMapping/>
   </p:clrMapOvr>
-  <p:timing>
-    <p:tnLst>
-      <p:par>
-        <p:cTn id="1" dur="indefinite" restart="never" nodeType="tmRoot"/>
-      </p:par>
-    </p:tnLst>
-  </p:timing>
 </p:sld>
 </file>
 
@@ -9301,13 +9230,6 @@
   <p:clrMapOvr>
     <a:masterClrMapping/>
   </p:clrMapOvr>
-  <p:timing>
-    <p:tnLst>
-      <p:par>
-        <p:cTn id="1" dur="indefinite" restart="never" nodeType="tmRoot"/>
-      </p:par>
-    </p:tnLst>
-  </p:timing>
 </p:sld>
 </file>
 
@@ -9867,13 +9789,6 @@
   <p:clrMapOvr>
     <a:masterClrMapping/>
   </p:clrMapOvr>
-  <p:timing>
-    <p:tnLst>
-      <p:par>
-        <p:cTn id="1" dur="indefinite" restart="never" nodeType="tmRoot"/>
-      </p:par>
-    </p:tnLst>
-  </p:timing>
 </p:sld>
 </file>
 
@@ -10180,13 +10095,6 @@
   <p:clrMapOvr>
     <a:masterClrMapping/>
   </p:clrMapOvr>
-  <p:timing>
-    <p:tnLst>
-      <p:par>
-        <p:cTn id="1" dur="indefinite" restart="never" nodeType="tmRoot"/>
-      </p:par>
-    </p:tnLst>
-  </p:timing>
 </p:sld>
 </file>
 
@@ -10795,13 +10703,6 @@
   <p:clrMapOvr>
     <a:masterClrMapping/>
   </p:clrMapOvr>
-  <p:timing>
-    <p:tnLst>
-      <p:par>
-        <p:cTn id="1" dur="indefinite" restart="never" nodeType="tmRoot"/>
-      </p:par>
-    </p:tnLst>
-  </p:timing>
 </p:sld>
 </file>
 
@@ -10952,13 +10853,6 @@
   <p:clrMapOvr>
     <a:masterClrMapping/>
   </p:clrMapOvr>
-  <p:timing>
-    <p:tnLst>
-      <p:par>
-        <p:cTn id="1" dur="indefinite" restart="never" nodeType="tmRoot"/>
-      </p:par>
-    </p:tnLst>
-  </p:timing>
 </p:sld>
 </file>
 
@@ -11080,13 +10974,6 @@
   <p:clrMapOvr>
     <a:masterClrMapping/>
   </p:clrMapOvr>
-  <p:timing>
-    <p:tnLst>
-      <p:par>
-        <p:cTn id="1" dur="indefinite" restart="never" nodeType="tmRoot"/>
-      </p:par>
-    </p:tnLst>
-  </p:timing>
 </p:sld>
 </file>
 
@@ -11381,13 +11268,6 @@
   <p:clrMapOvr>
     <a:masterClrMapping/>
   </p:clrMapOvr>
-  <p:timing>
-    <p:tnLst>
-      <p:par>
-        <p:cTn id="1" dur="indefinite" restart="never" nodeType="tmRoot"/>
-      </p:par>
-    </p:tnLst>
-  </p:timing>
 </p:sld>
 </file>
 
@@ -11693,13 +11573,6 @@
   <p:clrMapOvr>
     <a:masterClrMapping/>
   </p:clrMapOvr>
-  <p:timing>
-    <p:tnLst>
-      <p:par>
-        <p:cTn id="1" dur="indefinite" restart="never" nodeType="tmRoot"/>
-      </p:par>
-    </p:tnLst>
-  </p:timing>
 </p:sld>
 </file>
 
@@ -11907,7 +11780,7 @@
                 <a14:useLocalDpi xmlns:a14="http://schemas.microsoft.com/office/drawing/2010/main" val="0"/>
               </a:ext>
               <a:ext uri="{96DAC541-7B7A-43D3-8B79-37D633B846F1}">
-                <asvg:svgBlip xmlns:asvg="http://schemas.microsoft.com/office/drawing/2016/SVG/main" xmlns="" r:embed="rId6"/>
+                <asvg:svgBlip xmlns:asvg="http://schemas.microsoft.com/office/drawing/2016/SVG/main" r:embed="rId6"/>
               </a:ext>
             </a:extLst>
           </a:blip>
@@ -11946,7 +11819,7 @@
                 <a14:useLocalDpi xmlns:a14="http://schemas.microsoft.com/office/drawing/2010/main" val="0"/>
               </a:ext>
               <a:ext uri="{96DAC541-7B7A-43D3-8B79-37D633B846F1}">
-                <asvg:svgBlip xmlns:asvg="http://schemas.microsoft.com/office/drawing/2016/SVG/main" xmlns="" r:embed="rId6"/>
+                <asvg:svgBlip xmlns:asvg="http://schemas.microsoft.com/office/drawing/2016/SVG/main" r:embed="rId6"/>
               </a:ext>
             </a:extLst>
           </a:blip>
@@ -12222,13 +12095,6 @@
   <p:clrMapOvr>
     <a:masterClrMapping/>
   </p:clrMapOvr>
-  <p:timing>
-    <p:tnLst>
-      <p:par>
-        <p:cTn id="1" dur="indefinite" restart="never" nodeType="tmRoot"/>
-      </p:par>
-    </p:tnLst>
-  </p:timing>
 </p:sld>
 </file>
 
@@ -12529,13 +12395,6 @@
   <p:clrMapOvr>
     <a:masterClrMapping/>
   </p:clrMapOvr>
-  <p:timing>
-    <p:tnLst>
-      <p:par>
-        <p:cTn id="1" dur="indefinite" restart="never" nodeType="tmRoot"/>
-      </p:par>
-    </p:tnLst>
-  </p:timing>
 </p:sld>
 </file>
 
@@ -12882,13 +12741,6 @@
   <p:clrMapOvr>
     <a:masterClrMapping/>
   </p:clrMapOvr>
-  <p:timing>
-    <p:tnLst>
-      <p:par>
-        <p:cTn id="1" dur="indefinite" restart="never" nodeType="tmRoot"/>
-      </p:par>
-    </p:tnLst>
-  </p:timing>
 </p:sld>
 </file>
 
@@ -13249,13 +13101,6 @@
   <p:clrMapOvr>
     <a:masterClrMapping/>
   </p:clrMapOvr>
-  <p:timing>
-    <p:tnLst>
-      <p:par>
-        <p:cTn id="1" dur="indefinite" restart="never" nodeType="tmRoot"/>
-      </p:par>
-    </p:tnLst>
-  </p:timing>
 </p:sld>
 </file>
 
@@ -13614,13 +13459,6 @@
   <p:clrMapOvr>
     <a:masterClrMapping/>
   </p:clrMapOvr>
-  <p:timing>
-    <p:tnLst>
-      <p:par>
-        <p:cTn id="1" dur="indefinite" restart="never" nodeType="tmRoot"/>
-      </p:par>
-    </p:tnLst>
-  </p:timing>
 </p:sld>
 </file>
 
@@ -14132,15 +13970,6 @@
           </a:bodyPr>
           <a:lstStyle/>
           <a:p>
-            <a:r>
-              <a:rPr lang="en-US" dirty="0">
-                <a:solidFill>
-                  <a:srgbClr val="F8F8F2"/>
-                </a:solidFill>
-                <a:latin typeface="Fira Code" panose="020B0509050000020004" pitchFamily="49" charset="0"/>
-              </a:rPr>
-              <a:t/>
-            </a:r>
             <a:br>
               <a:rPr lang="en-US" dirty="0">
                 <a:solidFill>
@@ -14266,13 +14095,6 @@
   <p:clrMapOvr>
     <a:masterClrMapping/>
   </p:clrMapOvr>
-  <p:timing>
-    <p:tnLst>
-      <p:par>
-        <p:cTn id="1" dur="indefinite" restart="never" nodeType="tmRoot"/>
-      </p:par>
-    </p:tnLst>
-  </p:timing>
 </p:sld>
 </file>
 
@@ -14894,13 +14716,6 @@
   <p:clrMapOvr>
     <a:masterClrMapping/>
   </p:clrMapOvr>
-  <p:timing>
-    <p:tnLst>
-      <p:par>
-        <p:cTn id="1" dur="indefinite" restart="never" nodeType="tmRoot"/>
-      </p:par>
-    </p:tnLst>
-  </p:timing>
 </p:sld>
 </file>
 
@@ -15730,13 +15545,6 @@
   <p:clrMapOvr>
     <a:masterClrMapping/>
   </p:clrMapOvr>
-  <p:timing>
-    <p:tnLst>
-      <p:par>
-        <p:cTn id="1" dur="indefinite" restart="never" nodeType="tmRoot"/>
-      </p:par>
-    </p:tnLst>
-  </p:timing>
 </p:sld>
 </file>
 
@@ -16462,13 +16270,6 @@
   <p:clrMapOvr>
     <a:masterClrMapping/>
   </p:clrMapOvr>
-  <p:timing>
-    <p:tnLst>
-      <p:par>
-        <p:cTn id="1" dur="indefinite" restart="never" nodeType="tmRoot"/>
-      </p:par>
-    </p:tnLst>
-  </p:timing>
 </p:sld>
 </file>
 
@@ -16547,7 +16348,7 @@
                 <a14:useLocalDpi xmlns:a14="http://schemas.microsoft.com/office/drawing/2010/main" val="0"/>
               </a:ext>
               <a:ext uri="{96DAC541-7B7A-43D3-8B79-37D633B846F1}">
-                <asvg:svgBlip xmlns:asvg="http://schemas.microsoft.com/office/drawing/2016/SVG/main" xmlns="" r:embed="rId4"/>
+                <asvg:svgBlip xmlns:asvg="http://schemas.microsoft.com/office/drawing/2016/SVG/main" r:embed="rId4"/>
               </a:ext>
             </a:extLst>
           </a:blip>
@@ -16586,7 +16387,7 @@
                 <a14:useLocalDpi xmlns:a14="http://schemas.microsoft.com/office/drawing/2010/main" val="0"/>
               </a:ext>
               <a:ext uri="{96DAC541-7B7A-43D3-8B79-37D633B846F1}">
-                <asvg:svgBlip xmlns:asvg="http://schemas.microsoft.com/office/drawing/2016/SVG/main" xmlns="" r:embed="rId6"/>
+                <asvg:svgBlip xmlns:asvg="http://schemas.microsoft.com/office/drawing/2016/SVG/main" r:embed="rId6"/>
               </a:ext>
             </a:extLst>
           </a:blip>
@@ -16703,13 +16504,6 @@
   <p:clrMapOvr>
     <a:masterClrMapping/>
   </p:clrMapOvr>
-  <p:timing>
-    <p:tnLst>
-      <p:par>
-        <p:cTn id="1" dur="indefinite" restart="never" nodeType="tmRoot"/>
-      </p:par>
-    </p:tnLst>
-  </p:timing>
 </p:sld>
 </file>
 
@@ -17245,13 +17039,6 @@
   <p:clrMapOvr>
     <a:masterClrMapping/>
   </p:clrMapOvr>
-  <p:timing>
-    <p:tnLst>
-      <p:par>
-        <p:cTn id="1" dur="indefinite" restart="never" nodeType="tmRoot"/>
-      </p:par>
-    </p:tnLst>
-  </p:timing>
 </p:sld>
 </file>
 
@@ -17385,7 +17172,7 @@
                 <a14:useLocalDpi xmlns:a14="http://schemas.microsoft.com/office/drawing/2010/main" val="0"/>
               </a:ext>
               <a:ext uri="{96DAC541-7B7A-43D3-8B79-37D633B846F1}">
-                <asvg:svgBlip xmlns:asvg="http://schemas.microsoft.com/office/drawing/2016/SVG/main" xmlns="" r:embed="rId5"/>
+                <asvg:svgBlip xmlns:asvg="http://schemas.microsoft.com/office/drawing/2016/SVG/main" r:embed="rId5"/>
               </a:ext>
             </a:extLst>
           </a:blip>
@@ -17424,7 +17211,7 @@
                 <a14:useLocalDpi xmlns:a14="http://schemas.microsoft.com/office/drawing/2010/main" val="0"/>
               </a:ext>
               <a:ext uri="{96DAC541-7B7A-43D3-8B79-37D633B846F1}">
-                <asvg:svgBlip xmlns:asvg="http://schemas.microsoft.com/office/drawing/2016/SVG/main" xmlns="" r:embed="rId7"/>
+                <asvg:svgBlip xmlns:asvg="http://schemas.microsoft.com/office/drawing/2016/SVG/main" r:embed="rId7"/>
               </a:ext>
             </a:extLst>
           </a:blip>
@@ -18861,13 +18648,6 @@
   <p:clrMapOvr>
     <a:masterClrMapping/>
   </p:clrMapOvr>
-  <p:timing>
-    <p:tnLst>
-      <p:par>
-        <p:cTn id="1" dur="indefinite" restart="never" nodeType="tmRoot"/>
-      </p:par>
-    </p:tnLst>
-  </p:timing>
 </p:sld>
 </file>
 
@@ -19289,13 +19069,6 @@
   <p:clrMapOvr>
     <a:masterClrMapping/>
   </p:clrMapOvr>
-  <p:timing>
-    <p:tnLst>
-      <p:par>
-        <p:cTn id="1" dur="indefinite" restart="never" nodeType="tmRoot"/>
-      </p:par>
-    </p:tnLst>
-  </p:timing>
 </p:sld>
 </file>
 
@@ -19446,13 +19219,6 @@
   <p:clrMapOvr>
     <a:masterClrMapping/>
   </p:clrMapOvr>
-  <p:timing>
-    <p:tnLst>
-      <p:par>
-        <p:cTn id="1" dur="indefinite" restart="never" nodeType="tmRoot"/>
-      </p:par>
-    </p:tnLst>
-  </p:timing>
 </p:sld>
 </file>
 
@@ -19589,13 +19355,6 @@
   <p:clrMapOvr>
     <a:masterClrMapping/>
   </p:clrMapOvr>
-  <p:timing>
-    <p:tnLst>
-      <p:par>
-        <p:cTn id="1" dur="indefinite" restart="never" nodeType="tmRoot"/>
-      </p:par>
-    </p:tnLst>
-  </p:timing>
 </p:sld>
 </file>
 
@@ -20147,13 +19906,6 @@
   <p:clrMapOvr>
     <a:masterClrMapping/>
   </p:clrMapOvr>
-  <p:timing>
-    <p:tnLst>
-      <p:par>
-        <p:cTn id="1" dur="indefinite" restart="never" nodeType="tmRoot"/>
-      </p:par>
-    </p:tnLst>
-  </p:timing>
 </p:sld>
 </file>
 
@@ -20786,13 +20538,6 @@
   <p:clrMapOvr>
     <a:masterClrMapping/>
   </p:clrMapOvr>
-  <p:timing>
-    <p:tnLst>
-      <p:par>
-        <p:cTn id="1" dur="indefinite" restart="never" nodeType="tmRoot"/>
-      </p:par>
-    </p:tnLst>
-  </p:timing>
 </p:sld>
 </file>
 
@@ -21672,13 +21417,6 @@
   <p:clrMapOvr>
     <a:masterClrMapping/>
   </p:clrMapOvr>
-  <p:timing>
-    <p:tnLst>
-      <p:par>
-        <p:cTn id="1" dur="indefinite" restart="never" nodeType="tmRoot"/>
-      </p:par>
-    </p:tnLst>
-  </p:timing>
 </p:sld>
 </file>
 
@@ -21829,13 +21567,6 @@
   <p:clrMapOvr>
     <a:masterClrMapping/>
   </p:clrMapOvr>
-  <p:timing>
-    <p:tnLst>
-      <p:par>
-        <p:cTn id="1" dur="indefinite" restart="never" nodeType="tmRoot"/>
-      </p:par>
-    </p:tnLst>
-  </p:timing>
 </p:sld>
 </file>
 
@@ -21972,13 +21703,6 @@
   <p:clrMapOvr>
     <a:masterClrMapping/>
   </p:clrMapOvr>
-  <p:timing>
-    <p:tnLst>
-      <p:par>
-        <p:cTn id="1" dur="indefinite" restart="never" nodeType="tmRoot"/>
-      </p:par>
-    </p:tnLst>
-  </p:timing>
 </p:sld>
 </file>
 
@@ -22521,13 +22245,6 @@
   <p:clrMapOvr>
     <a:masterClrMapping/>
   </p:clrMapOvr>
-  <p:timing>
-    <p:tnLst>
-      <p:par>
-        <p:cTn id="1" dur="indefinite" restart="never" nodeType="tmRoot"/>
-      </p:par>
-    </p:tnLst>
-  </p:timing>
 </p:sld>
 </file>
 
@@ -22736,13 +22453,6 @@
   <p:clrMapOvr>
     <a:masterClrMapping/>
   </p:clrMapOvr>
-  <p:timing>
-    <p:tnLst>
-      <p:par>
-        <p:cTn id="1" dur="indefinite" restart="never" nodeType="tmRoot"/>
-      </p:par>
-    </p:tnLst>
-  </p:timing>
 </p:sld>
 </file>
 
@@ -22893,13 +22603,6 @@
   <p:clrMapOvr>
     <a:masterClrMapping/>
   </p:clrMapOvr>
-  <p:timing>
-    <p:tnLst>
-      <p:par>
-        <p:cTn id="1" dur="indefinite" restart="never" nodeType="tmRoot"/>
-      </p:par>
-    </p:tnLst>
-  </p:timing>
 </p:sld>
 </file>
 
@@ -23356,13 +23059,6 @@
   <p:clrMapOvr>
     <a:masterClrMapping/>
   </p:clrMapOvr>
-  <p:timing>
-    <p:tnLst>
-      <p:par>
-        <p:cTn id="1" dur="indefinite" restart="never" nodeType="tmRoot"/>
-      </p:par>
-    </p:tnLst>
-  </p:timing>
 </p:sld>
 </file>
 
@@ -25060,13 +24756,6 @@
   <p:clrMapOvr>
     <a:masterClrMapping/>
   </p:clrMapOvr>
-  <p:timing>
-    <p:tnLst>
-      <p:par>
-        <p:cTn id="1" dur="indefinite" restart="never" nodeType="tmRoot"/>
-      </p:par>
-    </p:tnLst>
-  </p:timing>
 </p:sld>
 </file>
 
@@ -25427,13 +25116,6 @@
   <p:clrMapOvr>
     <a:masterClrMapping/>
   </p:clrMapOvr>
-  <p:timing>
-    <p:tnLst>
-      <p:par>
-        <p:cTn id="1" dur="indefinite" restart="never" nodeType="tmRoot"/>
-      </p:par>
-    </p:tnLst>
-  </p:timing>
 </p:sld>
 </file>
 
@@ -25775,13 +25457,6 @@
   <p:clrMapOvr>
     <a:masterClrMapping/>
   </p:clrMapOvr>
-  <p:timing>
-    <p:tnLst>
-      <p:par>
-        <p:cTn id="1" dur="indefinite" restart="never" nodeType="tmRoot"/>
-      </p:par>
-    </p:tnLst>
-  </p:timing>
 </p:sld>
 </file>
 
@@ -26565,7 +26240,7 @@
                 <a:hlinkClick r:id="rId4">
                   <a:extLst>
                     <a:ext uri="{A12FA001-AC4F-418D-AE19-62706E023703}">
-                      <ahyp:hlinkClr xmlns:ahyp="http://schemas.microsoft.com/office/drawing/2018/hyperlinkcolor" xmlns="" val="tx"/>
+                      <ahyp:hlinkClr xmlns:ahyp="http://schemas.microsoft.com/office/drawing/2018/hyperlinkcolor" val="tx"/>
                     </a:ext>
                   </a:extLst>
                 </a:hlinkClick>
@@ -26608,7 +26283,7 @@
                 <a:hlinkClick r:id="rId5">
                   <a:extLst>
                     <a:ext uri="{A12FA001-AC4F-418D-AE19-62706E023703}">
-                      <ahyp:hlinkClr xmlns:ahyp="http://schemas.microsoft.com/office/drawing/2018/hyperlinkcolor" xmlns="" val="tx"/>
+                      <ahyp:hlinkClr xmlns:ahyp="http://schemas.microsoft.com/office/drawing/2018/hyperlinkcolor" val="tx"/>
                     </a:ext>
                   </a:extLst>
                 </a:hlinkClick>
@@ -26651,7 +26326,7 @@
                 <a:hlinkClick r:id="rId6">
                   <a:extLst>
                     <a:ext uri="{A12FA001-AC4F-418D-AE19-62706E023703}">
-                      <ahyp:hlinkClr xmlns:ahyp="http://schemas.microsoft.com/office/drawing/2018/hyperlinkcolor" xmlns="" val="tx"/>
+                      <ahyp:hlinkClr xmlns:ahyp="http://schemas.microsoft.com/office/drawing/2018/hyperlinkcolor" val="tx"/>
                     </a:ext>
                   </a:extLst>
                 </a:hlinkClick>
@@ -26694,7 +26369,7 @@
                 <a:hlinkClick r:id="rId7">
                   <a:extLst>
                     <a:ext uri="{A12FA001-AC4F-418D-AE19-62706E023703}">
-                      <ahyp:hlinkClr xmlns:ahyp="http://schemas.microsoft.com/office/drawing/2018/hyperlinkcolor" xmlns="" val="tx"/>
+                      <ahyp:hlinkClr xmlns:ahyp="http://schemas.microsoft.com/office/drawing/2018/hyperlinkcolor" val="tx"/>
                     </a:ext>
                   </a:extLst>
                 </a:hlinkClick>
@@ -26734,7 +26409,13 @@
           <a:p>
             <a:r>
               <a:rPr lang="de-DE">
-                <a:hlinkClick r:id="rId8"/>
+                <a:hlinkClick r:id="rId8">
+                  <a:extLst>
+                    <a:ext uri="{A12FA001-AC4F-418D-AE19-62706E023703}">
+                      <ahyp:hlinkClr xmlns:ahyp="http://schemas.microsoft.com/office/drawing/2018/hyperlinkcolor" val="tx"/>
+                    </a:ext>
+                  </a:extLst>
+                </a:hlinkClick>
               </a:rPr>
               <a:t>https://github.com/bytePassion/GraphQL-Talk</a:t>
             </a:r>
@@ -26752,13 +26433,6 @@
   <p:clrMapOvr>
     <a:masterClrMapping/>
   </p:clrMapOvr>
-  <p:timing>
-    <p:tnLst>
-      <p:par>
-        <p:cTn id="1" dur="indefinite" restart="never" nodeType="tmRoot"/>
-      </p:par>
-    </p:tnLst>
-  </p:timing>
 </p:sld>
 </file>
 
@@ -26819,17 +26493,9 @@
               <a:rPr lang="de-DE" dirty="0" err="1"/>
               <a:t>Credits</a:t>
             </a:r>
-            <a:r>
-              <a:rPr lang="de-DE" dirty="0"/>
-              <a:t/>
-            </a:r>
             <a:br>
               <a:rPr lang="de-DE" dirty="0"/>
             </a:br>
-            <a:r>
-              <a:rPr lang="de-DE" dirty="0"/>
-              <a:t/>
-            </a:r>
             <a:br>
               <a:rPr lang="de-DE" dirty="0"/>
             </a:br>
@@ -26840,10 +26506,6 @@
             <a:r>
               <a:rPr lang="de-DE" sz="3200" dirty="0"/>
               <a:t>:</a:t>
-            </a:r>
-            <a:r>
-              <a:rPr lang="de-DE" dirty="0"/>
-              <a:t/>
             </a:r>
             <a:br>
               <a:rPr lang="de-DE" dirty="0"/>
@@ -26987,7 +26649,7 @@
           <a:p>
             <a:pPr algn="ctr"/>
             <a:r>
-              <a:rPr lang="de-DE" sz="9600" smtClean="0"/>
+              <a:rPr lang="de-DE" sz="9600"/>
               <a:t>Fragen?</a:t>
             </a:r>
             <a:endParaRPr lang="de-DE" sz="9600" dirty="0"/>
@@ -27471,7 +27133,165 @@
   <p:timing>
     <p:tnLst>
       <p:par>
-        <p:cTn id="1" dur="indefinite" restart="never" nodeType="tmRoot"/>
+        <p:cTn id="1" dur="indefinite" restart="never" nodeType="tmRoot">
+          <p:childTnLst>
+            <p:seq concurrent="1" nextAc="seek">
+              <p:cTn id="2" dur="indefinite" nodeType="mainSeq">
+                <p:childTnLst>
+                  <p:par>
+                    <p:cTn id="3" fill="hold">
+                      <p:stCondLst>
+                        <p:cond delay="indefinite"/>
+                      </p:stCondLst>
+                      <p:childTnLst>
+                        <p:par>
+                          <p:cTn id="4" fill="hold">
+                            <p:stCondLst>
+                              <p:cond delay="0"/>
+                            </p:stCondLst>
+                            <p:childTnLst>
+                              <p:par>
+                                <p:cTn id="5" presetID="1" presetClass="entr" presetSubtype="0" fill="hold" nodeType="clickEffect">
+                                  <p:stCondLst>
+                                    <p:cond delay="0"/>
+                                  </p:stCondLst>
+                                  <p:childTnLst>
+                                    <p:set>
+                                      <p:cBhvr>
+                                        <p:cTn id="6" dur="1" fill="hold">
+                                          <p:stCondLst>
+                                            <p:cond delay="0"/>
+                                          </p:stCondLst>
+                                        </p:cTn>
+                                        <p:tgtEl>
+                                          <p:spTgt spid="11"/>
+                                        </p:tgtEl>
+                                        <p:attrNameLst>
+                                          <p:attrName>style.visibility</p:attrName>
+                                        </p:attrNameLst>
+                                      </p:cBhvr>
+                                      <p:to>
+                                        <p:strVal val="visible"/>
+                                      </p:to>
+                                    </p:set>
+                                  </p:childTnLst>
+                                </p:cTn>
+                              </p:par>
+                            </p:childTnLst>
+                          </p:cTn>
+                        </p:par>
+                      </p:childTnLst>
+                    </p:cTn>
+                  </p:par>
+                  <p:par>
+                    <p:cTn id="7" fill="hold">
+                      <p:stCondLst>
+                        <p:cond delay="indefinite"/>
+                      </p:stCondLst>
+                      <p:childTnLst>
+                        <p:par>
+                          <p:cTn id="8" fill="hold">
+                            <p:stCondLst>
+                              <p:cond delay="0"/>
+                            </p:stCondLst>
+                            <p:childTnLst>
+                              <p:par>
+                                <p:cTn id="9" presetID="1" presetClass="entr" presetSubtype="0" fill="hold" nodeType="clickEffect">
+                                  <p:stCondLst>
+                                    <p:cond delay="0"/>
+                                  </p:stCondLst>
+                                  <p:childTnLst>
+                                    <p:set>
+                                      <p:cBhvr>
+                                        <p:cTn id="10" dur="1" fill="hold">
+                                          <p:stCondLst>
+                                            <p:cond delay="0"/>
+                                          </p:stCondLst>
+                                        </p:cTn>
+                                        <p:tgtEl>
+                                          <p:spTgt spid="5"/>
+                                        </p:tgtEl>
+                                        <p:attrNameLst>
+                                          <p:attrName>style.visibility</p:attrName>
+                                        </p:attrNameLst>
+                                      </p:cBhvr>
+                                      <p:to>
+                                        <p:strVal val="visible"/>
+                                      </p:to>
+                                    </p:set>
+                                  </p:childTnLst>
+                                </p:cTn>
+                              </p:par>
+                            </p:childTnLst>
+                          </p:cTn>
+                        </p:par>
+                      </p:childTnLst>
+                    </p:cTn>
+                  </p:par>
+                  <p:par>
+                    <p:cTn id="11" fill="hold">
+                      <p:stCondLst>
+                        <p:cond delay="indefinite"/>
+                      </p:stCondLst>
+                      <p:childTnLst>
+                        <p:par>
+                          <p:cTn id="12" fill="hold">
+                            <p:stCondLst>
+                              <p:cond delay="0"/>
+                            </p:stCondLst>
+                            <p:childTnLst>
+                              <p:par>
+                                <p:cTn id="13" presetID="1" presetClass="entr" presetSubtype="0" fill="hold" nodeType="clickEffect">
+                                  <p:stCondLst>
+                                    <p:cond delay="0"/>
+                                  </p:stCondLst>
+                                  <p:childTnLst>
+                                    <p:set>
+                                      <p:cBhvr>
+                                        <p:cTn id="14" dur="1" fill="hold">
+                                          <p:stCondLst>
+                                            <p:cond delay="0"/>
+                                          </p:stCondLst>
+                                        </p:cTn>
+                                        <p:tgtEl>
+                                          <p:spTgt spid="2"/>
+                                        </p:tgtEl>
+                                        <p:attrNameLst>
+                                          <p:attrName>style.visibility</p:attrName>
+                                        </p:attrNameLst>
+                                      </p:cBhvr>
+                                      <p:to>
+                                        <p:strVal val="visible"/>
+                                      </p:to>
+                                    </p:set>
+                                  </p:childTnLst>
+                                </p:cTn>
+                              </p:par>
+                            </p:childTnLst>
+                          </p:cTn>
+                        </p:par>
+                      </p:childTnLst>
+                    </p:cTn>
+                  </p:par>
+                </p:childTnLst>
+              </p:cTn>
+              <p:prevCondLst>
+                <p:cond evt="onPrev" delay="0">
+                  <p:tgtEl>
+                    <p:sldTgt/>
+                  </p:tgtEl>
+                </p:cond>
+              </p:prevCondLst>
+              <p:nextCondLst>
+                <p:cond evt="onNext" delay="0">
+                  <p:tgtEl>
+                    <p:sldTgt/>
+                  </p:tgtEl>
+                </p:cond>
+              </p:nextCondLst>
+            </p:seq>
+          </p:childTnLst>
+        </p:cTn>
       </p:par>
     </p:tnLst>
   </p:timing>
@@ -27855,7 +27675,7 @@
                 <a:hlinkClick r:id="rId2">
                   <a:extLst>
                     <a:ext uri="{A12FA001-AC4F-418D-AE19-62706E023703}">
-                      <ahyp:hlinkClr xmlns:ahyp="http://schemas.microsoft.com/office/drawing/2018/hyperlinkcolor" xmlns="" val="tx"/>
+                      <ahyp:hlinkClr xmlns:ahyp="http://schemas.microsoft.com/office/drawing/2018/hyperlinkcolor" val="tx"/>
                     </a:ext>
                   </a:extLst>
                 </a:hlinkClick>
@@ -27887,7 +27707,7 @@
                 <a14:useLocalDpi xmlns:a14="http://schemas.microsoft.com/office/drawing/2010/main" val="0"/>
               </a:ext>
               <a:ext uri="{96DAC541-7B7A-43D3-8B79-37D633B846F1}">
-                <asvg:svgBlip xmlns:asvg="http://schemas.microsoft.com/office/drawing/2016/SVG/main" xmlns="" r:embed="rId4"/>
+                <asvg:svgBlip xmlns:asvg="http://schemas.microsoft.com/office/drawing/2016/SVG/main" r:embed="rId4"/>
               </a:ext>
             </a:extLst>
           </a:blip>
@@ -27937,7 +27757,7 @@
                 <a:hlinkClick r:id="rId5">
                   <a:extLst>
                     <a:ext uri="{A12FA001-AC4F-418D-AE19-62706E023703}">
-                      <ahyp:hlinkClr xmlns:ahyp="http://schemas.microsoft.com/office/drawing/2018/hyperlinkcolor" xmlns="" val="tx"/>
+                      <ahyp:hlinkClr xmlns:ahyp="http://schemas.microsoft.com/office/drawing/2018/hyperlinkcolor" val="tx"/>
                     </a:ext>
                   </a:extLst>
                 </a:hlinkClick>
@@ -27969,7 +27789,7 @@
                 <a14:useLocalDpi xmlns:a14="http://schemas.microsoft.com/office/drawing/2010/main" val="0"/>
               </a:ext>
               <a:ext uri="{96DAC541-7B7A-43D3-8B79-37D633B846F1}">
-                <asvg:svgBlip xmlns:asvg="http://schemas.microsoft.com/office/drawing/2016/SVG/main" xmlns="" r:embed="rId7"/>
+                <asvg:svgBlip xmlns:asvg="http://schemas.microsoft.com/office/drawing/2016/SVG/main" r:embed="rId7"/>
               </a:ext>
             </a:extLst>
           </a:blip>
@@ -28008,7 +27828,7 @@
                 <a14:useLocalDpi xmlns:a14="http://schemas.microsoft.com/office/drawing/2010/main" val="0"/>
               </a:ext>
               <a:ext uri="{96DAC541-7B7A-43D3-8B79-37D633B846F1}">
-                <asvg:svgBlip xmlns:asvg="http://schemas.microsoft.com/office/drawing/2016/SVG/main" xmlns="" r:embed="rId9"/>
+                <asvg:svgBlip xmlns:asvg="http://schemas.microsoft.com/office/drawing/2016/SVG/main" r:embed="rId9"/>
               </a:ext>
             </a:extLst>
           </a:blip>
@@ -28047,7 +27867,7 @@
                 <a14:useLocalDpi xmlns:a14="http://schemas.microsoft.com/office/drawing/2010/main" val="0"/>
               </a:ext>
               <a:ext uri="{96DAC541-7B7A-43D3-8B79-37D633B846F1}">
-                <asvg:svgBlip xmlns:asvg="http://schemas.microsoft.com/office/drawing/2016/SVG/main" xmlns="" r:embed="rId11"/>
+                <asvg:svgBlip xmlns:asvg="http://schemas.microsoft.com/office/drawing/2016/SVG/main" r:embed="rId11"/>
               </a:ext>
             </a:extLst>
           </a:blip>
@@ -28086,7 +27906,7 @@
                 <a14:useLocalDpi xmlns:a14="http://schemas.microsoft.com/office/drawing/2010/main" val="0"/>
               </a:ext>
               <a:ext uri="{96DAC541-7B7A-43D3-8B79-37D633B846F1}">
-                <asvg:svgBlip xmlns:asvg="http://schemas.microsoft.com/office/drawing/2016/SVG/main" xmlns="" r:embed="rId13"/>
+                <asvg:svgBlip xmlns:asvg="http://schemas.microsoft.com/office/drawing/2016/SVG/main" r:embed="rId13"/>
               </a:ext>
             </a:extLst>
           </a:blip>
@@ -28540,7 +28360,7 @@
                 <a14:useLocalDpi xmlns:a14="http://schemas.microsoft.com/office/drawing/2010/main" val="0"/>
               </a:ext>
               <a:ext uri="{96DAC541-7B7A-43D3-8B79-37D633B846F1}">
-                <asvg:svgBlip xmlns:asvg="http://schemas.microsoft.com/office/drawing/2016/SVG/main" xmlns="" r:embed="rId4"/>
+                <asvg:svgBlip xmlns:asvg="http://schemas.microsoft.com/office/drawing/2016/SVG/main" r:embed="rId4"/>
               </a:ext>
             </a:extLst>
           </a:blip>
@@ -28578,26 +28398,19 @@
           <a:prstGeom prst="can">
             <a:avLst/>
           </a:prstGeom>
-          <a:solidFill>
-            <a:srgbClr val="8BE9FD"/>
-          </a:solidFill>
-          <a:ln>
-            <a:solidFill>
-              <a:srgbClr val="8BE9FD"/>
-            </a:solidFill>
-          </a:ln>
+          <a:ln/>
         </p:spPr>
         <p:style>
           <a:lnRef idx="2">
-            <a:schemeClr val="dk1">
+            <a:schemeClr val="accent5">
               <a:shade val="50000"/>
             </a:schemeClr>
           </a:lnRef>
           <a:fillRef idx="1">
-            <a:schemeClr val="dk1"/>
+            <a:schemeClr val="accent5"/>
           </a:fillRef>
           <a:effectRef idx="0">
-            <a:schemeClr val="dk1"/>
+            <a:schemeClr val="accent5"/>
           </a:effectRef>
           <a:fontRef idx="minor">
             <a:schemeClr val="lt1"/>
@@ -28966,24 +28779,23 @@
             <a:avLst/>
           </a:prstGeom>
           <a:ln>
-            <a:solidFill>
-              <a:srgbClr val="8BE9FD"/>
-            </a:solidFill>
             <a:tailEnd type="triangle"/>
           </a:ln>
         </p:spPr>
         <p:style>
           <a:lnRef idx="2">
-            <a:schemeClr val="dk1"/>
+            <a:schemeClr val="accent5">
+              <a:shade val="50000"/>
+            </a:schemeClr>
           </a:lnRef>
-          <a:fillRef idx="0">
-            <a:schemeClr val="dk1"/>
+          <a:fillRef idx="1">
+            <a:schemeClr val="accent5"/>
           </a:fillRef>
-          <a:effectRef idx="1">
-            <a:schemeClr val="dk1"/>
+          <a:effectRef idx="0">
+            <a:schemeClr val="accent5"/>
           </a:effectRef>
           <a:fontRef idx="minor">
-            <a:schemeClr val="tx1"/>
+            <a:schemeClr val="lt1"/>
           </a:fontRef>
         </p:style>
       </p:cxnSp>
@@ -29238,13 +29050,6 @@
   <p:clrMapOvr>
     <a:masterClrMapping/>
   </p:clrMapOvr>
-  <p:timing>
-    <p:tnLst>
-      <p:par>
-        <p:cTn id="1" dur="indefinite" restart="never" nodeType="tmRoot"/>
-      </p:par>
-    </p:tnLst>
-  </p:timing>
 </p:sld>
 </file>
 
@@ -29430,7 +29235,7 @@
           <p:nvPr/>
         </p:nvPicPr>
         <p:blipFill>
-          <a:blip r:embed="rId2">
+          <a:blip r:embed="rId3">
             <a:extLst>
               <a:ext uri="{28A0092B-C50C-407E-A947-70E740481C1C}">
                 <a14:useLocalDpi xmlns:a14="http://schemas.microsoft.com/office/drawing/2010/main" val="0"/>
@@ -29505,13 +29310,6 @@
   <p:clrMapOvr>
     <a:masterClrMapping/>
   </p:clrMapOvr>
-  <p:timing>
-    <p:tnLst>
-      <p:par>
-        <p:cTn id="1" dur="indefinite" restart="never" nodeType="tmRoot"/>
-      </p:par>
-    </p:tnLst>
-  </p:timing>
 </p:sld>
 </file>
 

</xml_diff>

<commit_message>
some adjustments on repo slide
</commit_message>
<xml_diff>
--- a/slides/GraphqlSlides.pptx
+++ b/slides/GraphqlSlides.pptx
@@ -252,7 +252,7 @@
           <a:p>
             <a:fld id="{858036E5-7FF6-491F-BDEF-E833DBCA9680}" type="datetimeFigureOut">
               <a:rPr lang="de-DE" smtClean="0"/>
-              <a:t>23.06.2019</a:t>
+              <a:t>24.06.2019</a:t>
             </a:fld>
             <a:endParaRPr lang="de-DE"/>
           </a:p>
@@ -563,27 +563,6 @@
           <a:bodyPr/>
           <a:lstStyle/>
           <a:p>
-            <a:r>
-              <a:rPr lang="de-DE" dirty="0"/>
-              <a:t>HighSpeed2 GrandHotel5G</a:t>
-            </a:r>
-          </a:p>
-          <a:p>
-            <a:r>
-              <a:rPr lang="de-DE" dirty="0" err="1"/>
-              <a:t>HighSpeed</a:t>
-            </a:r>
-            <a:r>
-              <a:rPr lang="de-DE" dirty="0"/>
-              <a:t> </a:t>
-            </a:r>
-            <a:r>
-              <a:rPr lang="de-DE" dirty="0" err="1"/>
-              <a:t>GrandHotel</a:t>
-            </a:r>
-            <a:endParaRPr lang="de-DE" dirty="0"/>
-          </a:p>
-          <a:p>
             <a:endParaRPr lang="de-DE" dirty="0"/>
           </a:p>
         </p:txBody>
@@ -2294,34 +2273,13 @@
             </a:r>
           </a:p>
           <a:p>
+            <a:pPr marL="0" indent="0">
+              <a:buFontTx/>
+              <a:buNone/>
+            </a:pPr>
             <a:r>
               <a:rPr lang="de-DE" dirty="0"/>
-              <a:t>- Im Idealfall Hyperlinks zwischen den verschiedenen </a:t>
-            </a:r>
-            <a:r>
-              <a:rPr lang="de-DE" dirty="0" err="1"/>
-              <a:t>Resourcen</a:t>
-            </a:r>
-            <a:endParaRPr lang="de-DE" dirty="0"/>
-          </a:p>
-          <a:p>
-            <a:pPr marL="171450" indent="-171450">
-              <a:buFontTx/>
-              <a:buChar char="-"/>
-            </a:pPr>
-            <a:r>
-              <a:rPr lang="de-DE" dirty="0"/>
-              <a:t>HTTP als Protokoll</a:t>
-            </a:r>
-          </a:p>
-          <a:p>
-            <a:pPr marL="171450" indent="-171450">
-              <a:buFontTx/>
-              <a:buChar char="-"/>
-            </a:pPr>
-            <a:r>
-              <a:rPr lang="de-DE" dirty="0"/>
-              <a:t>Verschiedene Repräsentationen der Antwort, z.B. JSON</a:t>
+              <a:t>- Verschiedene Repräsentationen der Antwort, z.B. JSON</a:t>
             </a:r>
           </a:p>
         </p:txBody>
@@ -4359,7 +4317,7 @@
           <a:p>
             <a:fld id="{3A538C34-53B0-4EA9-8596-22F17B12308D}" type="datetimeFigureOut">
               <a:rPr lang="de-DE" smtClean="0"/>
-              <a:t>23.06.2019</a:t>
+              <a:t>24.06.2019</a:t>
             </a:fld>
             <a:endParaRPr lang="de-DE"/>
           </a:p>
@@ -4557,7 +4515,7 @@
           <a:p>
             <a:fld id="{3A538C34-53B0-4EA9-8596-22F17B12308D}" type="datetimeFigureOut">
               <a:rPr lang="de-DE" smtClean="0"/>
-              <a:t>23.06.2019</a:t>
+              <a:t>24.06.2019</a:t>
             </a:fld>
             <a:endParaRPr lang="de-DE"/>
           </a:p>
@@ -4765,7 +4723,7 @@
           <a:p>
             <a:fld id="{3A538C34-53B0-4EA9-8596-22F17B12308D}" type="datetimeFigureOut">
               <a:rPr lang="de-DE" smtClean="0"/>
-              <a:t>23.06.2019</a:t>
+              <a:t>24.06.2019</a:t>
             </a:fld>
             <a:endParaRPr lang="de-DE"/>
           </a:p>
@@ -4963,7 +4921,7 @@
           <a:p>
             <a:fld id="{3A538C34-53B0-4EA9-8596-22F17B12308D}" type="datetimeFigureOut">
               <a:rPr lang="de-DE" smtClean="0"/>
-              <a:t>23.06.2019</a:t>
+              <a:t>24.06.2019</a:t>
             </a:fld>
             <a:endParaRPr lang="de-DE"/>
           </a:p>
@@ -5238,7 +5196,7 @@
           <a:p>
             <a:fld id="{3A538C34-53B0-4EA9-8596-22F17B12308D}" type="datetimeFigureOut">
               <a:rPr lang="de-DE" smtClean="0"/>
-              <a:t>23.06.2019</a:t>
+              <a:t>24.06.2019</a:t>
             </a:fld>
             <a:endParaRPr lang="de-DE"/>
           </a:p>
@@ -5503,7 +5461,7 @@
           <a:p>
             <a:fld id="{3A538C34-53B0-4EA9-8596-22F17B12308D}" type="datetimeFigureOut">
               <a:rPr lang="de-DE" smtClean="0"/>
-              <a:t>23.06.2019</a:t>
+              <a:t>24.06.2019</a:t>
             </a:fld>
             <a:endParaRPr lang="de-DE"/>
           </a:p>
@@ -5915,7 +5873,7 @@
           <a:p>
             <a:fld id="{3A538C34-53B0-4EA9-8596-22F17B12308D}" type="datetimeFigureOut">
               <a:rPr lang="de-DE" smtClean="0"/>
-              <a:t>23.06.2019</a:t>
+              <a:t>24.06.2019</a:t>
             </a:fld>
             <a:endParaRPr lang="de-DE"/>
           </a:p>
@@ -6056,7 +6014,7 @@
           <a:p>
             <a:fld id="{3A538C34-53B0-4EA9-8596-22F17B12308D}" type="datetimeFigureOut">
               <a:rPr lang="de-DE" smtClean="0"/>
-              <a:t>23.06.2019</a:t>
+              <a:t>24.06.2019</a:t>
             </a:fld>
             <a:endParaRPr lang="de-DE"/>
           </a:p>
@@ -6169,7 +6127,7 @@
           <a:p>
             <a:fld id="{3A538C34-53B0-4EA9-8596-22F17B12308D}" type="datetimeFigureOut">
               <a:rPr lang="de-DE" smtClean="0"/>
-              <a:t>23.06.2019</a:t>
+              <a:t>24.06.2019</a:t>
             </a:fld>
             <a:endParaRPr lang="de-DE"/>
           </a:p>
@@ -6480,7 +6438,7 @@
           <a:p>
             <a:fld id="{3A538C34-53B0-4EA9-8596-22F17B12308D}" type="datetimeFigureOut">
               <a:rPr lang="de-DE" smtClean="0"/>
-              <a:t>23.06.2019</a:t>
+              <a:t>24.06.2019</a:t>
             </a:fld>
             <a:endParaRPr lang="de-DE"/>
           </a:p>
@@ -6768,7 +6726,7 @@
           <a:p>
             <a:fld id="{3A538C34-53B0-4EA9-8596-22F17B12308D}" type="datetimeFigureOut">
               <a:rPr lang="de-DE" smtClean="0"/>
-              <a:t>23.06.2019</a:t>
+              <a:t>24.06.2019</a:t>
             </a:fld>
             <a:endParaRPr lang="de-DE"/>
           </a:p>
@@ -7009,7 +6967,7 @@
           <a:p>
             <a:fld id="{3A538C34-53B0-4EA9-8596-22F17B12308D}" type="datetimeFigureOut">
               <a:rPr lang="de-DE" smtClean="0"/>
-              <a:t>23.06.2019</a:t>
+              <a:t>24.06.2019</a:t>
             </a:fld>
             <a:endParaRPr lang="de-DE"/>
           </a:p>
@@ -23681,6 +23639,130 @@
   <p:clrMapOvr>
     <a:masterClrMapping/>
   </p:clrMapOvr>
+  <p:timing>
+    <p:tnLst>
+      <p:par>
+        <p:cTn id="1" dur="indefinite" restart="never" nodeType="tmRoot">
+          <p:childTnLst>
+            <p:seq concurrent="1" nextAc="seek">
+              <p:cTn id="2" dur="indefinite" nodeType="mainSeq">
+                <p:childTnLst>
+                  <p:par>
+                    <p:cTn id="3" fill="hold">
+                      <p:stCondLst>
+                        <p:cond delay="indefinite"/>
+                      </p:stCondLst>
+                      <p:childTnLst>
+                        <p:par>
+                          <p:cTn id="4" fill="hold">
+                            <p:stCondLst>
+                              <p:cond delay="0"/>
+                            </p:stCondLst>
+                            <p:childTnLst>
+                              <p:par>
+                                <p:cTn id="5" presetID="1" presetClass="entr" presetSubtype="0" fill="hold" grpId="0" nodeType="clickEffect">
+                                  <p:stCondLst>
+                                    <p:cond delay="0"/>
+                                  </p:stCondLst>
+                                  <p:childTnLst>
+                                    <p:set>
+                                      <p:cBhvr>
+                                        <p:cTn id="6" dur="1" fill="hold">
+                                          <p:stCondLst>
+                                            <p:cond delay="0"/>
+                                          </p:stCondLst>
+                                        </p:cTn>
+                                        <p:tgtEl>
+                                          <p:spTgt spid="3"/>
+                                        </p:tgtEl>
+                                        <p:attrNameLst>
+                                          <p:attrName>style.visibility</p:attrName>
+                                        </p:attrNameLst>
+                                      </p:cBhvr>
+                                      <p:to>
+                                        <p:strVal val="visible"/>
+                                      </p:to>
+                                    </p:set>
+                                  </p:childTnLst>
+                                </p:cTn>
+                              </p:par>
+                            </p:childTnLst>
+                          </p:cTn>
+                        </p:par>
+                      </p:childTnLst>
+                    </p:cTn>
+                  </p:par>
+                  <p:par>
+                    <p:cTn id="7" fill="hold">
+                      <p:stCondLst>
+                        <p:cond delay="indefinite"/>
+                      </p:stCondLst>
+                      <p:childTnLst>
+                        <p:par>
+                          <p:cTn id="8" fill="hold">
+                            <p:stCondLst>
+                              <p:cond delay="0"/>
+                            </p:stCondLst>
+                            <p:childTnLst>
+                              <p:par>
+                                <p:cTn id="9" presetID="1" presetClass="entr" presetSubtype="0" fill="hold" grpId="0" nodeType="clickEffect">
+                                  <p:stCondLst>
+                                    <p:cond delay="0"/>
+                                  </p:stCondLst>
+                                  <p:childTnLst>
+                                    <p:set>
+                                      <p:cBhvr>
+                                        <p:cTn id="10" dur="1" fill="hold">
+                                          <p:stCondLst>
+                                            <p:cond delay="0"/>
+                                          </p:stCondLst>
+                                        </p:cTn>
+                                        <p:tgtEl>
+                                          <p:spTgt spid="6"/>
+                                        </p:tgtEl>
+                                        <p:attrNameLst>
+                                          <p:attrName>style.visibility</p:attrName>
+                                        </p:attrNameLst>
+                                      </p:cBhvr>
+                                      <p:to>
+                                        <p:strVal val="visible"/>
+                                      </p:to>
+                                    </p:set>
+                                  </p:childTnLst>
+                                </p:cTn>
+                              </p:par>
+                            </p:childTnLst>
+                          </p:cTn>
+                        </p:par>
+                      </p:childTnLst>
+                    </p:cTn>
+                  </p:par>
+                </p:childTnLst>
+              </p:cTn>
+              <p:prevCondLst>
+                <p:cond evt="onPrev" delay="0">
+                  <p:tgtEl>
+                    <p:sldTgt/>
+                  </p:tgtEl>
+                </p:cond>
+              </p:prevCondLst>
+              <p:nextCondLst>
+                <p:cond evt="onNext" delay="0">
+                  <p:tgtEl>
+                    <p:sldTgt/>
+                  </p:tgtEl>
+                </p:cond>
+              </p:nextCondLst>
+            </p:seq>
+          </p:childTnLst>
+        </p:cTn>
+      </p:par>
+    </p:tnLst>
+    <p:bldLst>
+      <p:bldP spid="3" grpId="0"/>
+      <p:bldP spid="6" grpId="0"/>
+    </p:bldLst>
+  </p:timing>
 </p:sld>
 </file>
 
@@ -26660,130 +26742,6 @@
   <p:clrMapOvr>
     <a:masterClrMapping/>
   </p:clrMapOvr>
-  <p:timing>
-    <p:tnLst>
-      <p:par>
-        <p:cTn id="1" dur="indefinite" restart="never" nodeType="tmRoot">
-          <p:childTnLst>
-            <p:seq concurrent="1" nextAc="seek">
-              <p:cTn id="2" dur="indefinite" nodeType="mainSeq">
-                <p:childTnLst>
-                  <p:par>
-                    <p:cTn id="3" fill="hold">
-                      <p:stCondLst>
-                        <p:cond delay="indefinite"/>
-                      </p:stCondLst>
-                      <p:childTnLst>
-                        <p:par>
-                          <p:cTn id="4" fill="hold">
-                            <p:stCondLst>
-                              <p:cond delay="0"/>
-                            </p:stCondLst>
-                            <p:childTnLst>
-                              <p:par>
-                                <p:cTn id="5" presetID="1" presetClass="entr" presetSubtype="0" fill="hold" grpId="0" nodeType="clickEffect">
-                                  <p:stCondLst>
-                                    <p:cond delay="0"/>
-                                  </p:stCondLst>
-                                  <p:childTnLst>
-                                    <p:set>
-                                      <p:cBhvr>
-                                        <p:cTn id="6" dur="1" fill="hold">
-                                          <p:stCondLst>
-                                            <p:cond delay="0"/>
-                                          </p:stCondLst>
-                                        </p:cTn>
-                                        <p:tgtEl>
-                                          <p:spTgt spid="2"/>
-                                        </p:tgtEl>
-                                        <p:attrNameLst>
-                                          <p:attrName>style.visibility</p:attrName>
-                                        </p:attrNameLst>
-                                      </p:cBhvr>
-                                      <p:to>
-                                        <p:strVal val="visible"/>
-                                      </p:to>
-                                    </p:set>
-                                  </p:childTnLst>
-                                </p:cTn>
-                              </p:par>
-                            </p:childTnLst>
-                          </p:cTn>
-                        </p:par>
-                      </p:childTnLst>
-                    </p:cTn>
-                  </p:par>
-                  <p:par>
-                    <p:cTn id="7" fill="hold">
-                      <p:stCondLst>
-                        <p:cond delay="indefinite"/>
-                      </p:stCondLst>
-                      <p:childTnLst>
-                        <p:par>
-                          <p:cTn id="8" fill="hold">
-                            <p:stCondLst>
-                              <p:cond delay="0"/>
-                            </p:stCondLst>
-                            <p:childTnLst>
-                              <p:par>
-                                <p:cTn id="9" presetID="1" presetClass="entr" presetSubtype="0" fill="hold" grpId="0" nodeType="clickEffect">
-                                  <p:stCondLst>
-                                    <p:cond delay="0"/>
-                                  </p:stCondLst>
-                                  <p:childTnLst>
-                                    <p:set>
-                                      <p:cBhvr>
-                                        <p:cTn id="10" dur="1" fill="hold">
-                                          <p:stCondLst>
-                                            <p:cond delay="0"/>
-                                          </p:stCondLst>
-                                        </p:cTn>
-                                        <p:tgtEl>
-                                          <p:spTgt spid="3"/>
-                                        </p:tgtEl>
-                                        <p:attrNameLst>
-                                          <p:attrName>style.visibility</p:attrName>
-                                        </p:attrNameLst>
-                                      </p:cBhvr>
-                                      <p:to>
-                                        <p:strVal val="visible"/>
-                                      </p:to>
-                                    </p:set>
-                                  </p:childTnLst>
-                                </p:cTn>
-                              </p:par>
-                            </p:childTnLst>
-                          </p:cTn>
-                        </p:par>
-                      </p:childTnLst>
-                    </p:cTn>
-                  </p:par>
-                </p:childTnLst>
-              </p:cTn>
-              <p:prevCondLst>
-                <p:cond evt="onPrev" delay="0">
-                  <p:tgtEl>
-                    <p:sldTgt/>
-                  </p:tgtEl>
-                </p:cond>
-              </p:prevCondLst>
-              <p:nextCondLst>
-                <p:cond evt="onNext" delay="0">
-                  <p:tgtEl>
-                    <p:sldTgt/>
-                  </p:tgtEl>
-                </p:cond>
-              </p:nextCondLst>
-            </p:seq>
-          </p:childTnLst>
-        </p:cTn>
-      </p:par>
-    </p:tnLst>
-    <p:bldLst>
-      <p:bldP spid="2" grpId="0"/>
-      <p:bldP spid="3" grpId="0"/>
-    </p:bldLst>
-  </p:timing>
 </p:sld>
 </file>
 
@@ -26812,49 +26770,6 @@
           <a:chExt cx="0" cy="0"/>
         </a:xfrm>
       </p:grpSpPr>
-      <p:sp>
-        <p:nvSpPr>
-          <p:cNvPr id="3" name="Rechteck 2">
-            <a:extLst>
-              <a:ext uri="{FF2B5EF4-FFF2-40B4-BE49-F238E27FC236}">
-                <a16:creationId xmlns:a16="http://schemas.microsoft.com/office/drawing/2014/main" id="{3D6BCF93-9BD3-4261-9C2A-0FC6FBA84625}"/>
-              </a:ext>
-            </a:extLst>
-          </p:cNvPr>
-          <p:cNvSpPr/>
-          <p:nvPr/>
-        </p:nvSpPr>
-        <p:spPr>
-          <a:xfrm>
-            <a:off x="4205610" y="5906254"/>
-            <a:ext cx="3780779" cy="369332"/>
-          </a:xfrm>
-          <a:prstGeom prst="rect">
-            <a:avLst/>
-          </a:prstGeom>
-        </p:spPr>
-        <p:txBody>
-          <a:bodyPr wrap="none">
-            <a:spAutoFit/>
-          </a:bodyPr>
-          <a:lstStyle/>
-          <a:p>
-            <a:r>
-              <a:rPr lang="de-DE" dirty="0">
-                <a:hlinkClick r:id="rId3">
-                  <a:extLst>
-                    <a:ext uri="{A12FA001-AC4F-418D-AE19-62706E023703}">
-                      <ahyp:hlinkClr xmlns:ahyp="http://schemas.microsoft.com/office/drawing/2018/hyperlinkcolor" val="tx"/>
-                    </a:ext>
-                  </a:extLst>
-                </a:hlinkClick>
-              </a:rPr>
-              <a:t>https://github.com/graphql/graphql-js</a:t>
-            </a:r>
-            <a:endParaRPr lang="de-DE" dirty="0"/>
-          </a:p>
-        </p:txBody>
-      </p:sp>
       <p:pic>
         <p:nvPicPr>
           <p:cNvPr id="5" name="Grafik 4" descr="Uhr">
@@ -26870,13 +26785,13 @@
           <p:nvPr/>
         </p:nvPicPr>
         <p:blipFill>
-          <a:blip r:embed="rId4" cstate="hqprint">
+          <a:blip r:embed="rId3" cstate="hqprint">
             <a:extLst>
               <a:ext uri="{28A0092B-C50C-407E-A947-70E740481C1C}">
                 <a14:useLocalDpi xmlns:a14="http://schemas.microsoft.com/office/drawing/2010/main" val="0"/>
               </a:ext>
               <a:ext uri="{96DAC541-7B7A-43D3-8B79-37D633B846F1}">
-                <asvg:svgBlip xmlns:asvg="http://schemas.microsoft.com/office/drawing/2016/SVG/main" r:embed="rId5"/>
+                <asvg:svgBlip xmlns:asvg="http://schemas.microsoft.com/office/drawing/2016/SVG/main" r:embed="rId4"/>
               </a:ext>
             </a:extLst>
           </a:blip>
@@ -26894,49 +26809,6 @@
           </a:prstGeom>
         </p:spPr>
       </p:pic>
-      <p:sp>
-        <p:nvSpPr>
-          <p:cNvPr id="6" name="Rechteck 5">
-            <a:extLst>
-              <a:ext uri="{FF2B5EF4-FFF2-40B4-BE49-F238E27FC236}">
-                <a16:creationId xmlns:a16="http://schemas.microsoft.com/office/drawing/2014/main" id="{B9B98293-EB70-4400-8878-E413BC4C8486}"/>
-              </a:ext>
-            </a:extLst>
-          </p:cNvPr>
-          <p:cNvSpPr/>
-          <p:nvPr/>
-        </p:nvSpPr>
-        <p:spPr>
-          <a:xfrm>
-            <a:off x="4146907" y="5418574"/>
-            <a:ext cx="3898183" cy="369332"/>
-          </a:xfrm>
-          <a:prstGeom prst="rect">
-            <a:avLst/>
-          </a:prstGeom>
-        </p:spPr>
-        <p:txBody>
-          <a:bodyPr wrap="none">
-            <a:spAutoFit/>
-          </a:bodyPr>
-          <a:lstStyle/>
-          <a:p>
-            <a:r>
-              <a:rPr lang="de-DE" dirty="0">
-                <a:hlinkClick r:id="rId6">
-                  <a:extLst>
-                    <a:ext uri="{A12FA001-AC4F-418D-AE19-62706E023703}">
-                      <ahyp:hlinkClr xmlns:ahyp="http://schemas.microsoft.com/office/drawing/2018/hyperlinkcolor" val="tx"/>
-                    </a:ext>
-                  </a:extLst>
-                </a:hlinkClick>
-              </a:rPr>
-              <a:t>https://graphql.github.io/graphql-spec/</a:t>
-            </a:r>
-            <a:endParaRPr lang="de-DE" dirty="0"/>
-          </a:p>
-        </p:txBody>
-      </p:sp>
       <p:pic>
         <p:nvPicPr>
           <p:cNvPr id="14" name="Grafik 13">
@@ -26952,13 +26824,13 @@
           <p:nvPr/>
         </p:nvPicPr>
         <p:blipFill>
-          <a:blip r:embed="rId7" cstate="hqprint">
+          <a:blip r:embed="rId5" cstate="hqprint">
             <a:extLst>
               <a:ext uri="{28A0092B-C50C-407E-A947-70E740481C1C}">
                 <a14:useLocalDpi xmlns:a14="http://schemas.microsoft.com/office/drawing/2010/main" val="0"/>
               </a:ext>
               <a:ext uri="{96DAC541-7B7A-43D3-8B79-37D633B846F1}">
-                <asvg:svgBlip xmlns:asvg="http://schemas.microsoft.com/office/drawing/2016/SVG/main" r:embed="rId8"/>
+                <asvg:svgBlip xmlns:asvg="http://schemas.microsoft.com/office/drawing/2016/SVG/main" r:embed="rId6"/>
               </a:ext>
             </a:extLst>
           </a:blip>
@@ -26991,13 +26863,13 @@
           <p:nvPr/>
         </p:nvPicPr>
         <p:blipFill>
-          <a:blip r:embed="rId9" cstate="hqprint">
+          <a:blip r:embed="rId7" cstate="hqprint">
             <a:extLst>
               <a:ext uri="{28A0092B-C50C-407E-A947-70E740481C1C}">
                 <a14:useLocalDpi xmlns:a14="http://schemas.microsoft.com/office/drawing/2010/main" val="0"/>
               </a:ext>
               <a:ext uri="{96DAC541-7B7A-43D3-8B79-37D633B846F1}">
-                <asvg:svgBlip xmlns:asvg="http://schemas.microsoft.com/office/drawing/2016/SVG/main" r:embed="rId10"/>
+                <asvg:svgBlip xmlns:asvg="http://schemas.microsoft.com/office/drawing/2016/SVG/main" r:embed="rId8"/>
               </a:ext>
             </a:extLst>
           </a:blip>
@@ -27030,13 +26902,13 @@
           <p:nvPr/>
         </p:nvPicPr>
         <p:blipFill>
-          <a:blip r:embed="rId11" cstate="hqprint">
+          <a:blip r:embed="rId9" cstate="hqprint">
             <a:extLst>
               <a:ext uri="{28A0092B-C50C-407E-A947-70E740481C1C}">
                 <a14:useLocalDpi xmlns:a14="http://schemas.microsoft.com/office/drawing/2010/main" val="0"/>
               </a:ext>
               <a:ext uri="{96DAC541-7B7A-43D3-8B79-37D633B846F1}">
-                <asvg:svgBlip xmlns:asvg="http://schemas.microsoft.com/office/drawing/2016/SVG/main" r:embed="rId12"/>
+                <asvg:svgBlip xmlns:asvg="http://schemas.microsoft.com/office/drawing/2016/SVG/main" r:embed="rId10"/>
               </a:ext>
             </a:extLst>
           </a:blip>
@@ -27069,13 +26941,13 @@
           <p:nvPr/>
         </p:nvPicPr>
         <p:blipFill>
-          <a:blip r:embed="rId13" cstate="hqprint">
+          <a:blip r:embed="rId11" cstate="hqprint">
             <a:extLst>
               <a:ext uri="{28A0092B-C50C-407E-A947-70E740481C1C}">
                 <a14:useLocalDpi xmlns:a14="http://schemas.microsoft.com/office/drawing/2010/main" val="0"/>
               </a:ext>
               <a:ext uri="{96DAC541-7B7A-43D3-8B79-37D633B846F1}">
-                <asvg:svgBlip xmlns:asvg="http://schemas.microsoft.com/office/drawing/2016/SVG/main" r:embed="rId14"/>
+                <asvg:svgBlip xmlns:asvg="http://schemas.microsoft.com/office/drawing/2016/SVG/main" r:embed="rId12"/>
               </a:ext>
             </a:extLst>
           </a:blip>
@@ -27283,7 +27155,7 @@
           <p:nvPr/>
         </p:nvPicPr>
         <p:blipFill>
-          <a:blip r:embed="rId15">
+          <a:blip r:embed="rId13">
             <a:extLst>
               <a:ext uri="{28A0092B-C50C-407E-A947-70E740481C1C}">
                 <a14:useLocalDpi xmlns:a14="http://schemas.microsoft.com/office/drawing/2010/main" val="0"/>
@@ -27392,6 +27264,193 @@
           </a:p>
         </p:txBody>
       </p:sp>
+      <p:grpSp>
+        <p:nvGrpSpPr>
+          <p:cNvPr id="8" name="Gruppieren 7">
+            <a:extLst>
+              <a:ext uri="{FF2B5EF4-FFF2-40B4-BE49-F238E27FC236}">
+                <a16:creationId xmlns:a16="http://schemas.microsoft.com/office/drawing/2014/main" id="{D53358EA-2C81-42E6-B7CD-BDA09B5029A4}"/>
+              </a:ext>
+            </a:extLst>
+          </p:cNvPr>
+          <p:cNvGrpSpPr/>
+          <p:nvPr/>
+        </p:nvGrpSpPr>
+        <p:grpSpPr>
+          <a:xfrm>
+            <a:off x="2423486" y="5403185"/>
+            <a:ext cx="6392521" cy="875801"/>
+            <a:chOff x="1222067" y="5403185"/>
+            <a:chExt cx="6392521" cy="875801"/>
+          </a:xfrm>
+        </p:grpSpPr>
+        <p:sp>
+          <p:nvSpPr>
+            <p:cNvPr id="3" name="Rechteck 2">
+              <a:extLst>
+                <a:ext uri="{FF2B5EF4-FFF2-40B4-BE49-F238E27FC236}">
+                  <a16:creationId xmlns:a16="http://schemas.microsoft.com/office/drawing/2014/main" id="{3D6BCF93-9BD3-4261-9C2A-0FC6FBA84625}"/>
+                </a:ext>
+              </a:extLst>
+            </p:cNvPr>
+            <p:cNvSpPr/>
+            <p:nvPr/>
+          </p:nvSpPr>
+          <p:spPr>
+            <a:xfrm>
+              <a:off x="4146907" y="5925043"/>
+              <a:ext cx="3365665" cy="338554"/>
+            </a:xfrm>
+            <a:prstGeom prst="rect">
+              <a:avLst/>
+            </a:prstGeom>
+          </p:spPr>
+          <p:txBody>
+            <a:bodyPr wrap="none">
+              <a:spAutoFit/>
+            </a:bodyPr>
+            <a:lstStyle/>
+            <a:p>
+              <a:r>
+                <a:rPr lang="de-DE" sz="1600" dirty="0">
+                  <a:hlinkClick r:id="rId14">
+                    <a:extLst>
+                      <a:ext uri="{A12FA001-AC4F-418D-AE19-62706E023703}">
+                        <ahyp:hlinkClr xmlns:ahyp="http://schemas.microsoft.com/office/drawing/2018/hyperlinkcolor" val="tx"/>
+                      </a:ext>
+                    </a:extLst>
+                  </a:hlinkClick>
+                </a:rPr>
+                <a:t>https://github.com/graphql/graphql-js</a:t>
+              </a:r>
+              <a:endParaRPr lang="de-DE" sz="1600" dirty="0"/>
+            </a:p>
+          </p:txBody>
+        </p:sp>
+        <p:sp>
+          <p:nvSpPr>
+            <p:cNvPr id="6" name="Rechteck 5">
+              <a:extLst>
+                <a:ext uri="{FF2B5EF4-FFF2-40B4-BE49-F238E27FC236}">
+                  <a16:creationId xmlns:a16="http://schemas.microsoft.com/office/drawing/2014/main" id="{B9B98293-EB70-4400-8878-E413BC4C8486}"/>
+                </a:ext>
+              </a:extLst>
+            </p:cNvPr>
+            <p:cNvSpPr/>
+            <p:nvPr/>
+          </p:nvSpPr>
+          <p:spPr>
+            <a:xfrm>
+              <a:off x="4146907" y="5418574"/>
+              <a:ext cx="3467681" cy="338554"/>
+            </a:xfrm>
+            <a:prstGeom prst="rect">
+              <a:avLst/>
+            </a:prstGeom>
+          </p:spPr>
+          <p:txBody>
+            <a:bodyPr wrap="none">
+              <a:spAutoFit/>
+            </a:bodyPr>
+            <a:lstStyle/>
+            <a:p>
+              <a:r>
+                <a:rPr lang="de-DE" sz="1600" dirty="0">
+                  <a:hlinkClick r:id="rId15">
+                    <a:extLst>
+                      <a:ext uri="{A12FA001-AC4F-418D-AE19-62706E023703}">
+                        <ahyp:hlinkClr xmlns:ahyp="http://schemas.microsoft.com/office/drawing/2018/hyperlinkcolor" val="tx"/>
+                      </a:ext>
+                    </a:extLst>
+                  </a:hlinkClick>
+                </a:rPr>
+                <a:t>https://graphql.github.io/graphql-spec/</a:t>
+              </a:r>
+              <a:endParaRPr lang="de-DE" sz="1600" dirty="0"/>
+            </a:p>
+          </p:txBody>
+        </p:sp>
+        <p:sp>
+          <p:nvSpPr>
+            <p:cNvPr id="20" name="Rechteck 19">
+              <a:extLst>
+                <a:ext uri="{FF2B5EF4-FFF2-40B4-BE49-F238E27FC236}">
+                  <a16:creationId xmlns:a16="http://schemas.microsoft.com/office/drawing/2014/main" id="{57FDEEB5-0611-4D23-BB3B-9E9FA88988CD}"/>
+                </a:ext>
+              </a:extLst>
+            </p:cNvPr>
+            <p:cNvSpPr/>
+            <p:nvPr/>
+          </p:nvSpPr>
+          <p:spPr>
+            <a:xfrm>
+              <a:off x="1222067" y="5909654"/>
+              <a:ext cx="2974532" cy="369332"/>
+            </a:xfrm>
+            <a:prstGeom prst="rect">
+              <a:avLst/>
+            </a:prstGeom>
+          </p:spPr>
+          <p:txBody>
+            <a:bodyPr wrap="none">
+              <a:spAutoFit/>
+            </a:bodyPr>
+            <a:lstStyle/>
+            <a:p>
+              <a:r>
+                <a:rPr lang="de-DE" dirty="0"/>
+                <a:t>Referenzimplementierung JS:</a:t>
+              </a:r>
+            </a:p>
+          </p:txBody>
+        </p:sp>
+        <p:sp>
+          <p:nvSpPr>
+            <p:cNvPr id="21" name="Rechteck 20">
+              <a:extLst>
+                <a:ext uri="{FF2B5EF4-FFF2-40B4-BE49-F238E27FC236}">
+                  <a16:creationId xmlns:a16="http://schemas.microsoft.com/office/drawing/2014/main" id="{B261D34E-8275-4A59-9E89-08E6354EF382}"/>
+                </a:ext>
+              </a:extLst>
+            </p:cNvPr>
+            <p:cNvSpPr/>
+            <p:nvPr/>
+          </p:nvSpPr>
+          <p:spPr>
+            <a:xfrm>
+              <a:off x="1823001" y="5403185"/>
+              <a:ext cx="2323906" cy="369332"/>
+            </a:xfrm>
+            <a:prstGeom prst="rect">
+              <a:avLst/>
+            </a:prstGeom>
+          </p:spPr>
+          <p:txBody>
+            <a:bodyPr wrap="none">
+              <a:spAutoFit/>
+            </a:bodyPr>
+            <a:lstStyle/>
+            <a:p>
+              <a:r>
+                <a:rPr lang="de-DE" dirty="0" err="1"/>
+                <a:t>GraphQL</a:t>
+              </a:r>
+              <a:r>
+                <a:rPr lang="de-DE" dirty="0"/>
+                <a:t> </a:t>
+              </a:r>
+              <a:r>
+                <a:rPr lang="de-DE" dirty="0" err="1"/>
+                <a:t>Specification</a:t>
+              </a:r>
+              <a:r>
+                <a:rPr lang="de-DE" dirty="0"/>
+                <a:t>:</a:t>
+              </a:r>
+            </a:p>
+          </p:txBody>
+        </p:sp>
+      </p:grpSp>
     </p:spTree>
     <p:extLst>
       <p:ext uri="{BB962C8B-B14F-4D97-AF65-F5344CB8AC3E}">
@@ -27437,6 +27496,51 @@
                                         </p:cTn>
                                         <p:tgtEl>
                                           <p:spTgt spid="7"/>
+                                        </p:tgtEl>
+                                        <p:attrNameLst>
+                                          <p:attrName>style.visibility</p:attrName>
+                                        </p:attrNameLst>
+                                      </p:cBhvr>
+                                      <p:to>
+                                        <p:strVal val="visible"/>
+                                      </p:to>
+                                    </p:set>
+                                  </p:childTnLst>
+                                </p:cTn>
+                              </p:par>
+                            </p:childTnLst>
+                          </p:cTn>
+                        </p:par>
+                      </p:childTnLst>
+                    </p:cTn>
+                  </p:par>
+                  <p:par>
+                    <p:cTn id="7" fill="hold">
+                      <p:stCondLst>
+                        <p:cond delay="indefinite"/>
+                      </p:stCondLst>
+                      <p:childTnLst>
+                        <p:par>
+                          <p:cTn id="8" fill="hold">
+                            <p:stCondLst>
+                              <p:cond delay="0"/>
+                            </p:stCondLst>
+                            <p:childTnLst>
+                              <p:par>
+                                <p:cTn id="9" presetID="1" presetClass="entr" presetSubtype="0" fill="hold" nodeType="clickEffect">
+                                  <p:stCondLst>
+                                    <p:cond delay="0"/>
+                                  </p:stCondLst>
+                                  <p:childTnLst>
+                                    <p:set>
+                                      <p:cBhvr>
+                                        <p:cTn id="10" dur="1" fill="hold">
+                                          <p:stCondLst>
+                                            <p:cond delay="0"/>
+                                          </p:stCondLst>
+                                        </p:cTn>
+                                        <p:tgtEl>
+                                          <p:spTgt spid="8"/>
                                         </p:tgtEl>
                                         <p:attrNameLst>
                                           <p:attrName>style.visibility</p:attrName>

</xml_diff>